<commit_message>
doc: update fabric network part1
</commit_message>
<xml_diff>
--- a/fabric notes/【2020.12.26】Fabric Network Runtime Architecture.pptx
+++ b/fabric notes/【2020.12.26】Fabric Network Runtime Architecture.pptx
@@ -7,12 +7,12 @@
   <p:sldIdLst>
     <p:sldId id="256" r:id="rId2"/>
     <p:sldId id="257" r:id="rId3"/>
-    <p:sldId id="261" r:id="rId4"/>
-    <p:sldId id="258" r:id="rId5"/>
-    <p:sldId id="262" r:id="rId6"/>
-    <p:sldId id="259" r:id="rId7"/>
-    <p:sldId id="264" r:id="rId8"/>
-    <p:sldId id="285" r:id="rId9"/>
+    <p:sldId id="287" r:id="rId4"/>
+    <p:sldId id="261" r:id="rId5"/>
+    <p:sldId id="258" r:id="rId6"/>
+    <p:sldId id="262" r:id="rId7"/>
+    <p:sldId id="259" r:id="rId8"/>
+    <p:sldId id="264" r:id="rId9"/>
     <p:sldId id="279" r:id="rId10"/>
     <p:sldId id="274" r:id="rId11"/>
     <p:sldId id="275" r:id="rId12"/>
@@ -271,7 +271,7 @@
           <a:p>
             <a:fld id="{D1FC40BD-DF71-48B5-9F6E-F69B92E103E9}" type="datetimeFigureOut">
               <a:rPr lang="zh-CN" altLang="en-US" smtClean="0"/>
-              <a:t>2020/12/27</a:t>
+              <a:t>2021/1/25</a:t>
             </a:fld>
             <a:endParaRPr lang="zh-CN" altLang="en-US"/>
           </a:p>
@@ -441,7 +441,7 @@
           <a:p>
             <a:fld id="{D1FC40BD-DF71-48B5-9F6E-F69B92E103E9}" type="datetimeFigureOut">
               <a:rPr lang="zh-CN" altLang="en-US" smtClean="0"/>
-              <a:t>2020/12/27</a:t>
+              <a:t>2021/1/25</a:t>
             </a:fld>
             <a:endParaRPr lang="zh-CN" altLang="en-US"/>
           </a:p>
@@ -621,7 +621,7 @@
           <a:p>
             <a:fld id="{D1FC40BD-DF71-48B5-9F6E-F69B92E103E9}" type="datetimeFigureOut">
               <a:rPr lang="zh-CN" altLang="en-US" smtClean="0"/>
-              <a:t>2020/12/27</a:t>
+              <a:t>2021/1/25</a:t>
             </a:fld>
             <a:endParaRPr lang="zh-CN" altLang="en-US"/>
           </a:p>
@@ -791,7 +791,7 @@
           <a:p>
             <a:fld id="{D1FC40BD-DF71-48B5-9F6E-F69B92E103E9}" type="datetimeFigureOut">
               <a:rPr lang="zh-CN" altLang="en-US" smtClean="0"/>
-              <a:t>2020/12/27</a:t>
+              <a:t>2021/1/25</a:t>
             </a:fld>
             <a:endParaRPr lang="zh-CN" altLang="en-US"/>
           </a:p>
@@ -1037,7 +1037,7 @@
           <a:p>
             <a:fld id="{D1FC40BD-DF71-48B5-9F6E-F69B92E103E9}" type="datetimeFigureOut">
               <a:rPr lang="zh-CN" altLang="en-US" smtClean="0"/>
-              <a:t>2020/12/27</a:t>
+              <a:t>2021/1/25</a:t>
             </a:fld>
             <a:endParaRPr lang="zh-CN" altLang="en-US"/>
           </a:p>
@@ -1269,7 +1269,7 @@
           <a:p>
             <a:fld id="{D1FC40BD-DF71-48B5-9F6E-F69B92E103E9}" type="datetimeFigureOut">
               <a:rPr lang="zh-CN" altLang="en-US" smtClean="0"/>
-              <a:t>2020/12/27</a:t>
+              <a:t>2021/1/25</a:t>
             </a:fld>
             <a:endParaRPr lang="zh-CN" altLang="en-US"/>
           </a:p>
@@ -1636,7 +1636,7 @@
           <a:p>
             <a:fld id="{D1FC40BD-DF71-48B5-9F6E-F69B92E103E9}" type="datetimeFigureOut">
               <a:rPr lang="zh-CN" altLang="en-US" smtClean="0"/>
-              <a:t>2020/12/27</a:t>
+              <a:t>2021/1/25</a:t>
             </a:fld>
             <a:endParaRPr lang="zh-CN" altLang="en-US"/>
           </a:p>
@@ -1754,7 +1754,7 @@
           <a:p>
             <a:fld id="{D1FC40BD-DF71-48B5-9F6E-F69B92E103E9}" type="datetimeFigureOut">
               <a:rPr lang="zh-CN" altLang="en-US" smtClean="0"/>
-              <a:t>2020/12/27</a:t>
+              <a:t>2021/1/25</a:t>
             </a:fld>
             <a:endParaRPr lang="zh-CN" altLang="en-US"/>
           </a:p>
@@ -1849,7 +1849,7 @@
           <a:p>
             <a:fld id="{D1FC40BD-DF71-48B5-9F6E-F69B92E103E9}" type="datetimeFigureOut">
               <a:rPr lang="zh-CN" altLang="en-US" smtClean="0"/>
-              <a:t>2020/12/27</a:t>
+              <a:t>2021/1/25</a:t>
             </a:fld>
             <a:endParaRPr lang="zh-CN" altLang="en-US"/>
           </a:p>
@@ -2126,7 +2126,7 @@
           <a:p>
             <a:fld id="{D1FC40BD-DF71-48B5-9F6E-F69B92E103E9}" type="datetimeFigureOut">
               <a:rPr lang="zh-CN" altLang="en-US" smtClean="0"/>
-              <a:t>2020/12/27</a:t>
+              <a:t>2021/1/25</a:t>
             </a:fld>
             <a:endParaRPr lang="zh-CN" altLang="en-US"/>
           </a:p>
@@ -2383,7 +2383,7 @@
           <a:p>
             <a:fld id="{D1FC40BD-DF71-48B5-9F6E-F69B92E103E9}" type="datetimeFigureOut">
               <a:rPr lang="zh-CN" altLang="en-US" smtClean="0"/>
-              <a:t>2020/12/27</a:t>
+              <a:t>2021/1/25</a:t>
             </a:fld>
             <a:endParaRPr lang="zh-CN" altLang="en-US"/>
           </a:p>
@@ -2596,7 +2596,7 @@
           <a:p>
             <a:fld id="{D1FC40BD-DF71-48B5-9F6E-F69B92E103E9}" type="datetimeFigureOut">
               <a:rPr lang="zh-CN" altLang="en-US" smtClean="0"/>
-              <a:t>2020/12/27</a:t>
+              <a:t>2021/1/25</a:t>
             </a:fld>
             <a:endParaRPr lang="zh-CN" altLang="en-US"/>
           </a:p>
@@ -4970,6 +4970,127 @@
           <p:cNvPr id="2" name="标题 1">
             <a:extLst>
               <a:ext uri="{FF2B5EF4-FFF2-40B4-BE49-F238E27FC236}">
+                <a16:creationId xmlns:a16="http://schemas.microsoft.com/office/drawing/2014/main" id="{15944CD4-1B6A-433B-B6E6-D095AF38BEF0}"/>
+              </a:ext>
+            </a:extLst>
+          </p:cNvPr>
+          <p:cNvSpPr>
+            <a:spLocks noGrp="1"/>
+          </p:cNvSpPr>
+          <p:nvPr>
+            <p:ph type="title"/>
+          </p:nvPr>
+        </p:nvSpPr>
+        <p:spPr/>
+        <p:txBody>
+          <a:bodyPr/>
+          <a:lstStyle/>
+          <a:p>
+            <a:r>
+              <a:rPr lang="en-US" altLang="zh-CN" dirty="0"/>
+              <a:t>Learning Advices</a:t>
+            </a:r>
+            <a:endParaRPr lang="zh-CN" altLang="en-US" dirty="0"/>
+          </a:p>
+        </p:txBody>
+      </p:sp>
+      <p:sp>
+        <p:nvSpPr>
+          <p:cNvPr id="3" name="内容占位符 2">
+            <a:extLst>
+              <a:ext uri="{FF2B5EF4-FFF2-40B4-BE49-F238E27FC236}">
+                <a16:creationId xmlns:a16="http://schemas.microsoft.com/office/drawing/2014/main" id="{3DBF0078-5C63-4251-B3FA-67849BB3E746}"/>
+              </a:ext>
+            </a:extLst>
+          </p:cNvPr>
+          <p:cNvSpPr>
+            <a:spLocks noGrp="1"/>
+          </p:cNvSpPr>
+          <p:nvPr>
+            <p:ph idx="1"/>
+          </p:nvPr>
+        </p:nvSpPr>
+        <p:spPr/>
+        <p:txBody>
+          <a:bodyPr/>
+          <a:lstStyle/>
+          <a:p>
+            <a:r>
+              <a:rPr lang="zh-CN" altLang="en-US" dirty="0"/>
+              <a:t>内容冗杂</a:t>
+            </a:r>
+            <a:endParaRPr lang="en-US" altLang="zh-CN" dirty="0"/>
+          </a:p>
+          <a:p>
+            <a:r>
+              <a:rPr lang="zh-CN" altLang="en-US" dirty="0"/>
+              <a:t>难度颇高</a:t>
+            </a:r>
+            <a:endParaRPr lang="en-US" altLang="zh-CN" dirty="0"/>
+          </a:p>
+          <a:p>
+            <a:endParaRPr lang="en-US" altLang="zh-CN" dirty="0"/>
+          </a:p>
+          <a:p>
+            <a:endParaRPr lang="en-US" altLang="zh-CN" dirty="0"/>
+          </a:p>
+          <a:p>
+            <a:r>
+              <a:rPr lang="zh-CN" altLang="en-US"/>
+              <a:t>思路清晰（图）</a:t>
+            </a:r>
+            <a:endParaRPr lang="en-US" altLang="zh-CN" dirty="0"/>
+          </a:p>
+          <a:p>
+            <a:r>
+              <a:rPr lang="zh-CN" altLang="en-US" dirty="0"/>
+              <a:t>懂得取舍</a:t>
+            </a:r>
+            <a:endParaRPr lang="en-US" altLang="zh-CN" dirty="0"/>
+          </a:p>
+          <a:p>
+            <a:r>
+              <a:rPr lang="zh-CN" altLang="en-US" dirty="0"/>
+              <a:t>优先实践</a:t>
+            </a:r>
+          </a:p>
+        </p:txBody>
+      </p:sp>
+    </p:spTree>
+    <p:extLst>
+      <p:ext uri="{BB962C8B-B14F-4D97-AF65-F5344CB8AC3E}">
+        <p14:creationId xmlns:p14="http://schemas.microsoft.com/office/powerpoint/2010/main" val="329322590"/>
+      </p:ext>
+    </p:extLst>
+  </p:cSld>
+  <p:clrMapOvr>
+    <a:masterClrMapping/>
+  </p:clrMapOvr>
+</p:sld>
+</file>
+
+<file path=ppt/slides/slide4.xml><?xml version="1.0" encoding="utf-8"?>
+<p:sld xmlns:a="http://schemas.openxmlformats.org/drawingml/2006/main" xmlns:r="http://schemas.openxmlformats.org/officeDocument/2006/relationships" xmlns:p="http://schemas.openxmlformats.org/presentationml/2006/main">
+  <p:cSld>
+    <p:spTree>
+      <p:nvGrpSpPr>
+        <p:cNvPr id="1" name=""/>
+        <p:cNvGrpSpPr/>
+        <p:nvPr/>
+      </p:nvGrpSpPr>
+      <p:grpSpPr>
+        <a:xfrm>
+          <a:off x="0" y="0"/>
+          <a:ext cx="0" cy="0"/>
+          <a:chOff x="0" y="0"/>
+          <a:chExt cx="0" cy="0"/>
+        </a:xfrm>
+      </p:grpSpPr>
+      <p:sp>
+        <p:nvSpPr>
+          <p:cNvPr id="2" name="标题 1">
+            <a:extLst>
+              <a:ext uri="{FF2B5EF4-FFF2-40B4-BE49-F238E27FC236}">
                 <a16:creationId xmlns:a16="http://schemas.microsoft.com/office/drawing/2014/main" id="{696A5807-AB6E-4F45-99F4-9C05A7BD8CDB}"/>
               </a:ext>
             </a:extLst>
@@ -5014,7 +5135,7 @@
 </p:sld>
 </file>
 
-<file path=ppt/slides/slide4.xml><?xml version="1.0" encoding="utf-8"?>
+<file path=ppt/slides/slide5.xml><?xml version="1.0" encoding="utf-8"?>
 <p:sld xmlns:a="http://schemas.openxmlformats.org/drawingml/2006/main" xmlns:r="http://schemas.openxmlformats.org/officeDocument/2006/relationships" xmlns:p="http://schemas.openxmlformats.org/presentationml/2006/main">
   <p:cSld>
     <p:spTree>
@@ -5106,72 +5227,6 @@
 </p:sld>
 </file>
 
-<file path=ppt/slides/slide5.xml><?xml version="1.0" encoding="utf-8"?>
-<p:sld xmlns:a="http://schemas.openxmlformats.org/drawingml/2006/main" xmlns:r="http://schemas.openxmlformats.org/officeDocument/2006/relationships" xmlns:p="http://schemas.openxmlformats.org/presentationml/2006/main">
-  <p:cSld>
-    <p:spTree>
-      <p:nvGrpSpPr>
-        <p:cNvPr id="1" name=""/>
-        <p:cNvGrpSpPr/>
-        <p:nvPr/>
-      </p:nvGrpSpPr>
-      <p:grpSpPr>
-        <a:xfrm>
-          <a:off x="0" y="0"/>
-          <a:ext cx="0" cy="0"/>
-          <a:chOff x="0" y="0"/>
-          <a:chExt cx="0" cy="0"/>
-        </a:xfrm>
-      </p:grpSpPr>
-      <p:sp>
-        <p:nvSpPr>
-          <p:cNvPr id="2" name="标题 1">
-            <a:extLst>
-              <a:ext uri="{FF2B5EF4-FFF2-40B4-BE49-F238E27FC236}">
-                <a16:creationId xmlns:a16="http://schemas.microsoft.com/office/drawing/2014/main" id="{696A5807-AB6E-4F45-99F4-9C05A7BD8CDB}"/>
-              </a:ext>
-            </a:extLst>
-          </p:cNvPr>
-          <p:cNvSpPr>
-            <a:spLocks noGrp="1"/>
-          </p:cNvSpPr>
-          <p:nvPr>
-            <p:ph type="ctrTitle"/>
-          </p:nvPr>
-        </p:nvSpPr>
-        <p:spPr>
-          <a:xfrm>
-            <a:off x="600173" y="2910526"/>
-            <a:ext cx="10991654" cy="1036948"/>
-          </a:xfrm>
-        </p:spPr>
-        <p:txBody>
-          <a:bodyPr>
-            <a:normAutofit/>
-          </a:bodyPr>
-          <a:lstStyle/>
-          <a:p>
-            <a:r>
-              <a:rPr lang="en-US" altLang="zh-CN" dirty="0"/>
-              <a:t>Part 2: Roles</a:t>
-            </a:r>
-            <a:endParaRPr lang="zh-CN" altLang="en-US" dirty="0"/>
-          </a:p>
-        </p:txBody>
-      </p:sp>
-    </p:spTree>
-    <p:extLst>
-      <p:ext uri="{BB962C8B-B14F-4D97-AF65-F5344CB8AC3E}">
-        <p14:creationId xmlns:p14="http://schemas.microsoft.com/office/powerpoint/2010/main" val="2051143597"/>
-      </p:ext>
-    </p:extLst>
-  </p:cSld>
-  <p:clrMapOvr>
-    <a:masterClrMapping/>
-  </p:clrMapOvr>
-</p:sld>
-</file>
-
 <file path=ppt/slides/slide6.xml><?xml version="1.0" encoding="utf-8"?>
 <p:sld xmlns:a="http://schemas.openxmlformats.org/drawingml/2006/main" xmlns:r="http://schemas.openxmlformats.org/officeDocument/2006/relationships" xmlns:p="http://schemas.openxmlformats.org/presentationml/2006/main">
   <p:cSld>
@@ -5194,7 +5249,7 @@
           <p:cNvPr id="2" name="标题 1">
             <a:extLst>
               <a:ext uri="{FF2B5EF4-FFF2-40B4-BE49-F238E27FC236}">
-                <a16:creationId xmlns:a16="http://schemas.microsoft.com/office/drawing/2014/main" id="{F7E0BEEC-56C0-4E11-A9AA-06CF97929BAE}"/>
+                <a16:creationId xmlns:a16="http://schemas.microsoft.com/office/drawing/2014/main" id="{696A5807-AB6E-4F45-99F4-9C05A7BD8CDB}"/>
               </a:ext>
             </a:extLst>
           </p:cNvPr>
@@ -5202,65 +5257,24 @@
             <a:spLocks noGrp="1"/>
           </p:cNvSpPr>
           <p:nvPr>
-            <p:ph type="title"/>
-          </p:nvPr>
-        </p:nvSpPr>
-        <p:spPr/>
-        <p:txBody>
-          <a:bodyPr/>
-          <a:lstStyle/>
-          <a:p>
-            <a:r>
-              <a:rPr lang="en-US" altLang="zh-CN" dirty="0"/>
-              <a:t>Component</a:t>
-            </a:r>
-            <a:endParaRPr lang="zh-CN" altLang="en-US" dirty="0"/>
-          </a:p>
-        </p:txBody>
-      </p:sp>
-      <p:sp>
-        <p:nvSpPr>
-          <p:cNvPr id="3" name="内容占位符 2">
-            <a:extLst>
-              <a:ext uri="{FF2B5EF4-FFF2-40B4-BE49-F238E27FC236}">
-                <a16:creationId xmlns:a16="http://schemas.microsoft.com/office/drawing/2014/main" id="{DCC224A1-EDDC-4BA9-A214-FDD0A5B4DE1D}"/>
-              </a:ext>
-            </a:extLst>
-          </p:cNvPr>
-          <p:cNvSpPr>
-            <a:spLocks noGrp="1"/>
-          </p:cNvSpPr>
-          <p:nvPr>
-            <p:ph idx="1"/>
-          </p:nvPr>
-        </p:nvSpPr>
-        <p:spPr/>
-        <p:txBody>
-          <a:bodyPr/>
-          <a:lstStyle/>
-          <a:p>
-            <a:r>
-              <a:rPr lang="en-US" altLang="zh-CN" dirty="0"/>
-              <a:t>Peer</a:t>
-            </a:r>
-          </a:p>
-          <a:p>
-            <a:r>
-              <a:rPr lang="en-US" altLang="zh-CN" dirty="0" err="1"/>
-              <a:t>Orderer</a:t>
-            </a:r>
-            <a:endParaRPr lang="en-US" altLang="zh-CN" dirty="0"/>
-          </a:p>
-          <a:p>
-            <a:r>
-              <a:rPr lang="en-US" altLang="zh-CN" dirty="0"/>
-              <a:t>CA</a:t>
-            </a:r>
-          </a:p>
-          <a:p>
-            <a:r>
-              <a:rPr lang="en-US" altLang="zh-CN" dirty="0"/>
-              <a:t>Client</a:t>
+            <p:ph type="ctrTitle"/>
+          </p:nvPr>
+        </p:nvSpPr>
+        <p:spPr>
+          <a:xfrm>
+            <a:off x="600173" y="2910526"/>
+            <a:ext cx="10991654" cy="1036948"/>
+          </a:xfrm>
+        </p:spPr>
+        <p:txBody>
+          <a:bodyPr>
+            <a:normAutofit/>
+          </a:bodyPr>
+          <a:lstStyle/>
+          <a:p>
+            <a:r>
+              <a:rPr lang="en-US" altLang="zh-CN" dirty="0"/>
+              <a:t>Part 2: Roles</a:t>
             </a:r>
             <a:endParaRPr lang="zh-CN" altLang="en-US" dirty="0"/>
           </a:p>
@@ -5269,7 +5283,7 @@
     </p:spTree>
     <p:extLst>
       <p:ext uri="{BB962C8B-B14F-4D97-AF65-F5344CB8AC3E}">
-        <p14:creationId xmlns:p14="http://schemas.microsoft.com/office/powerpoint/2010/main" val="3302952869"/>
+        <p14:creationId xmlns:p14="http://schemas.microsoft.com/office/powerpoint/2010/main" val="2051143597"/>
       </p:ext>
     </p:extLst>
   </p:cSld>
@@ -5301,7 +5315,7 @@
           <p:cNvPr id="2" name="标题 1">
             <a:extLst>
               <a:ext uri="{FF2B5EF4-FFF2-40B4-BE49-F238E27FC236}">
-                <a16:creationId xmlns:a16="http://schemas.microsoft.com/office/drawing/2014/main" id="{59E53C8E-1407-48C7-BC53-331B3B3C2F84}"/>
+                <a16:creationId xmlns:a16="http://schemas.microsoft.com/office/drawing/2014/main" id="{F7E0BEEC-56C0-4E11-A9AA-06CF97929BAE}"/>
               </a:ext>
             </a:extLst>
           </p:cNvPr>
@@ -5319,7 +5333,7 @@
           <a:p>
             <a:r>
               <a:rPr lang="en-US" altLang="zh-CN" dirty="0"/>
-              <a:t>1. Peer</a:t>
+              <a:t>Roles</a:t>
             </a:r>
             <a:endParaRPr lang="zh-CN" altLang="en-US" dirty="0"/>
           </a:p>
@@ -5330,7 +5344,7 @@
           <p:cNvPr id="3" name="内容占位符 2">
             <a:extLst>
               <a:ext uri="{FF2B5EF4-FFF2-40B4-BE49-F238E27FC236}">
-                <a16:creationId xmlns:a16="http://schemas.microsoft.com/office/drawing/2014/main" id="{1A9EC2D7-6463-4A6F-90EE-399D9456DD0A}"/>
+                <a16:creationId xmlns:a16="http://schemas.microsoft.com/office/drawing/2014/main" id="{DCC224A1-EDDC-4BA9-A214-FDD0A5B4DE1D}"/>
               </a:ext>
             </a:extLst>
           </p:cNvPr>
@@ -5343,40 +5357,40 @@
         </p:nvSpPr>
         <p:spPr/>
         <p:txBody>
-          <a:bodyPr>
-            <a:normAutofit/>
-          </a:bodyPr>
-          <a:lstStyle/>
-          <a:p>
-            <a:r>
-              <a:rPr lang="en-US" altLang="zh-CN" dirty="0"/>
-              <a:t>Committer</a:t>
-            </a:r>
-          </a:p>
-          <a:p>
-            <a:r>
-              <a:rPr lang="en-US" altLang="zh-CN" dirty="0"/>
-              <a:t>Endorser</a:t>
-            </a:r>
-          </a:p>
-          <a:p>
-            <a:r>
-              <a:rPr lang="en-US" altLang="zh-CN" dirty="0"/>
-              <a:t>Anchor</a:t>
-            </a:r>
-          </a:p>
-          <a:p>
-            <a:r>
-              <a:rPr lang="en-US" altLang="zh-CN" dirty="0"/>
-              <a:t>Leader</a:t>
-            </a:r>
+          <a:bodyPr/>
+          <a:lstStyle/>
+          <a:p>
+            <a:r>
+              <a:rPr lang="en-US" altLang="zh-CN" dirty="0"/>
+              <a:t>Peer</a:t>
+            </a:r>
+          </a:p>
+          <a:p>
+            <a:r>
+              <a:rPr lang="en-US" altLang="zh-CN" dirty="0" err="1"/>
+              <a:t>Orderer</a:t>
+            </a:r>
+            <a:endParaRPr lang="en-US" altLang="zh-CN" dirty="0"/>
+          </a:p>
+          <a:p>
+            <a:r>
+              <a:rPr lang="en-US" altLang="zh-CN" dirty="0"/>
+              <a:t>CA</a:t>
+            </a:r>
+          </a:p>
+          <a:p>
+            <a:r>
+              <a:rPr lang="en-US" altLang="zh-CN" dirty="0"/>
+              <a:t>Client</a:t>
+            </a:r>
+            <a:endParaRPr lang="zh-CN" altLang="en-US" dirty="0"/>
           </a:p>
         </p:txBody>
       </p:sp>
     </p:spTree>
     <p:extLst>
       <p:ext uri="{BB962C8B-B14F-4D97-AF65-F5344CB8AC3E}">
-        <p14:creationId xmlns:p14="http://schemas.microsoft.com/office/powerpoint/2010/main" val="3119354160"/>
+        <p14:creationId xmlns:p14="http://schemas.microsoft.com/office/powerpoint/2010/main" val="3302952869"/>
       </p:ext>
     </p:extLst>
   </p:cSld>
@@ -5478,19 +5492,12 @@
               <a:t>Leader</a:t>
             </a:r>
           </a:p>
-          <a:p>
-            <a:r>
-              <a:rPr lang="zh-CN" altLang="en-US" dirty="0"/>
-              <a:t>上面四者的对比表</a:t>
-            </a:r>
-            <a:endParaRPr lang="en-US" altLang="zh-CN" dirty="0"/>
-          </a:p>
         </p:txBody>
       </p:sp>
     </p:spTree>
     <p:extLst>
       <p:ext uri="{BB962C8B-B14F-4D97-AF65-F5344CB8AC3E}">
-        <p14:creationId xmlns:p14="http://schemas.microsoft.com/office/powerpoint/2010/main" val="3207605567"/>
+        <p14:creationId xmlns:p14="http://schemas.microsoft.com/office/powerpoint/2010/main" val="3119354160"/>
       </p:ext>
     </p:extLst>
   </p:cSld>

</xml_diff>

<commit_message>
doc: finished the fabric network part1
</commit_message>
<xml_diff>
--- a/fabric notes/【2020.12.26】Fabric Network Runtime Architecture.pptx
+++ b/fabric notes/【2020.12.26】Fabric Network Runtime Architecture.pptx
@@ -14,26 +14,20 @@
     <p:sldId id="259" r:id="rId8"/>
     <p:sldId id="264" r:id="rId9"/>
     <p:sldId id="279" r:id="rId10"/>
-    <p:sldId id="274" r:id="rId11"/>
-    <p:sldId id="275" r:id="rId12"/>
-    <p:sldId id="284" r:id="rId13"/>
-    <p:sldId id="280" r:id="rId14"/>
-    <p:sldId id="265" r:id="rId15"/>
-    <p:sldId id="277" r:id="rId16"/>
-    <p:sldId id="266" r:id="rId17"/>
-    <p:sldId id="281" r:id="rId18"/>
-    <p:sldId id="282" r:id="rId19"/>
-    <p:sldId id="267" r:id="rId20"/>
-    <p:sldId id="283" r:id="rId21"/>
-    <p:sldId id="263" r:id="rId22"/>
-    <p:sldId id="260" r:id="rId23"/>
-    <p:sldId id="268" r:id="rId24"/>
-    <p:sldId id="269" r:id="rId25"/>
-    <p:sldId id="270" r:id="rId26"/>
-    <p:sldId id="272" r:id="rId27"/>
-    <p:sldId id="271" r:id="rId28"/>
-    <p:sldId id="273" r:id="rId29"/>
-    <p:sldId id="286" r:id="rId30"/>
+    <p:sldId id="275" r:id="rId11"/>
+    <p:sldId id="288" r:id="rId12"/>
+    <p:sldId id="265" r:id="rId13"/>
+    <p:sldId id="277" r:id="rId14"/>
+    <p:sldId id="266" r:id="rId15"/>
+    <p:sldId id="267" r:id="rId16"/>
+    <p:sldId id="263" r:id="rId17"/>
+    <p:sldId id="260" r:id="rId18"/>
+    <p:sldId id="268" r:id="rId19"/>
+    <p:sldId id="269" r:id="rId20"/>
+    <p:sldId id="270" r:id="rId21"/>
+    <p:sldId id="272" r:id="rId22"/>
+    <p:sldId id="271" r:id="rId23"/>
+    <p:sldId id="286" r:id="rId24"/>
   </p:sldIdLst>
   <p:sldSz cx="12192000" cy="6858000"/>
   <p:notesSz cx="6858000" cy="9144000"/>
@@ -140,6 +134,2778 @@
 </p:presentation>
 </file>
 
+<file path=ppt/diagrams/colors1.xml><?xml version="1.0" encoding="utf-8"?>
+<dgm:colorsDef xmlns:dgm="http://schemas.openxmlformats.org/drawingml/2006/diagram" xmlns:a="http://schemas.openxmlformats.org/drawingml/2006/main" uniqueId="urn:microsoft.com/office/officeart/2005/8/colors/accent1_2">
+  <dgm:title val=""/>
+  <dgm:desc val=""/>
+  <dgm:catLst>
+    <dgm:cat type="accent1" pri="11200"/>
+  </dgm:catLst>
+  <dgm:styleLbl name="node0">
+    <dgm:fillClrLst meth="repeat">
+      <a:schemeClr val="accent1"/>
+    </dgm:fillClrLst>
+    <dgm:linClrLst meth="repeat">
+      <a:schemeClr val="lt1"/>
+    </dgm:linClrLst>
+    <dgm:effectClrLst/>
+    <dgm:txLinClrLst/>
+    <dgm:txFillClrLst/>
+    <dgm:txEffectClrLst/>
+  </dgm:styleLbl>
+  <dgm:styleLbl name="alignNode1">
+    <dgm:fillClrLst meth="repeat">
+      <a:schemeClr val="accent1"/>
+    </dgm:fillClrLst>
+    <dgm:linClrLst meth="repeat">
+      <a:schemeClr val="accent1"/>
+    </dgm:linClrLst>
+    <dgm:effectClrLst/>
+    <dgm:txLinClrLst/>
+    <dgm:txFillClrLst/>
+    <dgm:txEffectClrLst/>
+  </dgm:styleLbl>
+  <dgm:styleLbl name="node1">
+    <dgm:fillClrLst meth="repeat">
+      <a:schemeClr val="accent1"/>
+    </dgm:fillClrLst>
+    <dgm:linClrLst meth="repeat">
+      <a:schemeClr val="lt1"/>
+    </dgm:linClrLst>
+    <dgm:effectClrLst/>
+    <dgm:txLinClrLst/>
+    <dgm:txFillClrLst/>
+    <dgm:txEffectClrLst/>
+  </dgm:styleLbl>
+  <dgm:styleLbl name="lnNode1">
+    <dgm:fillClrLst meth="repeat">
+      <a:schemeClr val="accent1"/>
+    </dgm:fillClrLst>
+    <dgm:linClrLst meth="repeat">
+      <a:schemeClr val="lt1"/>
+    </dgm:linClrLst>
+    <dgm:effectClrLst/>
+    <dgm:txLinClrLst/>
+    <dgm:txFillClrLst/>
+    <dgm:txEffectClrLst/>
+  </dgm:styleLbl>
+  <dgm:styleLbl name="vennNode1">
+    <dgm:fillClrLst meth="repeat">
+      <a:schemeClr val="accent1">
+        <a:alpha val="50000"/>
+      </a:schemeClr>
+    </dgm:fillClrLst>
+    <dgm:linClrLst meth="repeat">
+      <a:schemeClr val="lt1"/>
+    </dgm:linClrLst>
+    <dgm:effectClrLst/>
+    <dgm:txLinClrLst/>
+    <dgm:txFillClrLst/>
+    <dgm:txEffectClrLst/>
+  </dgm:styleLbl>
+  <dgm:styleLbl name="node2">
+    <dgm:fillClrLst meth="repeat">
+      <a:schemeClr val="accent1"/>
+    </dgm:fillClrLst>
+    <dgm:linClrLst meth="repeat">
+      <a:schemeClr val="lt1"/>
+    </dgm:linClrLst>
+    <dgm:effectClrLst/>
+    <dgm:txLinClrLst/>
+    <dgm:txFillClrLst/>
+    <dgm:txEffectClrLst/>
+  </dgm:styleLbl>
+  <dgm:styleLbl name="node3">
+    <dgm:fillClrLst meth="repeat">
+      <a:schemeClr val="accent1"/>
+    </dgm:fillClrLst>
+    <dgm:linClrLst meth="repeat">
+      <a:schemeClr val="lt1"/>
+    </dgm:linClrLst>
+    <dgm:effectClrLst/>
+    <dgm:txLinClrLst/>
+    <dgm:txFillClrLst/>
+    <dgm:txEffectClrLst/>
+  </dgm:styleLbl>
+  <dgm:styleLbl name="node4">
+    <dgm:fillClrLst meth="repeat">
+      <a:schemeClr val="accent1"/>
+    </dgm:fillClrLst>
+    <dgm:linClrLst meth="repeat">
+      <a:schemeClr val="lt1"/>
+    </dgm:linClrLst>
+    <dgm:effectClrLst/>
+    <dgm:txLinClrLst/>
+    <dgm:txFillClrLst/>
+    <dgm:txEffectClrLst/>
+  </dgm:styleLbl>
+  <dgm:styleLbl name="fgImgPlace1">
+    <dgm:fillClrLst meth="repeat">
+      <a:schemeClr val="accent1">
+        <a:tint val="50000"/>
+      </a:schemeClr>
+    </dgm:fillClrLst>
+    <dgm:linClrLst meth="repeat">
+      <a:schemeClr val="lt1"/>
+    </dgm:linClrLst>
+    <dgm:effectClrLst/>
+    <dgm:txLinClrLst/>
+    <dgm:txFillClrLst meth="repeat">
+      <a:schemeClr val="lt1"/>
+    </dgm:txFillClrLst>
+    <dgm:txEffectClrLst/>
+  </dgm:styleLbl>
+  <dgm:styleLbl name="alignImgPlace1">
+    <dgm:fillClrLst meth="repeat">
+      <a:schemeClr val="accent1">
+        <a:tint val="50000"/>
+      </a:schemeClr>
+    </dgm:fillClrLst>
+    <dgm:linClrLst meth="repeat">
+      <a:schemeClr val="lt1"/>
+    </dgm:linClrLst>
+    <dgm:effectClrLst/>
+    <dgm:txLinClrLst/>
+    <dgm:txFillClrLst meth="repeat">
+      <a:schemeClr val="lt1"/>
+    </dgm:txFillClrLst>
+    <dgm:txEffectClrLst/>
+  </dgm:styleLbl>
+  <dgm:styleLbl name="bgImgPlace1">
+    <dgm:fillClrLst meth="repeat">
+      <a:schemeClr val="accent1">
+        <a:tint val="50000"/>
+      </a:schemeClr>
+    </dgm:fillClrLst>
+    <dgm:linClrLst meth="repeat">
+      <a:schemeClr val="lt1"/>
+    </dgm:linClrLst>
+    <dgm:effectClrLst/>
+    <dgm:txLinClrLst/>
+    <dgm:txFillClrLst meth="repeat">
+      <a:schemeClr val="lt1"/>
+    </dgm:txFillClrLst>
+    <dgm:txEffectClrLst/>
+  </dgm:styleLbl>
+  <dgm:styleLbl name="sibTrans2D1">
+    <dgm:fillClrLst meth="repeat">
+      <a:schemeClr val="accent1">
+        <a:tint val="60000"/>
+      </a:schemeClr>
+    </dgm:fillClrLst>
+    <dgm:linClrLst meth="repeat">
+      <a:schemeClr val="accent1">
+        <a:tint val="60000"/>
+      </a:schemeClr>
+    </dgm:linClrLst>
+    <dgm:effectClrLst/>
+    <dgm:txLinClrLst/>
+    <dgm:txFillClrLst/>
+    <dgm:txEffectClrLst/>
+  </dgm:styleLbl>
+  <dgm:styleLbl name="fgSibTrans2D1">
+    <dgm:fillClrLst meth="repeat">
+      <a:schemeClr val="accent1">
+        <a:tint val="60000"/>
+      </a:schemeClr>
+    </dgm:fillClrLst>
+    <dgm:linClrLst meth="repeat">
+      <a:schemeClr val="accent1">
+        <a:tint val="60000"/>
+      </a:schemeClr>
+    </dgm:linClrLst>
+    <dgm:effectClrLst/>
+    <dgm:txLinClrLst/>
+    <dgm:txFillClrLst/>
+    <dgm:txEffectClrLst/>
+  </dgm:styleLbl>
+  <dgm:styleLbl name="bgSibTrans2D1">
+    <dgm:fillClrLst meth="repeat">
+      <a:schemeClr val="accent1">
+        <a:tint val="60000"/>
+      </a:schemeClr>
+    </dgm:fillClrLst>
+    <dgm:linClrLst meth="repeat">
+      <a:schemeClr val="accent1">
+        <a:tint val="60000"/>
+      </a:schemeClr>
+    </dgm:linClrLst>
+    <dgm:effectClrLst/>
+    <dgm:txLinClrLst/>
+    <dgm:txFillClrLst/>
+    <dgm:txEffectClrLst/>
+  </dgm:styleLbl>
+  <dgm:styleLbl name="sibTrans1D1">
+    <dgm:fillClrLst meth="repeat">
+      <a:schemeClr val="accent1"/>
+    </dgm:fillClrLst>
+    <dgm:linClrLst meth="repeat">
+      <a:schemeClr val="accent1"/>
+    </dgm:linClrLst>
+    <dgm:effectClrLst/>
+    <dgm:txLinClrLst/>
+    <dgm:txFillClrLst meth="repeat">
+      <a:schemeClr val="tx1"/>
+    </dgm:txFillClrLst>
+    <dgm:txEffectClrLst/>
+  </dgm:styleLbl>
+  <dgm:styleLbl name="callout">
+    <dgm:fillClrLst meth="repeat">
+      <a:schemeClr val="accent1"/>
+    </dgm:fillClrLst>
+    <dgm:linClrLst meth="repeat">
+      <a:schemeClr val="accent1">
+        <a:tint val="50000"/>
+      </a:schemeClr>
+    </dgm:linClrLst>
+    <dgm:effectClrLst/>
+    <dgm:txLinClrLst/>
+    <dgm:txFillClrLst meth="repeat">
+      <a:schemeClr val="tx1"/>
+    </dgm:txFillClrLst>
+    <dgm:txEffectClrLst/>
+  </dgm:styleLbl>
+  <dgm:styleLbl name="asst0">
+    <dgm:fillClrLst meth="repeat">
+      <a:schemeClr val="accent1"/>
+    </dgm:fillClrLst>
+    <dgm:linClrLst meth="repeat">
+      <a:schemeClr val="lt1"/>
+    </dgm:linClrLst>
+    <dgm:effectClrLst/>
+    <dgm:txLinClrLst/>
+    <dgm:txFillClrLst/>
+    <dgm:txEffectClrLst/>
+  </dgm:styleLbl>
+  <dgm:styleLbl name="asst1">
+    <dgm:fillClrLst meth="repeat">
+      <a:schemeClr val="accent1"/>
+    </dgm:fillClrLst>
+    <dgm:linClrLst meth="repeat">
+      <a:schemeClr val="lt1"/>
+    </dgm:linClrLst>
+    <dgm:effectClrLst/>
+    <dgm:txLinClrLst/>
+    <dgm:txFillClrLst/>
+    <dgm:txEffectClrLst/>
+  </dgm:styleLbl>
+  <dgm:styleLbl name="asst2">
+    <dgm:fillClrLst meth="repeat">
+      <a:schemeClr val="accent1"/>
+    </dgm:fillClrLst>
+    <dgm:linClrLst meth="repeat">
+      <a:schemeClr val="lt1"/>
+    </dgm:linClrLst>
+    <dgm:effectClrLst/>
+    <dgm:txLinClrLst/>
+    <dgm:txFillClrLst/>
+    <dgm:txEffectClrLst/>
+  </dgm:styleLbl>
+  <dgm:styleLbl name="asst3">
+    <dgm:fillClrLst meth="repeat">
+      <a:schemeClr val="accent1"/>
+    </dgm:fillClrLst>
+    <dgm:linClrLst meth="repeat">
+      <a:schemeClr val="lt1"/>
+    </dgm:linClrLst>
+    <dgm:effectClrLst/>
+    <dgm:txLinClrLst/>
+    <dgm:txFillClrLst/>
+    <dgm:txEffectClrLst/>
+  </dgm:styleLbl>
+  <dgm:styleLbl name="asst4">
+    <dgm:fillClrLst meth="repeat">
+      <a:schemeClr val="accent1"/>
+    </dgm:fillClrLst>
+    <dgm:linClrLst meth="repeat">
+      <a:schemeClr val="lt1"/>
+    </dgm:linClrLst>
+    <dgm:effectClrLst/>
+    <dgm:txLinClrLst/>
+    <dgm:txFillClrLst/>
+    <dgm:txEffectClrLst/>
+  </dgm:styleLbl>
+  <dgm:styleLbl name="parChTrans2D1">
+    <dgm:fillClrLst meth="repeat">
+      <a:schemeClr val="accent1">
+        <a:tint val="60000"/>
+      </a:schemeClr>
+    </dgm:fillClrLst>
+    <dgm:linClrLst meth="repeat">
+      <a:schemeClr val="accent1">
+        <a:tint val="60000"/>
+      </a:schemeClr>
+    </dgm:linClrLst>
+    <dgm:effectClrLst/>
+    <dgm:txLinClrLst/>
+    <dgm:txFillClrLst meth="repeat">
+      <a:schemeClr val="lt1"/>
+    </dgm:txFillClrLst>
+    <dgm:txEffectClrLst/>
+  </dgm:styleLbl>
+  <dgm:styleLbl name="parChTrans2D2">
+    <dgm:fillClrLst meth="repeat">
+      <a:schemeClr val="accent1"/>
+    </dgm:fillClrLst>
+    <dgm:linClrLst meth="repeat">
+      <a:schemeClr val="accent1"/>
+    </dgm:linClrLst>
+    <dgm:effectClrLst/>
+    <dgm:txLinClrLst/>
+    <dgm:txFillClrLst meth="repeat">
+      <a:schemeClr val="lt1"/>
+    </dgm:txFillClrLst>
+    <dgm:txEffectClrLst/>
+  </dgm:styleLbl>
+  <dgm:styleLbl name="parChTrans2D3">
+    <dgm:fillClrLst meth="repeat">
+      <a:schemeClr val="accent1"/>
+    </dgm:fillClrLst>
+    <dgm:linClrLst meth="repeat">
+      <a:schemeClr val="accent1"/>
+    </dgm:linClrLst>
+    <dgm:effectClrLst/>
+    <dgm:txLinClrLst/>
+    <dgm:txFillClrLst meth="repeat">
+      <a:schemeClr val="lt1"/>
+    </dgm:txFillClrLst>
+    <dgm:txEffectClrLst/>
+  </dgm:styleLbl>
+  <dgm:styleLbl name="parChTrans2D4">
+    <dgm:fillClrLst meth="repeat">
+      <a:schemeClr val="accent1"/>
+    </dgm:fillClrLst>
+    <dgm:linClrLst meth="repeat">
+      <a:schemeClr val="accent1"/>
+    </dgm:linClrLst>
+    <dgm:effectClrLst/>
+    <dgm:txLinClrLst/>
+    <dgm:txFillClrLst meth="repeat">
+      <a:schemeClr val="lt1"/>
+    </dgm:txFillClrLst>
+    <dgm:txEffectClrLst/>
+  </dgm:styleLbl>
+  <dgm:styleLbl name="parChTrans1D1">
+    <dgm:fillClrLst meth="repeat">
+      <a:schemeClr val="accent1"/>
+    </dgm:fillClrLst>
+    <dgm:linClrLst meth="repeat">
+      <a:schemeClr val="accent1">
+        <a:shade val="60000"/>
+      </a:schemeClr>
+    </dgm:linClrLst>
+    <dgm:effectClrLst/>
+    <dgm:txLinClrLst/>
+    <dgm:txFillClrLst meth="repeat">
+      <a:schemeClr val="tx1"/>
+    </dgm:txFillClrLst>
+    <dgm:txEffectClrLst/>
+  </dgm:styleLbl>
+  <dgm:styleLbl name="parChTrans1D2">
+    <dgm:fillClrLst meth="repeat">
+      <a:schemeClr val="accent1"/>
+    </dgm:fillClrLst>
+    <dgm:linClrLst meth="repeat">
+      <a:schemeClr val="accent1">
+        <a:shade val="60000"/>
+      </a:schemeClr>
+    </dgm:linClrLst>
+    <dgm:effectClrLst/>
+    <dgm:txLinClrLst/>
+    <dgm:txFillClrLst meth="repeat">
+      <a:schemeClr val="tx1"/>
+    </dgm:txFillClrLst>
+    <dgm:txEffectClrLst/>
+  </dgm:styleLbl>
+  <dgm:styleLbl name="parChTrans1D3">
+    <dgm:fillClrLst meth="repeat">
+      <a:schemeClr val="accent1"/>
+    </dgm:fillClrLst>
+    <dgm:linClrLst meth="repeat">
+      <a:schemeClr val="accent1">
+        <a:shade val="80000"/>
+      </a:schemeClr>
+    </dgm:linClrLst>
+    <dgm:effectClrLst/>
+    <dgm:txLinClrLst/>
+    <dgm:txFillClrLst meth="repeat">
+      <a:schemeClr val="tx1"/>
+    </dgm:txFillClrLst>
+    <dgm:txEffectClrLst/>
+  </dgm:styleLbl>
+  <dgm:styleLbl name="parChTrans1D4">
+    <dgm:fillClrLst meth="repeat">
+      <a:schemeClr val="accent1"/>
+    </dgm:fillClrLst>
+    <dgm:linClrLst meth="repeat">
+      <a:schemeClr val="accent1">
+        <a:shade val="80000"/>
+      </a:schemeClr>
+    </dgm:linClrLst>
+    <dgm:effectClrLst/>
+    <dgm:txLinClrLst/>
+    <dgm:txFillClrLst meth="repeat">
+      <a:schemeClr val="tx1"/>
+    </dgm:txFillClrLst>
+    <dgm:txEffectClrLst/>
+  </dgm:styleLbl>
+  <dgm:styleLbl name="fgAcc1">
+    <dgm:fillClrLst meth="repeat">
+      <a:schemeClr val="lt1">
+        <a:alpha val="90000"/>
+      </a:schemeClr>
+    </dgm:fillClrLst>
+    <dgm:linClrLst meth="repeat">
+      <a:schemeClr val="accent1"/>
+    </dgm:linClrLst>
+    <dgm:effectClrLst/>
+    <dgm:txLinClrLst/>
+    <dgm:txFillClrLst meth="repeat">
+      <a:schemeClr val="dk1"/>
+    </dgm:txFillClrLst>
+    <dgm:txEffectClrLst/>
+  </dgm:styleLbl>
+  <dgm:styleLbl name="conFgAcc1">
+    <dgm:fillClrLst meth="repeat">
+      <a:schemeClr val="lt1">
+        <a:alpha val="90000"/>
+      </a:schemeClr>
+    </dgm:fillClrLst>
+    <dgm:linClrLst meth="repeat">
+      <a:schemeClr val="accent1"/>
+    </dgm:linClrLst>
+    <dgm:effectClrLst/>
+    <dgm:txLinClrLst/>
+    <dgm:txFillClrLst meth="repeat">
+      <a:schemeClr val="dk1"/>
+    </dgm:txFillClrLst>
+    <dgm:txEffectClrLst/>
+  </dgm:styleLbl>
+  <dgm:styleLbl name="alignAcc1">
+    <dgm:fillClrLst meth="repeat">
+      <a:schemeClr val="lt1">
+        <a:alpha val="90000"/>
+      </a:schemeClr>
+    </dgm:fillClrLst>
+    <dgm:linClrLst meth="repeat">
+      <a:schemeClr val="accent1"/>
+    </dgm:linClrLst>
+    <dgm:effectClrLst/>
+    <dgm:txLinClrLst/>
+    <dgm:txFillClrLst meth="repeat">
+      <a:schemeClr val="dk1"/>
+    </dgm:txFillClrLst>
+    <dgm:txEffectClrLst/>
+  </dgm:styleLbl>
+  <dgm:styleLbl name="trAlignAcc1">
+    <dgm:fillClrLst meth="repeat">
+      <a:schemeClr val="lt1">
+        <a:alpha val="40000"/>
+      </a:schemeClr>
+    </dgm:fillClrLst>
+    <dgm:linClrLst meth="repeat">
+      <a:schemeClr val="accent1"/>
+    </dgm:linClrLst>
+    <dgm:effectClrLst/>
+    <dgm:txLinClrLst/>
+    <dgm:txFillClrLst meth="repeat">
+      <a:schemeClr val="dk1"/>
+    </dgm:txFillClrLst>
+    <dgm:txEffectClrLst/>
+  </dgm:styleLbl>
+  <dgm:styleLbl name="bgAcc1">
+    <dgm:fillClrLst meth="repeat">
+      <a:schemeClr val="lt1">
+        <a:alpha val="90000"/>
+      </a:schemeClr>
+    </dgm:fillClrLst>
+    <dgm:linClrLst meth="repeat">
+      <a:schemeClr val="accent1"/>
+    </dgm:linClrLst>
+    <dgm:effectClrLst/>
+    <dgm:txLinClrLst/>
+    <dgm:txFillClrLst meth="repeat">
+      <a:schemeClr val="dk1"/>
+    </dgm:txFillClrLst>
+    <dgm:txEffectClrLst/>
+  </dgm:styleLbl>
+  <dgm:styleLbl name="solidFgAcc1">
+    <dgm:fillClrLst meth="repeat">
+      <a:schemeClr val="lt1"/>
+    </dgm:fillClrLst>
+    <dgm:linClrLst meth="repeat">
+      <a:schemeClr val="accent1"/>
+    </dgm:linClrLst>
+    <dgm:effectClrLst/>
+    <dgm:txLinClrLst/>
+    <dgm:txFillClrLst meth="repeat">
+      <a:schemeClr val="dk1"/>
+    </dgm:txFillClrLst>
+    <dgm:txEffectClrLst/>
+  </dgm:styleLbl>
+  <dgm:styleLbl name="solidAlignAcc1">
+    <dgm:fillClrLst meth="repeat">
+      <a:schemeClr val="lt1"/>
+    </dgm:fillClrLst>
+    <dgm:linClrLst meth="repeat">
+      <a:schemeClr val="accent1"/>
+    </dgm:linClrLst>
+    <dgm:effectClrLst/>
+    <dgm:txLinClrLst/>
+    <dgm:txFillClrLst meth="repeat">
+      <a:schemeClr val="dk1"/>
+    </dgm:txFillClrLst>
+    <dgm:txEffectClrLst/>
+  </dgm:styleLbl>
+  <dgm:styleLbl name="solidBgAcc1">
+    <dgm:fillClrLst meth="repeat">
+      <a:schemeClr val="lt1"/>
+    </dgm:fillClrLst>
+    <dgm:linClrLst meth="repeat">
+      <a:schemeClr val="accent1"/>
+    </dgm:linClrLst>
+    <dgm:effectClrLst/>
+    <dgm:txLinClrLst/>
+    <dgm:txFillClrLst meth="repeat">
+      <a:schemeClr val="dk1"/>
+    </dgm:txFillClrLst>
+    <dgm:txEffectClrLst/>
+  </dgm:styleLbl>
+  <dgm:styleLbl name="fgAccFollowNode1">
+    <dgm:fillClrLst meth="repeat">
+      <a:schemeClr val="accent1">
+        <a:alpha val="90000"/>
+        <a:tint val="40000"/>
+      </a:schemeClr>
+    </dgm:fillClrLst>
+    <dgm:linClrLst meth="repeat">
+      <a:schemeClr val="accent1">
+        <a:alpha val="90000"/>
+        <a:tint val="40000"/>
+      </a:schemeClr>
+    </dgm:linClrLst>
+    <dgm:effectClrLst/>
+    <dgm:txLinClrLst/>
+    <dgm:txFillClrLst meth="repeat">
+      <a:schemeClr val="dk1"/>
+    </dgm:txFillClrLst>
+    <dgm:txEffectClrLst/>
+  </dgm:styleLbl>
+  <dgm:styleLbl name="alignAccFollowNode1">
+    <dgm:fillClrLst meth="repeat">
+      <a:schemeClr val="accent1">
+        <a:alpha val="90000"/>
+        <a:tint val="40000"/>
+      </a:schemeClr>
+    </dgm:fillClrLst>
+    <dgm:linClrLst meth="repeat">
+      <a:schemeClr val="accent1">
+        <a:alpha val="90000"/>
+        <a:tint val="40000"/>
+      </a:schemeClr>
+    </dgm:linClrLst>
+    <dgm:effectClrLst/>
+    <dgm:txLinClrLst/>
+    <dgm:txFillClrLst meth="repeat">
+      <a:schemeClr val="dk1"/>
+    </dgm:txFillClrLst>
+    <dgm:txEffectClrLst/>
+  </dgm:styleLbl>
+  <dgm:styleLbl name="bgAccFollowNode1">
+    <dgm:fillClrLst meth="repeat">
+      <a:schemeClr val="accent1">
+        <a:alpha val="90000"/>
+        <a:tint val="40000"/>
+      </a:schemeClr>
+    </dgm:fillClrLst>
+    <dgm:linClrLst meth="repeat">
+      <a:schemeClr val="accent1">
+        <a:alpha val="90000"/>
+        <a:tint val="40000"/>
+      </a:schemeClr>
+    </dgm:linClrLst>
+    <dgm:effectClrLst/>
+    <dgm:txLinClrLst/>
+    <dgm:txFillClrLst meth="repeat">
+      <a:schemeClr val="dk1"/>
+    </dgm:txFillClrLst>
+    <dgm:txEffectClrLst/>
+  </dgm:styleLbl>
+  <dgm:styleLbl name="fgAcc0">
+    <dgm:fillClrLst meth="repeat">
+      <a:schemeClr val="lt1">
+        <a:alpha val="90000"/>
+      </a:schemeClr>
+    </dgm:fillClrLst>
+    <dgm:linClrLst meth="repeat">
+      <a:schemeClr val="accent1"/>
+    </dgm:linClrLst>
+    <dgm:effectClrLst/>
+    <dgm:txLinClrLst/>
+    <dgm:txFillClrLst meth="repeat">
+      <a:schemeClr val="dk1"/>
+    </dgm:txFillClrLst>
+    <dgm:txEffectClrLst/>
+  </dgm:styleLbl>
+  <dgm:styleLbl name="fgAcc2">
+    <dgm:fillClrLst meth="repeat">
+      <a:schemeClr val="lt1">
+        <a:alpha val="90000"/>
+      </a:schemeClr>
+    </dgm:fillClrLst>
+    <dgm:linClrLst meth="repeat">
+      <a:schemeClr val="accent1"/>
+    </dgm:linClrLst>
+    <dgm:effectClrLst/>
+    <dgm:txLinClrLst/>
+    <dgm:txFillClrLst meth="repeat">
+      <a:schemeClr val="dk1"/>
+    </dgm:txFillClrLst>
+    <dgm:txEffectClrLst/>
+  </dgm:styleLbl>
+  <dgm:styleLbl name="fgAcc3">
+    <dgm:fillClrLst meth="repeat">
+      <a:schemeClr val="lt1">
+        <a:alpha val="90000"/>
+      </a:schemeClr>
+    </dgm:fillClrLst>
+    <dgm:linClrLst meth="repeat">
+      <a:schemeClr val="accent1"/>
+    </dgm:linClrLst>
+    <dgm:effectClrLst/>
+    <dgm:txLinClrLst/>
+    <dgm:txFillClrLst meth="repeat">
+      <a:schemeClr val="dk1"/>
+    </dgm:txFillClrLst>
+    <dgm:txEffectClrLst/>
+  </dgm:styleLbl>
+  <dgm:styleLbl name="fgAcc4">
+    <dgm:fillClrLst meth="repeat">
+      <a:schemeClr val="lt1">
+        <a:alpha val="90000"/>
+      </a:schemeClr>
+    </dgm:fillClrLst>
+    <dgm:linClrLst meth="repeat">
+      <a:schemeClr val="accent1"/>
+    </dgm:linClrLst>
+    <dgm:effectClrLst/>
+    <dgm:txLinClrLst/>
+    <dgm:txFillClrLst meth="repeat">
+      <a:schemeClr val="dk1"/>
+    </dgm:txFillClrLst>
+    <dgm:txEffectClrLst/>
+  </dgm:styleLbl>
+  <dgm:styleLbl name="bgShp">
+    <dgm:fillClrLst meth="repeat">
+      <a:schemeClr val="accent1">
+        <a:tint val="40000"/>
+      </a:schemeClr>
+    </dgm:fillClrLst>
+    <dgm:linClrLst meth="repeat">
+      <a:schemeClr val="accent1"/>
+    </dgm:linClrLst>
+    <dgm:effectClrLst/>
+    <dgm:txLinClrLst/>
+    <dgm:txFillClrLst meth="repeat">
+      <a:schemeClr val="dk1"/>
+    </dgm:txFillClrLst>
+    <dgm:txEffectClrLst/>
+  </dgm:styleLbl>
+  <dgm:styleLbl name="dkBgShp">
+    <dgm:fillClrLst meth="repeat">
+      <a:schemeClr val="accent1">
+        <a:shade val="80000"/>
+      </a:schemeClr>
+    </dgm:fillClrLst>
+    <dgm:linClrLst meth="repeat">
+      <a:schemeClr val="accent1"/>
+    </dgm:linClrLst>
+    <dgm:effectClrLst/>
+    <dgm:txLinClrLst/>
+    <dgm:txFillClrLst meth="repeat">
+      <a:schemeClr val="lt1"/>
+    </dgm:txFillClrLst>
+    <dgm:txEffectClrLst/>
+  </dgm:styleLbl>
+  <dgm:styleLbl name="trBgShp">
+    <dgm:fillClrLst meth="repeat">
+      <a:schemeClr val="accent1">
+        <a:tint val="50000"/>
+        <a:alpha val="40000"/>
+      </a:schemeClr>
+    </dgm:fillClrLst>
+    <dgm:linClrLst meth="repeat">
+      <a:schemeClr val="accent1"/>
+    </dgm:linClrLst>
+    <dgm:effectClrLst/>
+    <dgm:txLinClrLst/>
+    <dgm:txFillClrLst meth="repeat">
+      <a:schemeClr val="lt1"/>
+    </dgm:txFillClrLst>
+    <dgm:txEffectClrLst/>
+  </dgm:styleLbl>
+  <dgm:styleLbl name="fgShp">
+    <dgm:fillClrLst meth="repeat">
+      <a:schemeClr val="accent1">
+        <a:tint val="60000"/>
+      </a:schemeClr>
+    </dgm:fillClrLst>
+    <dgm:linClrLst meth="repeat">
+      <a:schemeClr val="lt1"/>
+    </dgm:linClrLst>
+    <dgm:effectClrLst/>
+    <dgm:txLinClrLst/>
+    <dgm:txFillClrLst meth="repeat">
+      <a:schemeClr val="dk1"/>
+    </dgm:txFillClrLst>
+    <dgm:txEffectClrLst/>
+  </dgm:styleLbl>
+  <dgm:styleLbl name="revTx">
+    <dgm:fillClrLst meth="repeat">
+      <a:schemeClr val="lt1">
+        <a:alpha val="0"/>
+      </a:schemeClr>
+    </dgm:fillClrLst>
+    <dgm:linClrLst meth="repeat">
+      <a:schemeClr val="dk1">
+        <a:alpha val="0"/>
+      </a:schemeClr>
+    </dgm:linClrLst>
+    <dgm:effectClrLst/>
+    <dgm:txLinClrLst/>
+    <dgm:txFillClrLst meth="repeat">
+      <a:schemeClr val="tx1"/>
+    </dgm:txFillClrLst>
+    <dgm:txEffectClrLst/>
+  </dgm:styleLbl>
+</dgm:colorsDef>
+</file>
+
+<file path=ppt/diagrams/data1.xml><?xml version="1.0" encoding="utf-8"?>
+<dgm:dataModel xmlns:dgm="http://schemas.openxmlformats.org/drawingml/2006/diagram" xmlns:a="http://schemas.openxmlformats.org/drawingml/2006/main">
+  <dgm:ptLst>
+    <dgm:pt modelId="{F7B21DE9-774C-42CB-898D-90F8C767BE4A}" type="doc">
+      <dgm:prSet loTypeId="urn:microsoft.com/office/officeart/2005/8/layout/chevron1" loCatId="process" qsTypeId="urn:microsoft.com/office/officeart/2005/8/quickstyle/simple1" qsCatId="simple" csTypeId="urn:microsoft.com/office/officeart/2005/8/colors/accent1_2" csCatId="accent1" phldr="1"/>
+      <dgm:spPr/>
+    </dgm:pt>
+    <dgm:pt modelId="{7B4BD394-0CB5-42A8-8795-6007BD68BD5E}">
+      <dgm:prSet phldrT="[文本]"/>
+      <dgm:spPr/>
+      <dgm:t>
+        <a:bodyPr/>
+        <a:lstStyle/>
+        <a:p>
+          <a:r>
+            <a:rPr lang="zh-CN" altLang="en-US" b="0" i="0"/>
+            <a:t>架构</a:t>
+          </a:r>
+          <a:endParaRPr lang="zh-CN" altLang="en-US" dirty="0"/>
+        </a:p>
+      </dgm:t>
+    </dgm:pt>
+    <dgm:pt modelId="{79559B38-27D2-4A15-9C81-BF9511EA025F}" type="parTrans" cxnId="{F2A68293-CEE3-416B-A554-12AFA16B881A}">
+      <dgm:prSet/>
+      <dgm:spPr/>
+      <dgm:t>
+        <a:bodyPr/>
+        <a:lstStyle/>
+        <a:p>
+          <a:endParaRPr lang="zh-CN" altLang="en-US"/>
+        </a:p>
+      </dgm:t>
+    </dgm:pt>
+    <dgm:pt modelId="{5122A951-C8A8-4FD5-BB80-2C286853F360}" type="sibTrans" cxnId="{F2A68293-CEE3-416B-A554-12AFA16B881A}">
+      <dgm:prSet/>
+      <dgm:spPr/>
+      <dgm:t>
+        <a:bodyPr/>
+        <a:lstStyle/>
+        <a:p>
+          <a:endParaRPr lang="zh-CN" altLang="en-US"/>
+        </a:p>
+      </dgm:t>
+    </dgm:pt>
+    <dgm:pt modelId="{AC9116F4-F1AF-4688-BD8B-4E5615C6C76C}">
+      <dgm:prSet phldrT="[文本]"/>
+      <dgm:spPr/>
+      <dgm:t>
+        <a:bodyPr/>
+        <a:lstStyle/>
+        <a:p>
+          <a:r>
+            <a:rPr lang="zh-CN" altLang="en-US" b="0" i="0" dirty="0"/>
+            <a:t>角色</a:t>
+          </a:r>
+          <a:endParaRPr lang="zh-CN" altLang="en-US" dirty="0"/>
+        </a:p>
+      </dgm:t>
+    </dgm:pt>
+    <dgm:pt modelId="{149EE4E4-AB9A-4585-B7CD-1D5DE0762BF5}" type="parTrans" cxnId="{AB85F143-A950-47AE-9DCA-EA75205289DF}">
+      <dgm:prSet/>
+      <dgm:spPr/>
+      <dgm:t>
+        <a:bodyPr/>
+        <a:lstStyle/>
+        <a:p>
+          <a:endParaRPr lang="zh-CN" altLang="en-US"/>
+        </a:p>
+      </dgm:t>
+    </dgm:pt>
+    <dgm:pt modelId="{382F1009-0FEF-47B6-B473-E692F9E7672C}" type="sibTrans" cxnId="{AB85F143-A950-47AE-9DCA-EA75205289DF}">
+      <dgm:prSet/>
+      <dgm:spPr/>
+      <dgm:t>
+        <a:bodyPr/>
+        <a:lstStyle/>
+        <a:p>
+          <a:endParaRPr lang="zh-CN" altLang="en-US"/>
+        </a:p>
+      </dgm:t>
+    </dgm:pt>
+    <dgm:pt modelId="{1DA46DA6-176B-4941-B9BE-42E0CF3C8304}">
+      <dgm:prSet phldrT="[文本]"/>
+      <dgm:spPr/>
+      <dgm:t>
+        <a:bodyPr/>
+        <a:lstStyle/>
+        <a:p>
+          <a:r>
+            <a:rPr lang="zh-CN" altLang="en-US" b="0" i="0" dirty="0"/>
+            <a:t>角色之间的关系</a:t>
+          </a:r>
+          <a:endParaRPr lang="zh-CN" altLang="en-US" dirty="0"/>
+        </a:p>
+      </dgm:t>
+    </dgm:pt>
+    <dgm:pt modelId="{D1339E8E-78F7-4DF6-B961-11E444A1B00E}" type="parTrans" cxnId="{0BED3EB5-E8E4-4281-97BB-A889B1982C58}">
+      <dgm:prSet/>
+      <dgm:spPr/>
+      <dgm:t>
+        <a:bodyPr/>
+        <a:lstStyle/>
+        <a:p>
+          <a:endParaRPr lang="zh-CN" altLang="en-US"/>
+        </a:p>
+      </dgm:t>
+    </dgm:pt>
+    <dgm:pt modelId="{DB247524-E12A-488D-AB48-895EE387E391}" type="sibTrans" cxnId="{0BED3EB5-E8E4-4281-97BB-A889B1982C58}">
+      <dgm:prSet/>
+      <dgm:spPr/>
+      <dgm:t>
+        <a:bodyPr/>
+        <a:lstStyle/>
+        <a:p>
+          <a:endParaRPr lang="zh-CN" altLang="en-US"/>
+        </a:p>
+      </dgm:t>
+    </dgm:pt>
+    <dgm:pt modelId="{5F91D832-77D5-495A-8DBA-C24B84DB0E90}">
+      <dgm:prSet phldrT="[文本]"/>
+      <dgm:spPr/>
+      <dgm:t>
+        <a:bodyPr/>
+        <a:lstStyle/>
+        <a:p>
+          <a:r>
+            <a:rPr lang="zh-CN" altLang="en-US" b="0" i="0" dirty="0"/>
+            <a:t>角色承担的职责</a:t>
+          </a:r>
+          <a:endParaRPr lang="zh-CN" altLang="en-US" dirty="0"/>
+        </a:p>
+      </dgm:t>
+    </dgm:pt>
+    <dgm:pt modelId="{4C07B90E-1FD3-49BE-BF1A-9D163209D752}" type="parTrans" cxnId="{33025A3B-F8D0-4297-9748-9378E675F4BB}">
+      <dgm:prSet/>
+      <dgm:spPr/>
+      <dgm:t>
+        <a:bodyPr/>
+        <a:lstStyle/>
+        <a:p>
+          <a:endParaRPr lang="zh-CN" altLang="en-US"/>
+        </a:p>
+      </dgm:t>
+    </dgm:pt>
+    <dgm:pt modelId="{FA9F8B1B-12A5-45F6-AC65-2ABB71311779}" type="sibTrans" cxnId="{33025A3B-F8D0-4297-9748-9378E675F4BB}">
+      <dgm:prSet/>
+      <dgm:spPr/>
+      <dgm:t>
+        <a:bodyPr/>
+        <a:lstStyle/>
+        <a:p>
+          <a:endParaRPr lang="zh-CN" altLang="en-US"/>
+        </a:p>
+      </dgm:t>
+    </dgm:pt>
+    <dgm:pt modelId="{82223557-FAA4-436F-9182-26C50426D982}">
+      <dgm:prSet phldrT="[文本]"/>
+      <dgm:spPr/>
+      <dgm:t>
+        <a:bodyPr/>
+        <a:lstStyle/>
+        <a:p>
+          <a:r>
+            <a:rPr lang="zh-CN" altLang="en-US" b="0" i="0" dirty="0"/>
+            <a:t>履行职责时触发的事件</a:t>
+          </a:r>
+          <a:endParaRPr lang="zh-CN" altLang="en-US" dirty="0"/>
+        </a:p>
+      </dgm:t>
+    </dgm:pt>
+    <dgm:pt modelId="{6229BFE3-536D-4E82-9A39-B45D3978F113}" type="parTrans" cxnId="{915E1415-A019-4F86-899F-5E4017ADFF10}">
+      <dgm:prSet/>
+      <dgm:spPr/>
+      <dgm:t>
+        <a:bodyPr/>
+        <a:lstStyle/>
+        <a:p>
+          <a:endParaRPr lang="zh-CN" altLang="en-US"/>
+        </a:p>
+      </dgm:t>
+    </dgm:pt>
+    <dgm:pt modelId="{42EA4005-D761-4576-AEE1-C7927D0BCDBB}" type="sibTrans" cxnId="{915E1415-A019-4F86-899F-5E4017ADFF10}">
+      <dgm:prSet/>
+      <dgm:spPr/>
+      <dgm:t>
+        <a:bodyPr/>
+        <a:lstStyle/>
+        <a:p>
+          <a:endParaRPr lang="zh-CN" altLang="en-US"/>
+        </a:p>
+      </dgm:t>
+    </dgm:pt>
+    <dgm:pt modelId="{1C598AF1-A120-4D6B-90DF-73E7FCE83F81}" type="pres">
+      <dgm:prSet presAssocID="{F7B21DE9-774C-42CB-898D-90F8C767BE4A}" presName="Name0" presStyleCnt="0">
+        <dgm:presLayoutVars>
+          <dgm:dir/>
+          <dgm:animLvl val="lvl"/>
+          <dgm:resizeHandles val="exact"/>
+        </dgm:presLayoutVars>
+      </dgm:prSet>
+      <dgm:spPr/>
+    </dgm:pt>
+    <dgm:pt modelId="{3C89A16F-C64F-4749-9D03-94121214DD6E}" type="pres">
+      <dgm:prSet presAssocID="{7B4BD394-0CB5-42A8-8795-6007BD68BD5E}" presName="parTxOnly" presStyleLbl="node1" presStyleIdx="0" presStyleCnt="5">
+        <dgm:presLayoutVars>
+          <dgm:chMax val="0"/>
+          <dgm:chPref val="0"/>
+          <dgm:bulletEnabled val="1"/>
+        </dgm:presLayoutVars>
+      </dgm:prSet>
+      <dgm:spPr/>
+    </dgm:pt>
+    <dgm:pt modelId="{37236517-F9F9-4113-BA6C-A87EB9872F3E}" type="pres">
+      <dgm:prSet presAssocID="{5122A951-C8A8-4FD5-BB80-2C286853F360}" presName="parTxOnlySpace" presStyleCnt="0"/>
+      <dgm:spPr/>
+    </dgm:pt>
+    <dgm:pt modelId="{EF98CF2F-3649-43EC-B900-73667C58B788}" type="pres">
+      <dgm:prSet presAssocID="{AC9116F4-F1AF-4688-BD8B-4E5615C6C76C}" presName="parTxOnly" presStyleLbl="node1" presStyleIdx="1" presStyleCnt="5">
+        <dgm:presLayoutVars>
+          <dgm:chMax val="0"/>
+          <dgm:chPref val="0"/>
+          <dgm:bulletEnabled val="1"/>
+        </dgm:presLayoutVars>
+      </dgm:prSet>
+      <dgm:spPr/>
+    </dgm:pt>
+    <dgm:pt modelId="{438940CD-12CC-46D3-91C1-62E962B9934C}" type="pres">
+      <dgm:prSet presAssocID="{382F1009-0FEF-47B6-B473-E692F9E7672C}" presName="parTxOnlySpace" presStyleCnt="0"/>
+      <dgm:spPr/>
+    </dgm:pt>
+    <dgm:pt modelId="{212A8098-6820-478B-9507-9B6EE763A8F7}" type="pres">
+      <dgm:prSet presAssocID="{1DA46DA6-176B-4941-B9BE-42E0CF3C8304}" presName="parTxOnly" presStyleLbl="node1" presStyleIdx="2" presStyleCnt="5">
+        <dgm:presLayoutVars>
+          <dgm:chMax val="0"/>
+          <dgm:chPref val="0"/>
+          <dgm:bulletEnabled val="1"/>
+        </dgm:presLayoutVars>
+      </dgm:prSet>
+      <dgm:spPr/>
+    </dgm:pt>
+    <dgm:pt modelId="{673DE2D1-B286-444D-84FD-210A4FF52B46}" type="pres">
+      <dgm:prSet presAssocID="{DB247524-E12A-488D-AB48-895EE387E391}" presName="parTxOnlySpace" presStyleCnt="0"/>
+      <dgm:spPr/>
+    </dgm:pt>
+    <dgm:pt modelId="{92BAE13D-6371-45CC-9B0A-2D246E4FCD93}" type="pres">
+      <dgm:prSet presAssocID="{5F91D832-77D5-495A-8DBA-C24B84DB0E90}" presName="parTxOnly" presStyleLbl="node1" presStyleIdx="3" presStyleCnt="5">
+        <dgm:presLayoutVars>
+          <dgm:chMax val="0"/>
+          <dgm:chPref val="0"/>
+          <dgm:bulletEnabled val="1"/>
+        </dgm:presLayoutVars>
+      </dgm:prSet>
+      <dgm:spPr/>
+    </dgm:pt>
+    <dgm:pt modelId="{CFE76E81-665E-44C8-BC76-0E74CC8C6933}" type="pres">
+      <dgm:prSet presAssocID="{FA9F8B1B-12A5-45F6-AC65-2ABB71311779}" presName="parTxOnlySpace" presStyleCnt="0"/>
+      <dgm:spPr/>
+    </dgm:pt>
+    <dgm:pt modelId="{F4C1C4F5-3C33-42C1-B008-8EBF2A4DF664}" type="pres">
+      <dgm:prSet presAssocID="{82223557-FAA4-436F-9182-26C50426D982}" presName="parTxOnly" presStyleLbl="node1" presStyleIdx="4" presStyleCnt="5">
+        <dgm:presLayoutVars>
+          <dgm:chMax val="0"/>
+          <dgm:chPref val="0"/>
+          <dgm:bulletEnabled val="1"/>
+        </dgm:presLayoutVars>
+      </dgm:prSet>
+      <dgm:spPr/>
+    </dgm:pt>
+  </dgm:ptLst>
+  <dgm:cxnLst>
+    <dgm:cxn modelId="{915E1415-A019-4F86-899F-5E4017ADFF10}" srcId="{F7B21DE9-774C-42CB-898D-90F8C767BE4A}" destId="{82223557-FAA4-436F-9182-26C50426D982}" srcOrd="4" destOrd="0" parTransId="{6229BFE3-536D-4E82-9A39-B45D3978F113}" sibTransId="{42EA4005-D761-4576-AEE1-C7927D0BCDBB}"/>
+    <dgm:cxn modelId="{3DF7A021-8EA7-4F74-A313-56E5C2191118}" type="presOf" srcId="{7B4BD394-0CB5-42A8-8795-6007BD68BD5E}" destId="{3C89A16F-C64F-4749-9D03-94121214DD6E}" srcOrd="0" destOrd="0" presId="urn:microsoft.com/office/officeart/2005/8/layout/chevron1"/>
+    <dgm:cxn modelId="{71C9A325-C896-4D65-999C-4490D147FE22}" type="presOf" srcId="{AC9116F4-F1AF-4688-BD8B-4E5615C6C76C}" destId="{EF98CF2F-3649-43EC-B900-73667C58B788}" srcOrd="0" destOrd="0" presId="urn:microsoft.com/office/officeart/2005/8/layout/chevron1"/>
+    <dgm:cxn modelId="{33025A3B-F8D0-4297-9748-9378E675F4BB}" srcId="{F7B21DE9-774C-42CB-898D-90F8C767BE4A}" destId="{5F91D832-77D5-495A-8DBA-C24B84DB0E90}" srcOrd="3" destOrd="0" parTransId="{4C07B90E-1FD3-49BE-BF1A-9D163209D752}" sibTransId="{FA9F8B1B-12A5-45F6-AC65-2ABB71311779}"/>
+    <dgm:cxn modelId="{AB85F143-A950-47AE-9DCA-EA75205289DF}" srcId="{F7B21DE9-774C-42CB-898D-90F8C767BE4A}" destId="{AC9116F4-F1AF-4688-BD8B-4E5615C6C76C}" srcOrd="1" destOrd="0" parTransId="{149EE4E4-AB9A-4585-B7CD-1D5DE0762BF5}" sibTransId="{382F1009-0FEF-47B6-B473-E692F9E7672C}"/>
+    <dgm:cxn modelId="{36BCA268-5CB9-47EF-BCC6-137CB077B3C7}" type="presOf" srcId="{82223557-FAA4-436F-9182-26C50426D982}" destId="{F4C1C4F5-3C33-42C1-B008-8EBF2A4DF664}" srcOrd="0" destOrd="0" presId="urn:microsoft.com/office/officeart/2005/8/layout/chevron1"/>
+    <dgm:cxn modelId="{93E44274-D14E-4D8E-B415-724CACA557AB}" type="presOf" srcId="{5F91D832-77D5-495A-8DBA-C24B84DB0E90}" destId="{92BAE13D-6371-45CC-9B0A-2D246E4FCD93}" srcOrd="0" destOrd="0" presId="urn:microsoft.com/office/officeart/2005/8/layout/chevron1"/>
+    <dgm:cxn modelId="{F2A68293-CEE3-416B-A554-12AFA16B881A}" srcId="{F7B21DE9-774C-42CB-898D-90F8C767BE4A}" destId="{7B4BD394-0CB5-42A8-8795-6007BD68BD5E}" srcOrd="0" destOrd="0" parTransId="{79559B38-27D2-4A15-9C81-BF9511EA025F}" sibTransId="{5122A951-C8A8-4FD5-BB80-2C286853F360}"/>
+    <dgm:cxn modelId="{0BED3EB5-E8E4-4281-97BB-A889B1982C58}" srcId="{F7B21DE9-774C-42CB-898D-90F8C767BE4A}" destId="{1DA46DA6-176B-4941-B9BE-42E0CF3C8304}" srcOrd="2" destOrd="0" parTransId="{D1339E8E-78F7-4DF6-B961-11E444A1B00E}" sibTransId="{DB247524-E12A-488D-AB48-895EE387E391}"/>
+    <dgm:cxn modelId="{BADED0E9-5C9A-40F3-8A56-F6A06813FE1B}" type="presOf" srcId="{1DA46DA6-176B-4941-B9BE-42E0CF3C8304}" destId="{212A8098-6820-478B-9507-9B6EE763A8F7}" srcOrd="0" destOrd="0" presId="urn:microsoft.com/office/officeart/2005/8/layout/chevron1"/>
+    <dgm:cxn modelId="{DBA558F0-BCFC-4AF9-B5AF-DDEE2E3E218A}" type="presOf" srcId="{F7B21DE9-774C-42CB-898D-90F8C767BE4A}" destId="{1C598AF1-A120-4D6B-90DF-73E7FCE83F81}" srcOrd="0" destOrd="0" presId="urn:microsoft.com/office/officeart/2005/8/layout/chevron1"/>
+    <dgm:cxn modelId="{20EE739F-F15D-48DA-BA8D-D65C95E6FEF8}" type="presParOf" srcId="{1C598AF1-A120-4D6B-90DF-73E7FCE83F81}" destId="{3C89A16F-C64F-4749-9D03-94121214DD6E}" srcOrd="0" destOrd="0" presId="urn:microsoft.com/office/officeart/2005/8/layout/chevron1"/>
+    <dgm:cxn modelId="{F65827C7-C8E1-4E56-BFCD-43F74955AB1B}" type="presParOf" srcId="{1C598AF1-A120-4D6B-90DF-73E7FCE83F81}" destId="{37236517-F9F9-4113-BA6C-A87EB9872F3E}" srcOrd="1" destOrd="0" presId="urn:microsoft.com/office/officeart/2005/8/layout/chevron1"/>
+    <dgm:cxn modelId="{C77C894E-32C5-46DC-AD52-332B9691CD3A}" type="presParOf" srcId="{1C598AF1-A120-4D6B-90DF-73E7FCE83F81}" destId="{EF98CF2F-3649-43EC-B900-73667C58B788}" srcOrd="2" destOrd="0" presId="urn:microsoft.com/office/officeart/2005/8/layout/chevron1"/>
+    <dgm:cxn modelId="{9AE83306-BD6F-4CA1-A64B-4A675D215DA7}" type="presParOf" srcId="{1C598AF1-A120-4D6B-90DF-73E7FCE83F81}" destId="{438940CD-12CC-46D3-91C1-62E962B9934C}" srcOrd="3" destOrd="0" presId="urn:microsoft.com/office/officeart/2005/8/layout/chevron1"/>
+    <dgm:cxn modelId="{C1CD2A7A-4D7B-4957-9EFB-E2291B8023B4}" type="presParOf" srcId="{1C598AF1-A120-4D6B-90DF-73E7FCE83F81}" destId="{212A8098-6820-478B-9507-9B6EE763A8F7}" srcOrd="4" destOrd="0" presId="urn:microsoft.com/office/officeart/2005/8/layout/chevron1"/>
+    <dgm:cxn modelId="{1E9CCC8D-0446-49DB-8145-13741725900A}" type="presParOf" srcId="{1C598AF1-A120-4D6B-90DF-73E7FCE83F81}" destId="{673DE2D1-B286-444D-84FD-210A4FF52B46}" srcOrd="5" destOrd="0" presId="urn:microsoft.com/office/officeart/2005/8/layout/chevron1"/>
+    <dgm:cxn modelId="{21DAEF8D-1D3A-44D5-B1CE-E075CC7A0064}" type="presParOf" srcId="{1C598AF1-A120-4D6B-90DF-73E7FCE83F81}" destId="{92BAE13D-6371-45CC-9B0A-2D246E4FCD93}" srcOrd="6" destOrd="0" presId="urn:microsoft.com/office/officeart/2005/8/layout/chevron1"/>
+    <dgm:cxn modelId="{1525D412-A1E0-4FE4-B032-837632A74512}" type="presParOf" srcId="{1C598AF1-A120-4D6B-90DF-73E7FCE83F81}" destId="{CFE76E81-665E-44C8-BC76-0E74CC8C6933}" srcOrd="7" destOrd="0" presId="urn:microsoft.com/office/officeart/2005/8/layout/chevron1"/>
+    <dgm:cxn modelId="{B620F6D6-D014-4548-87EC-6B44B575E98B}" type="presParOf" srcId="{1C598AF1-A120-4D6B-90DF-73E7FCE83F81}" destId="{F4C1C4F5-3C33-42C1-B008-8EBF2A4DF664}" srcOrd="8" destOrd="0" presId="urn:microsoft.com/office/officeart/2005/8/layout/chevron1"/>
+  </dgm:cxnLst>
+  <dgm:bg/>
+  <dgm:whole/>
+  <dgm:extLst>
+    <a:ext uri="http://schemas.microsoft.com/office/drawing/2008/diagram">
+      <dsp:dataModelExt xmlns:dsp="http://schemas.microsoft.com/office/drawing/2008/diagram" relId="rId6" minVer="http://schemas.openxmlformats.org/drawingml/2006/diagram"/>
+    </a:ext>
+  </dgm:extLst>
+</dgm:dataModel>
+</file>
+
+<file path=ppt/diagrams/drawing1.xml><?xml version="1.0" encoding="utf-8"?>
+<dsp:drawing xmlns:dgm="http://schemas.openxmlformats.org/drawingml/2006/diagram" xmlns:dsp="http://schemas.microsoft.com/office/drawing/2008/diagram" xmlns:a="http://schemas.openxmlformats.org/drawingml/2006/main">
+  <dsp:spTree>
+    <dsp:nvGrpSpPr>
+      <dsp:cNvPr id="0" name=""/>
+      <dsp:cNvGrpSpPr/>
+    </dsp:nvGrpSpPr>
+    <dsp:grpSpPr/>
+    <dsp:sp modelId="{3C89A16F-C64F-4749-9D03-94121214DD6E}">
+      <dsp:nvSpPr>
+        <dsp:cNvPr id="0" name=""/>
+        <dsp:cNvSpPr/>
+      </dsp:nvSpPr>
+      <dsp:spPr>
+        <a:xfrm>
+          <a:off x="1984" y="128809"/>
+          <a:ext cx="1766093" cy="706437"/>
+        </a:xfrm>
+        <a:prstGeom prst="chevron">
+          <a:avLst/>
+        </a:prstGeom>
+        <a:solidFill>
+          <a:schemeClr val="accent1">
+            <a:hueOff val="0"/>
+            <a:satOff val="0"/>
+            <a:lumOff val="0"/>
+            <a:alphaOff val="0"/>
+          </a:schemeClr>
+        </a:solidFill>
+        <a:ln w="12700" cap="flat" cmpd="sng" algn="ctr">
+          <a:solidFill>
+            <a:schemeClr val="lt1">
+              <a:hueOff val="0"/>
+              <a:satOff val="0"/>
+              <a:lumOff val="0"/>
+              <a:alphaOff val="0"/>
+            </a:schemeClr>
+          </a:solidFill>
+          <a:prstDash val="solid"/>
+          <a:miter lim="800000"/>
+        </a:ln>
+        <a:effectLst/>
+      </dsp:spPr>
+      <dsp:style>
+        <a:lnRef idx="2">
+          <a:scrgbClr r="0" g="0" b="0"/>
+        </a:lnRef>
+        <a:fillRef idx="1">
+          <a:scrgbClr r="0" g="0" b="0"/>
+        </a:fillRef>
+        <a:effectRef idx="0">
+          <a:scrgbClr r="0" g="0" b="0"/>
+        </a:effectRef>
+        <a:fontRef idx="minor">
+          <a:schemeClr val="lt1"/>
+        </a:fontRef>
+      </dsp:style>
+      <dsp:txBody>
+        <a:bodyPr spcFirstLastPara="0" vert="horz" wrap="square" lIns="60008" tIns="20003" rIns="20003" bIns="20003" numCol="1" spcCol="1270" anchor="ctr" anchorCtr="0">
+          <a:noAutofit/>
+        </a:bodyPr>
+        <a:lstStyle/>
+        <a:p>
+          <a:pPr marL="0" lvl="0" indent="0" algn="ctr" defTabSz="666750">
+            <a:lnSpc>
+              <a:spcPct val="90000"/>
+            </a:lnSpc>
+            <a:spcBef>
+              <a:spcPct val="0"/>
+            </a:spcBef>
+            <a:spcAft>
+              <a:spcPct val="35000"/>
+            </a:spcAft>
+            <a:buNone/>
+          </a:pPr>
+          <a:r>
+            <a:rPr lang="zh-CN" altLang="en-US" sz="1500" b="0" i="0" kern="1200"/>
+            <a:t>架构</a:t>
+          </a:r>
+          <a:endParaRPr lang="zh-CN" altLang="en-US" sz="1500" kern="1200" dirty="0"/>
+        </a:p>
+      </dsp:txBody>
+      <dsp:txXfrm>
+        <a:off x="355203" y="128809"/>
+        <a:ext cx="1059656" cy="706437"/>
+      </dsp:txXfrm>
+    </dsp:sp>
+    <dsp:sp modelId="{EF98CF2F-3649-43EC-B900-73667C58B788}">
+      <dsp:nvSpPr>
+        <dsp:cNvPr id="0" name=""/>
+        <dsp:cNvSpPr/>
+      </dsp:nvSpPr>
+      <dsp:spPr>
+        <a:xfrm>
+          <a:off x="1591468" y="128809"/>
+          <a:ext cx="1766093" cy="706437"/>
+        </a:xfrm>
+        <a:prstGeom prst="chevron">
+          <a:avLst/>
+        </a:prstGeom>
+        <a:solidFill>
+          <a:schemeClr val="accent1">
+            <a:hueOff val="0"/>
+            <a:satOff val="0"/>
+            <a:lumOff val="0"/>
+            <a:alphaOff val="0"/>
+          </a:schemeClr>
+        </a:solidFill>
+        <a:ln w="12700" cap="flat" cmpd="sng" algn="ctr">
+          <a:solidFill>
+            <a:schemeClr val="lt1">
+              <a:hueOff val="0"/>
+              <a:satOff val="0"/>
+              <a:lumOff val="0"/>
+              <a:alphaOff val="0"/>
+            </a:schemeClr>
+          </a:solidFill>
+          <a:prstDash val="solid"/>
+          <a:miter lim="800000"/>
+        </a:ln>
+        <a:effectLst/>
+      </dsp:spPr>
+      <dsp:style>
+        <a:lnRef idx="2">
+          <a:scrgbClr r="0" g="0" b="0"/>
+        </a:lnRef>
+        <a:fillRef idx="1">
+          <a:scrgbClr r="0" g="0" b="0"/>
+        </a:fillRef>
+        <a:effectRef idx="0">
+          <a:scrgbClr r="0" g="0" b="0"/>
+        </a:effectRef>
+        <a:fontRef idx="minor">
+          <a:schemeClr val="lt1"/>
+        </a:fontRef>
+      </dsp:style>
+      <dsp:txBody>
+        <a:bodyPr spcFirstLastPara="0" vert="horz" wrap="square" lIns="60008" tIns="20003" rIns="20003" bIns="20003" numCol="1" spcCol="1270" anchor="ctr" anchorCtr="0">
+          <a:noAutofit/>
+        </a:bodyPr>
+        <a:lstStyle/>
+        <a:p>
+          <a:pPr marL="0" lvl="0" indent="0" algn="ctr" defTabSz="666750">
+            <a:lnSpc>
+              <a:spcPct val="90000"/>
+            </a:lnSpc>
+            <a:spcBef>
+              <a:spcPct val="0"/>
+            </a:spcBef>
+            <a:spcAft>
+              <a:spcPct val="35000"/>
+            </a:spcAft>
+            <a:buNone/>
+          </a:pPr>
+          <a:r>
+            <a:rPr lang="zh-CN" altLang="en-US" sz="1500" b="0" i="0" kern="1200" dirty="0"/>
+            <a:t>角色</a:t>
+          </a:r>
+          <a:endParaRPr lang="zh-CN" altLang="en-US" sz="1500" kern="1200" dirty="0"/>
+        </a:p>
+      </dsp:txBody>
+      <dsp:txXfrm>
+        <a:off x="1944687" y="128809"/>
+        <a:ext cx="1059656" cy="706437"/>
+      </dsp:txXfrm>
+    </dsp:sp>
+    <dsp:sp modelId="{212A8098-6820-478B-9507-9B6EE763A8F7}">
+      <dsp:nvSpPr>
+        <dsp:cNvPr id="0" name=""/>
+        <dsp:cNvSpPr/>
+      </dsp:nvSpPr>
+      <dsp:spPr>
+        <a:xfrm>
+          <a:off x="3180953" y="128809"/>
+          <a:ext cx="1766093" cy="706437"/>
+        </a:xfrm>
+        <a:prstGeom prst="chevron">
+          <a:avLst/>
+        </a:prstGeom>
+        <a:solidFill>
+          <a:schemeClr val="accent1">
+            <a:hueOff val="0"/>
+            <a:satOff val="0"/>
+            <a:lumOff val="0"/>
+            <a:alphaOff val="0"/>
+          </a:schemeClr>
+        </a:solidFill>
+        <a:ln w="12700" cap="flat" cmpd="sng" algn="ctr">
+          <a:solidFill>
+            <a:schemeClr val="lt1">
+              <a:hueOff val="0"/>
+              <a:satOff val="0"/>
+              <a:lumOff val="0"/>
+              <a:alphaOff val="0"/>
+            </a:schemeClr>
+          </a:solidFill>
+          <a:prstDash val="solid"/>
+          <a:miter lim="800000"/>
+        </a:ln>
+        <a:effectLst/>
+      </dsp:spPr>
+      <dsp:style>
+        <a:lnRef idx="2">
+          <a:scrgbClr r="0" g="0" b="0"/>
+        </a:lnRef>
+        <a:fillRef idx="1">
+          <a:scrgbClr r="0" g="0" b="0"/>
+        </a:fillRef>
+        <a:effectRef idx="0">
+          <a:scrgbClr r="0" g="0" b="0"/>
+        </a:effectRef>
+        <a:fontRef idx="minor">
+          <a:schemeClr val="lt1"/>
+        </a:fontRef>
+      </dsp:style>
+      <dsp:txBody>
+        <a:bodyPr spcFirstLastPara="0" vert="horz" wrap="square" lIns="60008" tIns="20003" rIns="20003" bIns="20003" numCol="1" spcCol="1270" anchor="ctr" anchorCtr="0">
+          <a:noAutofit/>
+        </a:bodyPr>
+        <a:lstStyle/>
+        <a:p>
+          <a:pPr marL="0" lvl="0" indent="0" algn="ctr" defTabSz="666750">
+            <a:lnSpc>
+              <a:spcPct val="90000"/>
+            </a:lnSpc>
+            <a:spcBef>
+              <a:spcPct val="0"/>
+            </a:spcBef>
+            <a:spcAft>
+              <a:spcPct val="35000"/>
+            </a:spcAft>
+            <a:buNone/>
+          </a:pPr>
+          <a:r>
+            <a:rPr lang="zh-CN" altLang="en-US" sz="1500" b="0" i="0" kern="1200" dirty="0"/>
+            <a:t>角色之间的关系</a:t>
+          </a:r>
+          <a:endParaRPr lang="zh-CN" altLang="en-US" sz="1500" kern="1200" dirty="0"/>
+        </a:p>
+      </dsp:txBody>
+      <dsp:txXfrm>
+        <a:off x="3534172" y="128809"/>
+        <a:ext cx="1059656" cy="706437"/>
+      </dsp:txXfrm>
+    </dsp:sp>
+    <dsp:sp modelId="{92BAE13D-6371-45CC-9B0A-2D246E4FCD93}">
+      <dsp:nvSpPr>
+        <dsp:cNvPr id="0" name=""/>
+        <dsp:cNvSpPr/>
+      </dsp:nvSpPr>
+      <dsp:spPr>
+        <a:xfrm>
+          <a:off x="4770437" y="128809"/>
+          <a:ext cx="1766093" cy="706437"/>
+        </a:xfrm>
+        <a:prstGeom prst="chevron">
+          <a:avLst/>
+        </a:prstGeom>
+        <a:solidFill>
+          <a:schemeClr val="accent1">
+            <a:hueOff val="0"/>
+            <a:satOff val="0"/>
+            <a:lumOff val="0"/>
+            <a:alphaOff val="0"/>
+          </a:schemeClr>
+        </a:solidFill>
+        <a:ln w="12700" cap="flat" cmpd="sng" algn="ctr">
+          <a:solidFill>
+            <a:schemeClr val="lt1">
+              <a:hueOff val="0"/>
+              <a:satOff val="0"/>
+              <a:lumOff val="0"/>
+              <a:alphaOff val="0"/>
+            </a:schemeClr>
+          </a:solidFill>
+          <a:prstDash val="solid"/>
+          <a:miter lim="800000"/>
+        </a:ln>
+        <a:effectLst/>
+      </dsp:spPr>
+      <dsp:style>
+        <a:lnRef idx="2">
+          <a:scrgbClr r="0" g="0" b="0"/>
+        </a:lnRef>
+        <a:fillRef idx="1">
+          <a:scrgbClr r="0" g="0" b="0"/>
+        </a:fillRef>
+        <a:effectRef idx="0">
+          <a:scrgbClr r="0" g="0" b="0"/>
+        </a:effectRef>
+        <a:fontRef idx="minor">
+          <a:schemeClr val="lt1"/>
+        </a:fontRef>
+      </dsp:style>
+      <dsp:txBody>
+        <a:bodyPr spcFirstLastPara="0" vert="horz" wrap="square" lIns="60008" tIns="20003" rIns="20003" bIns="20003" numCol="1" spcCol="1270" anchor="ctr" anchorCtr="0">
+          <a:noAutofit/>
+        </a:bodyPr>
+        <a:lstStyle/>
+        <a:p>
+          <a:pPr marL="0" lvl="0" indent="0" algn="ctr" defTabSz="666750">
+            <a:lnSpc>
+              <a:spcPct val="90000"/>
+            </a:lnSpc>
+            <a:spcBef>
+              <a:spcPct val="0"/>
+            </a:spcBef>
+            <a:spcAft>
+              <a:spcPct val="35000"/>
+            </a:spcAft>
+            <a:buNone/>
+          </a:pPr>
+          <a:r>
+            <a:rPr lang="zh-CN" altLang="en-US" sz="1500" b="0" i="0" kern="1200" dirty="0"/>
+            <a:t>角色承担的职责</a:t>
+          </a:r>
+          <a:endParaRPr lang="zh-CN" altLang="en-US" sz="1500" kern="1200" dirty="0"/>
+        </a:p>
+      </dsp:txBody>
+      <dsp:txXfrm>
+        <a:off x="5123656" y="128809"/>
+        <a:ext cx="1059656" cy="706437"/>
+      </dsp:txXfrm>
+    </dsp:sp>
+    <dsp:sp modelId="{F4C1C4F5-3C33-42C1-B008-8EBF2A4DF664}">
+      <dsp:nvSpPr>
+        <dsp:cNvPr id="0" name=""/>
+        <dsp:cNvSpPr/>
+      </dsp:nvSpPr>
+      <dsp:spPr>
+        <a:xfrm>
+          <a:off x="6359921" y="128809"/>
+          <a:ext cx="1766093" cy="706437"/>
+        </a:xfrm>
+        <a:prstGeom prst="chevron">
+          <a:avLst/>
+        </a:prstGeom>
+        <a:solidFill>
+          <a:schemeClr val="accent1">
+            <a:hueOff val="0"/>
+            <a:satOff val="0"/>
+            <a:lumOff val="0"/>
+            <a:alphaOff val="0"/>
+          </a:schemeClr>
+        </a:solidFill>
+        <a:ln w="12700" cap="flat" cmpd="sng" algn="ctr">
+          <a:solidFill>
+            <a:schemeClr val="lt1">
+              <a:hueOff val="0"/>
+              <a:satOff val="0"/>
+              <a:lumOff val="0"/>
+              <a:alphaOff val="0"/>
+            </a:schemeClr>
+          </a:solidFill>
+          <a:prstDash val="solid"/>
+          <a:miter lim="800000"/>
+        </a:ln>
+        <a:effectLst/>
+      </dsp:spPr>
+      <dsp:style>
+        <a:lnRef idx="2">
+          <a:scrgbClr r="0" g="0" b="0"/>
+        </a:lnRef>
+        <a:fillRef idx="1">
+          <a:scrgbClr r="0" g="0" b="0"/>
+        </a:fillRef>
+        <a:effectRef idx="0">
+          <a:scrgbClr r="0" g="0" b="0"/>
+        </a:effectRef>
+        <a:fontRef idx="minor">
+          <a:schemeClr val="lt1"/>
+        </a:fontRef>
+      </dsp:style>
+      <dsp:txBody>
+        <a:bodyPr spcFirstLastPara="0" vert="horz" wrap="square" lIns="60008" tIns="20003" rIns="20003" bIns="20003" numCol="1" spcCol="1270" anchor="ctr" anchorCtr="0">
+          <a:noAutofit/>
+        </a:bodyPr>
+        <a:lstStyle/>
+        <a:p>
+          <a:pPr marL="0" lvl="0" indent="0" algn="ctr" defTabSz="666750">
+            <a:lnSpc>
+              <a:spcPct val="90000"/>
+            </a:lnSpc>
+            <a:spcBef>
+              <a:spcPct val="0"/>
+            </a:spcBef>
+            <a:spcAft>
+              <a:spcPct val="35000"/>
+            </a:spcAft>
+            <a:buNone/>
+          </a:pPr>
+          <a:r>
+            <a:rPr lang="zh-CN" altLang="en-US" sz="1500" b="0" i="0" kern="1200" dirty="0"/>
+            <a:t>履行职责时触发的事件</a:t>
+          </a:r>
+          <a:endParaRPr lang="zh-CN" altLang="en-US" sz="1500" kern="1200" dirty="0"/>
+        </a:p>
+      </dsp:txBody>
+      <dsp:txXfrm>
+        <a:off x="6713140" y="128809"/>
+        <a:ext cx="1059656" cy="706437"/>
+      </dsp:txXfrm>
+    </dsp:sp>
+  </dsp:spTree>
+</dsp:drawing>
+</file>
+
+<file path=ppt/diagrams/layout1.xml><?xml version="1.0" encoding="utf-8"?>
+<dgm:layoutDef xmlns:dgm="http://schemas.openxmlformats.org/drawingml/2006/diagram" xmlns:a="http://schemas.openxmlformats.org/drawingml/2006/main" uniqueId="urn:microsoft.com/office/officeart/2005/8/layout/chevron1">
+  <dgm:title val=""/>
+  <dgm:desc val=""/>
+  <dgm:catLst>
+    <dgm:cat type="process" pri="9000"/>
+  </dgm:catLst>
+  <dgm:sampData useDef="1">
+    <dgm:dataModel>
+      <dgm:ptLst/>
+      <dgm:bg/>
+      <dgm:whole/>
+    </dgm:dataModel>
+  </dgm:sampData>
+  <dgm:styleData>
+    <dgm:dataModel>
+      <dgm:ptLst>
+        <dgm:pt modelId="0" type="doc"/>
+        <dgm:pt modelId="1"/>
+        <dgm:pt modelId="2"/>
+      </dgm:ptLst>
+      <dgm:cxnLst>
+        <dgm:cxn modelId="3" srcId="0" destId="1" srcOrd="0" destOrd="0"/>
+        <dgm:cxn modelId="4" srcId="0" destId="2" srcOrd="1" destOrd="0"/>
+      </dgm:cxnLst>
+      <dgm:bg/>
+      <dgm:whole/>
+    </dgm:dataModel>
+  </dgm:styleData>
+  <dgm:clrData>
+    <dgm:dataModel>
+      <dgm:ptLst>
+        <dgm:pt modelId="0" type="doc"/>
+        <dgm:pt modelId="1"/>
+        <dgm:pt modelId="2"/>
+        <dgm:pt modelId="3"/>
+        <dgm:pt modelId="4"/>
+      </dgm:ptLst>
+      <dgm:cxnLst>
+        <dgm:cxn modelId="5" srcId="0" destId="1" srcOrd="0" destOrd="0"/>
+        <dgm:cxn modelId="6" srcId="0" destId="2" srcOrd="1" destOrd="0"/>
+        <dgm:cxn modelId="7" srcId="0" destId="3" srcOrd="2" destOrd="0"/>
+        <dgm:cxn modelId="8" srcId="0" destId="4" srcOrd="3" destOrd="0"/>
+      </dgm:cxnLst>
+      <dgm:bg/>
+      <dgm:whole/>
+    </dgm:dataModel>
+  </dgm:clrData>
+  <dgm:layoutNode name="Name0">
+    <dgm:varLst>
+      <dgm:dir/>
+      <dgm:animLvl val="lvl"/>
+      <dgm:resizeHandles val="exact"/>
+    </dgm:varLst>
+    <dgm:choose name="Name1">
+      <dgm:if name="Name2" func="var" arg="dir" op="equ" val="norm">
+        <dgm:alg type="lin"/>
+      </dgm:if>
+      <dgm:else name="Name3">
+        <dgm:alg type="lin">
+          <dgm:param type="linDir" val="fromR"/>
+        </dgm:alg>
+      </dgm:else>
+    </dgm:choose>
+    <dgm:shape xmlns:r="http://schemas.openxmlformats.org/officeDocument/2006/relationships" r:blip="">
+      <dgm:adjLst/>
+    </dgm:shape>
+    <dgm:presOf/>
+    <dgm:choose name="Name4">
+      <dgm:if name="Name5" axis="des" func="maxDepth" op="gte" val="2">
+        <dgm:constrLst>
+          <dgm:constr type="h" for="ch" forName="composite" refType="h"/>
+          <dgm:constr type="w" for="ch" forName="composite" refType="w"/>
+          <dgm:constr type="w" for="des" forName="parTx"/>
+          <dgm:constr type="h" for="des" forName="parTx" op="equ"/>
+          <dgm:constr type="w" for="des" forName="desTx"/>
+          <dgm:constr type="h" for="des" forName="desTx" op="equ"/>
+          <dgm:constr type="primFontSz" for="des" forName="parTx" val="65"/>
+          <dgm:constr type="secFontSz" for="des" forName="desTx" refType="primFontSz" refFor="des" refForName="parTx" op="equ"/>
+          <dgm:constr type="h" for="des" forName="parTx" refType="primFontSz" refFor="des" refForName="parTx" fact="1.5"/>
+          <dgm:constr type="h" for="des" forName="desTx" refType="primFontSz" refFor="des" refForName="parTx" fact="0.5"/>
+          <dgm:constr type="w" for="ch" forName="space" op="equ" val="-6"/>
+        </dgm:constrLst>
+        <dgm:ruleLst>
+          <dgm:rule type="w" for="ch" forName="composite" val="0" fact="NaN" max="NaN"/>
+          <dgm:rule type="primFontSz" for="des" forName="parTx" val="5" fact="NaN" max="NaN"/>
+        </dgm:ruleLst>
+        <dgm:forEach name="Name6" axis="ch" ptType="node">
+          <dgm:layoutNode name="composite">
+            <dgm:alg type="composite"/>
+            <dgm:shape xmlns:r="http://schemas.openxmlformats.org/officeDocument/2006/relationships" r:blip="">
+              <dgm:adjLst/>
+            </dgm:shape>
+            <dgm:presOf/>
+            <dgm:choose name="Name7">
+              <dgm:if name="Name8" func="var" arg="dir" op="equ" val="norm">
+                <dgm:constrLst>
+                  <dgm:constr type="l" for="ch" forName="parTx"/>
+                  <dgm:constr type="w" for="ch" forName="parTx" refType="w"/>
+                  <dgm:constr type="t" for="ch" forName="parTx"/>
+                  <dgm:constr type="l" for="ch" forName="desTx"/>
+                  <dgm:constr type="w" for="ch" forName="desTx" refType="w" refFor="ch" refForName="parTx" fact="0.8"/>
+                  <dgm:constr type="t" for="ch" forName="desTx" refType="h" refFor="ch" refForName="parTx" fact="1.125"/>
+                </dgm:constrLst>
+              </dgm:if>
+              <dgm:else name="Name9">
+                <dgm:constrLst>
+                  <dgm:constr type="l" for="ch" forName="parTx"/>
+                  <dgm:constr type="w" for="ch" forName="parTx" refType="w"/>
+                  <dgm:constr type="t" for="ch" forName="parTx"/>
+                  <dgm:constr type="l" for="ch" forName="desTx" refType="w" fact="0.2"/>
+                  <dgm:constr type="w" for="ch" forName="desTx" refType="w" refFor="ch" refForName="parTx" fact="0.8"/>
+                  <dgm:constr type="t" for="ch" forName="desTx" refType="h" refFor="ch" refForName="parTx" fact="1.125"/>
+                </dgm:constrLst>
+              </dgm:else>
+            </dgm:choose>
+            <dgm:ruleLst>
+              <dgm:rule type="h" val="INF" fact="NaN" max="NaN"/>
+            </dgm:ruleLst>
+            <dgm:layoutNode name="parTx">
+              <dgm:varLst>
+                <dgm:chMax val="0"/>
+                <dgm:chPref val="0"/>
+                <dgm:bulletEnabled val="1"/>
+              </dgm:varLst>
+              <dgm:alg type="tx"/>
+              <dgm:choose name="Name10">
+                <dgm:if name="Name11" func="var" arg="dir" op="equ" val="norm">
+                  <dgm:shape xmlns:r="http://schemas.openxmlformats.org/officeDocument/2006/relationships" type="chevron" r:blip="">
+                    <dgm:adjLst/>
+                  </dgm:shape>
+                </dgm:if>
+                <dgm:else name="Name12">
+                  <dgm:shape xmlns:r="http://schemas.openxmlformats.org/officeDocument/2006/relationships" rot="180" type="chevron" r:blip="">
+                    <dgm:adjLst/>
+                  </dgm:shape>
+                </dgm:else>
+              </dgm:choose>
+              <dgm:presOf axis="self" ptType="node"/>
+              <dgm:choose name="Name13">
+                <dgm:if name="Name14" func="var" arg="dir" op="equ" val="norm">
+                  <dgm:constrLst>
+                    <dgm:constr type="h" refType="w" op="lte" fact="0.4"/>
+                    <dgm:constr type="h"/>
+                    <dgm:constr type="tMarg" refType="primFontSz" fact="0.105"/>
+                    <dgm:constr type="bMarg" refType="primFontSz" fact="0.105"/>
+                    <dgm:constr type="lMarg" refType="primFontSz" fact="0.315"/>
+                    <dgm:constr type="rMarg" refType="primFontSz" fact="0.105"/>
+                  </dgm:constrLst>
+                </dgm:if>
+                <dgm:else name="Name15">
+                  <dgm:constrLst>
+                    <dgm:constr type="h" refType="w" op="lte" fact="0.4"/>
+                    <dgm:constr type="h"/>
+                    <dgm:constr type="tMarg" refType="primFontSz" fact="0.105"/>
+                    <dgm:constr type="bMarg" refType="primFontSz" fact="0.105"/>
+                    <dgm:constr type="lMarg" refType="primFontSz" fact="0.105"/>
+                    <dgm:constr type="rMarg" refType="primFontSz" fact="0.315"/>
+                  </dgm:constrLst>
+                </dgm:else>
+              </dgm:choose>
+              <dgm:ruleLst>
+                <dgm:rule type="h" val="INF" fact="NaN" max="NaN"/>
+              </dgm:ruleLst>
+            </dgm:layoutNode>
+            <dgm:layoutNode name="desTx" styleLbl="revTx">
+              <dgm:varLst>
+                <dgm:bulletEnabled val="1"/>
+              </dgm:varLst>
+              <dgm:alg type="tx">
+                <dgm:param type="stBulletLvl" val="1"/>
+              </dgm:alg>
+              <dgm:choose name="Name16">
+                <dgm:if name="Name17" axis="ch" ptType="node" func="cnt" op="gte" val="1">
+                  <dgm:shape xmlns:r="http://schemas.openxmlformats.org/officeDocument/2006/relationships" type="rect" r:blip="">
+                    <dgm:adjLst/>
+                  </dgm:shape>
+                </dgm:if>
+                <dgm:else name="Name18">
+                  <dgm:shape xmlns:r="http://schemas.openxmlformats.org/officeDocument/2006/relationships" type="rect" r:blip="" hideGeom="1">
+                    <dgm:adjLst/>
+                  </dgm:shape>
+                </dgm:else>
+              </dgm:choose>
+              <dgm:presOf axis="des" ptType="node"/>
+              <dgm:constrLst>
+                <dgm:constr type="secFontSz" val="65"/>
+                <dgm:constr type="primFontSz" refType="secFontSz"/>
+                <dgm:constr type="h"/>
+                <dgm:constr type="tMarg"/>
+                <dgm:constr type="bMarg"/>
+                <dgm:constr type="rMarg"/>
+                <dgm:constr type="lMarg"/>
+              </dgm:constrLst>
+              <dgm:ruleLst>
+                <dgm:rule type="h" val="INF" fact="NaN" max="NaN"/>
+              </dgm:ruleLst>
+            </dgm:layoutNode>
+          </dgm:layoutNode>
+          <dgm:forEach name="Name19" axis="followSib" ptType="sibTrans" cnt="1">
+            <dgm:layoutNode name="space">
+              <dgm:alg type="sp"/>
+              <dgm:shape xmlns:r="http://schemas.openxmlformats.org/officeDocument/2006/relationships" r:blip="">
+                <dgm:adjLst/>
+              </dgm:shape>
+              <dgm:presOf/>
+              <dgm:constrLst/>
+              <dgm:ruleLst/>
+            </dgm:layoutNode>
+          </dgm:forEach>
+        </dgm:forEach>
+      </dgm:if>
+      <dgm:else name="Name20">
+        <dgm:constrLst>
+          <dgm:constr type="w" for="ch" forName="parTxOnly" refType="w"/>
+          <dgm:constr type="h" for="des" forName="parTxOnly" op="equ"/>
+          <dgm:constr type="primFontSz" for="des" forName="parTxOnly" op="equ" val="65"/>
+          <dgm:constr type="w" for="ch" forName="parTxOnlySpace" refType="w" refFor="ch" refForName="parTxOnly" fact="-0.1"/>
+        </dgm:constrLst>
+        <dgm:ruleLst/>
+        <dgm:forEach name="Name21" axis="ch" ptType="node">
+          <dgm:layoutNode name="parTxOnly">
+            <dgm:varLst>
+              <dgm:chMax val="0"/>
+              <dgm:chPref val="0"/>
+              <dgm:bulletEnabled val="1"/>
+            </dgm:varLst>
+            <dgm:alg type="tx"/>
+            <dgm:choose name="Name22">
+              <dgm:if name="Name23" func="var" arg="dir" op="equ" val="norm">
+                <dgm:shape xmlns:r="http://schemas.openxmlformats.org/officeDocument/2006/relationships" type="chevron" r:blip="">
+                  <dgm:adjLst/>
+                </dgm:shape>
+              </dgm:if>
+              <dgm:else name="Name24">
+                <dgm:shape xmlns:r="http://schemas.openxmlformats.org/officeDocument/2006/relationships" rot="180" type="chevron" r:blip="">
+                  <dgm:adjLst/>
+                </dgm:shape>
+              </dgm:else>
+            </dgm:choose>
+            <dgm:presOf axis="self" ptType="node"/>
+            <dgm:choose name="Name25">
+              <dgm:if name="Name26" func="var" arg="dir" op="equ" val="norm">
+                <dgm:constrLst>
+                  <dgm:constr type="h" refType="w" op="equ" fact="0.4"/>
+                  <dgm:constr type="tMarg" refType="primFontSz" fact="0.105"/>
+                  <dgm:constr type="bMarg" refType="primFontSz" fact="0.105"/>
+                  <dgm:constr type="lMarg" refType="primFontSz" fact="0.315"/>
+                  <dgm:constr type="rMarg" refType="primFontSz" fact="0.105"/>
+                </dgm:constrLst>
+              </dgm:if>
+              <dgm:else name="Name27">
+                <dgm:constrLst>
+                  <dgm:constr type="h" refType="w" op="equ" fact="0.4"/>
+                  <dgm:constr type="tMarg" refType="primFontSz" fact="0.105"/>
+                  <dgm:constr type="bMarg" refType="primFontSz" fact="0.105"/>
+                  <dgm:constr type="lMarg" refType="primFontSz" fact="0.105"/>
+                  <dgm:constr type="rMarg" refType="primFontSz" fact="0.315"/>
+                </dgm:constrLst>
+              </dgm:else>
+            </dgm:choose>
+            <dgm:ruleLst>
+              <dgm:rule type="primFontSz" val="5" fact="NaN" max="NaN"/>
+            </dgm:ruleLst>
+          </dgm:layoutNode>
+          <dgm:forEach name="Name28" axis="followSib" ptType="sibTrans" cnt="1">
+            <dgm:layoutNode name="parTxOnlySpace">
+              <dgm:alg type="sp"/>
+              <dgm:shape xmlns:r="http://schemas.openxmlformats.org/officeDocument/2006/relationships" r:blip="">
+                <dgm:adjLst/>
+              </dgm:shape>
+              <dgm:presOf/>
+              <dgm:constrLst/>
+              <dgm:ruleLst/>
+            </dgm:layoutNode>
+          </dgm:forEach>
+        </dgm:forEach>
+      </dgm:else>
+    </dgm:choose>
+  </dgm:layoutNode>
+</dgm:layoutDef>
+</file>
+
+<file path=ppt/diagrams/quickStyle1.xml><?xml version="1.0" encoding="utf-8"?>
+<dgm:styleDef xmlns:dgm="http://schemas.openxmlformats.org/drawingml/2006/diagram" xmlns:a="http://schemas.openxmlformats.org/drawingml/2006/main" uniqueId="urn:microsoft.com/office/officeart/2005/8/quickstyle/simple1">
+  <dgm:title val=""/>
+  <dgm:desc val=""/>
+  <dgm:catLst>
+    <dgm:cat type="simple" pri="10100"/>
+  </dgm:catLst>
+  <dgm:scene3d>
+    <a:camera prst="orthographicFront"/>
+    <a:lightRig rig="threePt" dir="t"/>
+  </dgm:scene3d>
+  <dgm:styleLbl name="node0">
+    <dgm:scene3d>
+      <a:camera prst="orthographicFront"/>
+      <a:lightRig rig="threePt" dir="t"/>
+    </dgm:scene3d>
+    <dgm:sp3d/>
+    <dgm:txPr/>
+    <dgm:style>
+      <a:lnRef idx="2">
+        <a:scrgbClr r="0" g="0" b="0"/>
+      </a:lnRef>
+      <a:fillRef idx="1">
+        <a:scrgbClr r="0" g="0" b="0"/>
+      </a:fillRef>
+      <a:effectRef idx="0">
+        <a:scrgbClr r="0" g="0" b="0"/>
+      </a:effectRef>
+      <a:fontRef idx="minor">
+        <a:schemeClr val="lt1"/>
+      </a:fontRef>
+    </dgm:style>
+  </dgm:styleLbl>
+  <dgm:styleLbl name="lnNode1">
+    <dgm:scene3d>
+      <a:camera prst="orthographicFront"/>
+      <a:lightRig rig="threePt" dir="t"/>
+    </dgm:scene3d>
+    <dgm:sp3d/>
+    <dgm:txPr/>
+    <dgm:style>
+      <a:lnRef idx="2">
+        <a:scrgbClr r="0" g="0" b="0"/>
+      </a:lnRef>
+      <a:fillRef idx="1">
+        <a:scrgbClr r="0" g="0" b="0"/>
+      </a:fillRef>
+      <a:effectRef idx="0">
+        <a:scrgbClr r="0" g="0" b="0"/>
+      </a:effectRef>
+      <a:fontRef idx="minor">
+        <a:schemeClr val="lt1"/>
+      </a:fontRef>
+    </dgm:style>
+  </dgm:styleLbl>
+  <dgm:styleLbl name="vennNode1">
+    <dgm:scene3d>
+      <a:camera prst="orthographicFront"/>
+      <a:lightRig rig="threePt" dir="t"/>
+    </dgm:scene3d>
+    <dgm:sp3d/>
+    <dgm:txPr/>
+    <dgm:style>
+      <a:lnRef idx="2">
+        <a:scrgbClr r="0" g="0" b="0"/>
+      </a:lnRef>
+      <a:fillRef idx="1">
+        <a:scrgbClr r="0" g="0" b="0"/>
+      </a:fillRef>
+      <a:effectRef idx="0">
+        <a:scrgbClr r="0" g="0" b="0"/>
+      </a:effectRef>
+      <a:fontRef idx="minor">
+        <a:schemeClr val="tx1"/>
+      </a:fontRef>
+    </dgm:style>
+  </dgm:styleLbl>
+  <dgm:styleLbl name="alignNode1">
+    <dgm:scene3d>
+      <a:camera prst="orthographicFront"/>
+      <a:lightRig rig="threePt" dir="t"/>
+    </dgm:scene3d>
+    <dgm:sp3d/>
+    <dgm:txPr/>
+    <dgm:style>
+      <a:lnRef idx="2">
+        <a:scrgbClr r="0" g="0" b="0"/>
+      </a:lnRef>
+      <a:fillRef idx="1">
+        <a:scrgbClr r="0" g="0" b="0"/>
+      </a:fillRef>
+      <a:effectRef idx="0">
+        <a:scrgbClr r="0" g="0" b="0"/>
+      </a:effectRef>
+      <a:fontRef idx="minor">
+        <a:schemeClr val="lt1"/>
+      </a:fontRef>
+    </dgm:style>
+  </dgm:styleLbl>
+  <dgm:styleLbl name="node1">
+    <dgm:scene3d>
+      <a:camera prst="orthographicFront"/>
+      <a:lightRig rig="threePt" dir="t"/>
+    </dgm:scene3d>
+    <dgm:sp3d/>
+    <dgm:txPr/>
+    <dgm:style>
+      <a:lnRef idx="2">
+        <a:scrgbClr r="0" g="0" b="0"/>
+      </a:lnRef>
+      <a:fillRef idx="1">
+        <a:scrgbClr r="0" g="0" b="0"/>
+      </a:fillRef>
+      <a:effectRef idx="0">
+        <a:scrgbClr r="0" g="0" b="0"/>
+      </a:effectRef>
+      <a:fontRef idx="minor">
+        <a:schemeClr val="lt1"/>
+      </a:fontRef>
+    </dgm:style>
+  </dgm:styleLbl>
+  <dgm:styleLbl name="node2">
+    <dgm:scene3d>
+      <a:camera prst="orthographicFront"/>
+      <a:lightRig rig="threePt" dir="t"/>
+    </dgm:scene3d>
+    <dgm:sp3d/>
+    <dgm:txPr/>
+    <dgm:style>
+      <a:lnRef idx="2">
+        <a:scrgbClr r="0" g="0" b="0"/>
+      </a:lnRef>
+      <a:fillRef idx="1">
+        <a:scrgbClr r="0" g="0" b="0"/>
+      </a:fillRef>
+      <a:effectRef idx="0">
+        <a:scrgbClr r="0" g="0" b="0"/>
+      </a:effectRef>
+      <a:fontRef idx="minor">
+        <a:schemeClr val="lt1"/>
+      </a:fontRef>
+    </dgm:style>
+  </dgm:styleLbl>
+  <dgm:styleLbl name="node3">
+    <dgm:scene3d>
+      <a:camera prst="orthographicFront"/>
+      <a:lightRig rig="threePt" dir="t"/>
+    </dgm:scene3d>
+    <dgm:sp3d/>
+    <dgm:txPr/>
+    <dgm:style>
+      <a:lnRef idx="2">
+        <a:scrgbClr r="0" g="0" b="0"/>
+      </a:lnRef>
+      <a:fillRef idx="1">
+        <a:scrgbClr r="0" g="0" b="0"/>
+      </a:fillRef>
+      <a:effectRef idx="0">
+        <a:scrgbClr r="0" g="0" b="0"/>
+      </a:effectRef>
+      <a:fontRef idx="minor">
+        <a:schemeClr val="lt1"/>
+      </a:fontRef>
+    </dgm:style>
+  </dgm:styleLbl>
+  <dgm:styleLbl name="node4">
+    <dgm:scene3d>
+      <a:camera prst="orthographicFront"/>
+      <a:lightRig rig="threePt" dir="t"/>
+    </dgm:scene3d>
+    <dgm:sp3d/>
+    <dgm:txPr/>
+    <dgm:style>
+      <a:lnRef idx="2">
+        <a:scrgbClr r="0" g="0" b="0"/>
+      </a:lnRef>
+      <a:fillRef idx="1">
+        <a:scrgbClr r="0" g="0" b="0"/>
+      </a:fillRef>
+      <a:effectRef idx="0">
+        <a:scrgbClr r="0" g="0" b="0"/>
+      </a:effectRef>
+      <a:fontRef idx="minor">
+        <a:schemeClr val="lt1"/>
+      </a:fontRef>
+    </dgm:style>
+  </dgm:styleLbl>
+  <dgm:styleLbl name="fgImgPlace1">
+    <dgm:scene3d>
+      <a:camera prst="orthographicFront"/>
+      <a:lightRig rig="threePt" dir="t"/>
+    </dgm:scene3d>
+    <dgm:sp3d/>
+    <dgm:txPr/>
+    <dgm:style>
+      <a:lnRef idx="2">
+        <a:scrgbClr r="0" g="0" b="0"/>
+      </a:lnRef>
+      <a:fillRef idx="1">
+        <a:scrgbClr r="0" g="0" b="0"/>
+      </a:fillRef>
+      <a:effectRef idx="0">
+        <a:scrgbClr r="0" g="0" b="0"/>
+      </a:effectRef>
+      <a:fontRef idx="minor"/>
+    </dgm:style>
+  </dgm:styleLbl>
+  <dgm:styleLbl name="alignImgPlace1">
+    <dgm:scene3d>
+      <a:camera prst="orthographicFront"/>
+      <a:lightRig rig="threePt" dir="t"/>
+    </dgm:scene3d>
+    <dgm:sp3d/>
+    <dgm:txPr/>
+    <dgm:style>
+      <a:lnRef idx="2">
+        <a:scrgbClr r="0" g="0" b="0"/>
+      </a:lnRef>
+      <a:fillRef idx="1">
+        <a:scrgbClr r="0" g="0" b="0"/>
+      </a:fillRef>
+      <a:effectRef idx="0">
+        <a:scrgbClr r="0" g="0" b="0"/>
+      </a:effectRef>
+      <a:fontRef idx="minor"/>
+    </dgm:style>
+  </dgm:styleLbl>
+  <dgm:styleLbl name="bgImgPlace1">
+    <dgm:scene3d>
+      <a:camera prst="orthographicFront"/>
+      <a:lightRig rig="threePt" dir="t"/>
+    </dgm:scene3d>
+    <dgm:sp3d/>
+    <dgm:txPr/>
+    <dgm:style>
+      <a:lnRef idx="2">
+        <a:scrgbClr r="0" g="0" b="0"/>
+      </a:lnRef>
+      <a:fillRef idx="1">
+        <a:scrgbClr r="0" g="0" b="0"/>
+      </a:fillRef>
+      <a:effectRef idx="0">
+        <a:scrgbClr r="0" g="0" b="0"/>
+      </a:effectRef>
+      <a:fontRef idx="minor"/>
+    </dgm:style>
+  </dgm:styleLbl>
+  <dgm:styleLbl name="sibTrans2D1">
+    <dgm:scene3d>
+      <a:camera prst="orthographicFront"/>
+      <a:lightRig rig="threePt" dir="t"/>
+    </dgm:scene3d>
+    <dgm:sp3d/>
+    <dgm:txPr/>
+    <dgm:style>
+      <a:lnRef idx="0">
+        <a:scrgbClr r="0" g="0" b="0"/>
+      </a:lnRef>
+      <a:fillRef idx="1">
+        <a:scrgbClr r="0" g="0" b="0"/>
+      </a:fillRef>
+      <a:effectRef idx="0">
+        <a:scrgbClr r="0" g="0" b="0"/>
+      </a:effectRef>
+      <a:fontRef idx="minor">
+        <a:schemeClr val="lt1"/>
+      </a:fontRef>
+    </dgm:style>
+  </dgm:styleLbl>
+  <dgm:styleLbl name="fgSibTrans2D1">
+    <dgm:scene3d>
+      <a:camera prst="orthographicFront"/>
+      <a:lightRig rig="threePt" dir="t"/>
+    </dgm:scene3d>
+    <dgm:sp3d/>
+    <dgm:txPr/>
+    <dgm:style>
+      <a:lnRef idx="0">
+        <a:scrgbClr r="0" g="0" b="0"/>
+      </a:lnRef>
+      <a:fillRef idx="1">
+        <a:scrgbClr r="0" g="0" b="0"/>
+      </a:fillRef>
+      <a:effectRef idx="0">
+        <a:scrgbClr r="0" g="0" b="0"/>
+      </a:effectRef>
+      <a:fontRef idx="minor">
+        <a:schemeClr val="lt1"/>
+      </a:fontRef>
+    </dgm:style>
+  </dgm:styleLbl>
+  <dgm:styleLbl name="bgSibTrans2D1">
+    <dgm:scene3d>
+      <a:camera prst="orthographicFront"/>
+      <a:lightRig rig="threePt" dir="t"/>
+    </dgm:scene3d>
+    <dgm:sp3d/>
+    <dgm:txPr/>
+    <dgm:style>
+      <a:lnRef idx="0">
+        <a:scrgbClr r="0" g="0" b="0"/>
+      </a:lnRef>
+      <a:fillRef idx="1">
+        <a:scrgbClr r="0" g="0" b="0"/>
+      </a:fillRef>
+      <a:effectRef idx="0">
+        <a:scrgbClr r="0" g="0" b="0"/>
+      </a:effectRef>
+      <a:fontRef idx="minor">
+        <a:schemeClr val="lt1"/>
+      </a:fontRef>
+    </dgm:style>
+  </dgm:styleLbl>
+  <dgm:styleLbl name="sibTrans1D1">
+    <dgm:scene3d>
+      <a:camera prst="orthographicFront"/>
+      <a:lightRig rig="threePt" dir="t"/>
+    </dgm:scene3d>
+    <dgm:sp3d/>
+    <dgm:txPr/>
+    <dgm:style>
+      <a:lnRef idx="1">
+        <a:scrgbClr r="0" g="0" b="0"/>
+      </a:lnRef>
+      <a:fillRef idx="0">
+        <a:scrgbClr r="0" g="0" b="0"/>
+      </a:fillRef>
+      <a:effectRef idx="0">
+        <a:scrgbClr r="0" g="0" b="0"/>
+      </a:effectRef>
+      <a:fontRef idx="minor"/>
+    </dgm:style>
+  </dgm:styleLbl>
+  <dgm:styleLbl name="callout">
+    <dgm:scene3d>
+      <a:camera prst="orthographicFront"/>
+      <a:lightRig rig="threePt" dir="t"/>
+    </dgm:scene3d>
+    <dgm:sp3d/>
+    <dgm:txPr/>
+    <dgm:style>
+      <a:lnRef idx="2">
+        <a:scrgbClr r="0" g="0" b="0"/>
+      </a:lnRef>
+      <a:fillRef idx="1">
+        <a:scrgbClr r="0" g="0" b="0"/>
+      </a:fillRef>
+      <a:effectRef idx="0">
+        <a:scrgbClr r="0" g="0" b="0"/>
+      </a:effectRef>
+      <a:fontRef idx="minor"/>
+    </dgm:style>
+  </dgm:styleLbl>
+  <dgm:styleLbl name="asst0">
+    <dgm:scene3d>
+      <a:camera prst="orthographicFront"/>
+      <a:lightRig rig="threePt" dir="t"/>
+    </dgm:scene3d>
+    <dgm:sp3d/>
+    <dgm:txPr/>
+    <dgm:style>
+      <a:lnRef idx="2">
+        <a:scrgbClr r="0" g="0" b="0"/>
+      </a:lnRef>
+      <a:fillRef idx="1">
+        <a:scrgbClr r="0" g="0" b="0"/>
+      </a:fillRef>
+      <a:effectRef idx="0">
+        <a:scrgbClr r="0" g="0" b="0"/>
+      </a:effectRef>
+      <a:fontRef idx="minor">
+        <a:schemeClr val="lt1"/>
+      </a:fontRef>
+    </dgm:style>
+  </dgm:styleLbl>
+  <dgm:styleLbl name="asst1">
+    <dgm:scene3d>
+      <a:camera prst="orthographicFront"/>
+      <a:lightRig rig="threePt" dir="t"/>
+    </dgm:scene3d>
+    <dgm:sp3d/>
+    <dgm:txPr/>
+    <dgm:style>
+      <a:lnRef idx="2">
+        <a:scrgbClr r="0" g="0" b="0"/>
+      </a:lnRef>
+      <a:fillRef idx="1">
+        <a:scrgbClr r="0" g="0" b="0"/>
+      </a:fillRef>
+      <a:effectRef idx="0">
+        <a:scrgbClr r="0" g="0" b="0"/>
+      </a:effectRef>
+      <a:fontRef idx="minor">
+        <a:schemeClr val="lt1"/>
+      </a:fontRef>
+    </dgm:style>
+  </dgm:styleLbl>
+  <dgm:styleLbl name="asst2">
+    <dgm:scene3d>
+      <a:camera prst="orthographicFront"/>
+      <a:lightRig rig="threePt" dir="t"/>
+    </dgm:scene3d>
+    <dgm:sp3d/>
+    <dgm:txPr/>
+    <dgm:style>
+      <a:lnRef idx="2">
+        <a:scrgbClr r="0" g="0" b="0"/>
+      </a:lnRef>
+      <a:fillRef idx="1">
+        <a:scrgbClr r="0" g="0" b="0"/>
+      </a:fillRef>
+      <a:effectRef idx="0">
+        <a:scrgbClr r="0" g="0" b="0"/>
+      </a:effectRef>
+      <a:fontRef idx="minor">
+        <a:schemeClr val="lt1"/>
+      </a:fontRef>
+    </dgm:style>
+  </dgm:styleLbl>
+  <dgm:styleLbl name="asst3">
+    <dgm:scene3d>
+      <a:camera prst="orthographicFront"/>
+      <a:lightRig rig="threePt" dir="t"/>
+    </dgm:scene3d>
+    <dgm:sp3d/>
+    <dgm:txPr/>
+    <dgm:style>
+      <a:lnRef idx="2">
+        <a:scrgbClr r="0" g="0" b="0"/>
+      </a:lnRef>
+      <a:fillRef idx="1">
+        <a:scrgbClr r="0" g="0" b="0"/>
+      </a:fillRef>
+      <a:effectRef idx="0">
+        <a:scrgbClr r="0" g="0" b="0"/>
+      </a:effectRef>
+      <a:fontRef idx="minor">
+        <a:schemeClr val="lt1"/>
+      </a:fontRef>
+    </dgm:style>
+  </dgm:styleLbl>
+  <dgm:styleLbl name="asst4">
+    <dgm:scene3d>
+      <a:camera prst="orthographicFront"/>
+      <a:lightRig rig="threePt" dir="t"/>
+    </dgm:scene3d>
+    <dgm:sp3d/>
+    <dgm:txPr/>
+    <dgm:style>
+      <a:lnRef idx="2">
+        <a:scrgbClr r="0" g="0" b="0"/>
+      </a:lnRef>
+      <a:fillRef idx="1">
+        <a:scrgbClr r="0" g="0" b="0"/>
+      </a:fillRef>
+      <a:effectRef idx="0">
+        <a:scrgbClr r="0" g="0" b="0"/>
+      </a:effectRef>
+      <a:fontRef idx="minor">
+        <a:schemeClr val="lt1"/>
+      </a:fontRef>
+    </dgm:style>
+  </dgm:styleLbl>
+  <dgm:styleLbl name="parChTrans2D1">
+    <dgm:scene3d>
+      <a:camera prst="orthographicFront"/>
+      <a:lightRig rig="threePt" dir="t"/>
+    </dgm:scene3d>
+    <dgm:sp3d/>
+    <dgm:txPr/>
+    <dgm:style>
+      <a:lnRef idx="2">
+        <a:scrgbClr r="0" g="0" b="0"/>
+      </a:lnRef>
+      <a:fillRef idx="1">
+        <a:scrgbClr r="0" g="0" b="0"/>
+      </a:fillRef>
+      <a:effectRef idx="0">
+        <a:scrgbClr r="0" g="0" b="0"/>
+      </a:effectRef>
+      <a:fontRef idx="minor">
+        <a:schemeClr val="lt1"/>
+      </a:fontRef>
+    </dgm:style>
+  </dgm:styleLbl>
+  <dgm:styleLbl name="parChTrans2D2">
+    <dgm:scene3d>
+      <a:camera prst="orthographicFront"/>
+      <a:lightRig rig="threePt" dir="t"/>
+    </dgm:scene3d>
+    <dgm:sp3d/>
+    <dgm:txPr/>
+    <dgm:style>
+      <a:lnRef idx="2">
+        <a:scrgbClr r="0" g="0" b="0"/>
+      </a:lnRef>
+      <a:fillRef idx="1">
+        <a:scrgbClr r="0" g="0" b="0"/>
+      </a:fillRef>
+      <a:effectRef idx="0">
+        <a:scrgbClr r="0" g="0" b="0"/>
+      </a:effectRef>
+      <a:fontRef idx="minor">
+        <a:schemeClr val="lt1"/>
+      </a:fontRef>
+    </dgm:style>
+  </dgm:styleLbl>
+  <dgm:styleLbl name="parChTrans2D3">
+    <dgm:scene3d>
+      <a:camera prst="orthographicFront"/>
+      <a:lightRig rig="threePt" dir="t"/>
+    </dgm:scene3d>
+    <dgm:sp3d/>
+    <dgm:txPr/>
+    <dgm:style>
+      <a:lnRef idx="2">
+        <a:scrgbClr r="0" g="0" b="0"/>
+      </a:lnRef>
+      <a:fillRef idx="1">
+        <a:scrgbClr r="0" g="0" b="0"/>
+      </a:fillRef>
+      <a:effectRef idx="0">
+        <a:scrgbClr r="0" g="0" b="0"/>
+      </a:effectRef>
+      <a:fontRef idx="minor">
+        <a:schemeClr val="lt1"/>
+      </a:fontRef>
+    </dgm:style>
+  </dgm:styleLbl>
+  <dgm:styleLbl name="parChTrans2D4">
+    <dgm:scene3d>
+      <a:camera prst="orthographicFront"/>
+      <a:lightRig rig="threePt" dir="t"/>
+    </dgm:scene3d>
+    <dgm:sp3d/>
+    <dgm:txPr/>
+    <dgm:style>
+      <a:lnRef idx="2">
+        <a:scrgbClr r="0" g="0" b="0"/>
+      </a:lnRef>
+      <a:fillRef idx="1">
+        <a:scrgbClr r="0" g="0" b="0"/>
+      </a:fillRef>
+      <a:effectRef idx="0">
+        <a:scrgbClr r="0" g="0" b="0"/>
+      </a:effectRef>
+      <a:fontRef idx="minor">
+        <a:schemeClr val="lt1"/>
+      </a:fontRef>
+    </dgm:style>
+  </dgm:styleLbl>
+  <dgm:styleLbl name="parChTrans1D1">
+    <dgm:scene3d>
+      <a:camera prst="orthographicFront"/>
+      <a:lightRig rig="threePt" dir="t"/>
+    </dgm:scene3d>
+    <dgm:sp3d/>
+    <dgm:txPr/>
+    <dgm:style>
+      <a:lnRef idx="2">
+        <a:scrgbClr r="0" g="0" b="0"/>
+      </a:lnRef>
+      <a:fillRef idx="0">
+        <a:scrgbClr r="0" g="0" b="0"/>
+      </a:fillRef>
+      <a:effectRef idx="0">
+        <a:scrgbClr r="0" g="0" b="0"/>
+      </a:effectRef>
+      <a:fontRef idx="minor"/>
+    </dgm:style>
+  </dgm:styleLbl>
+  <dgm:styleLbl name="parChTrans1D2">
+    <dgm:scene3d>
+      <a:camera prst="orthographicFront"/>
+      <a:lightRig rig="threePt" dir="t"/>
+    </dgm:scene3d>
+    <dgm:sp3d/>
+    <dgm:txPr/>
+    <dgm:style>
+      <a:lnRef idx="2">
+        <a:scrgbClr r="0" g="0" b="0"/>
+      </a:lnRef>
+      <a:fillRef idx="0">
+        <a:scrgbClr r="0" g="0" b="0"/>
+      </a:fillRef>
+      <a:effectRef idx="0">
+        <a:scrgbClr r="0" g="0" b="0"/>
+      </a:effectRef>
+      <a:fontRef idx="minor"/>
+    </dgm:style>
+  </dgm:styleLbl>
+  <dgm:styleLbl name="parChTrans1D3">
+    <dgm:scene3d>
+      <a:camera prst="orthographicFront"/>
+      <a:lightRig rig="threePt" dir="t"/>
+    </dgm:scene3d>
+    <dgm:sp3d/>
+    <dgm:txPr/>
+    <dgm:style>
+      <a:lnRef idx="2">
+        <a:scrgbClr r="0" g="0" b="0"/>
+      </a:lnRef>
+      <a:fillRef idx="0">
+        <a:scrgbClr r="0" g="0" b="0"/>
+      </a:fillRef>
+      <a:effectRef idx="0">
+        <a:scrgbClr r="0" g="0" b="0"/>
+      </a:effectRef>
+      <a:fontRef idx="minor"/>
+    </dgm:style>
+  </dgm:styleLbl>
+  <dgm:styleLbl name="parChTrans1D4">
+    <dgm:scene3d>
+      <a:camera prst="orthographicFront"/>
+      <a:lightRig rig="threePt" dir="t"/>
+    </dgm:scene3d>
+    <dgm:sp3d/>
+    <dgm:txPr/>
+    <dgm:style>
+      <a:lnRef idx="2">
+        <a:scrgbClr r="0" g="0" b="0"/>
+      </a:lnRef>
+      <a:fillRef idx="0">
+        <a:scrgbClr r="0" g="0" b="0"/>
+      </a:fillRef>
+      <a:effectRef idx="0">
+        <a:scrgbClr r="0" g="0" b="0"/>
+      </a:effectRef>
+      <a:fontRef idx="minor"/>
+    </dgm:style>
+  </dgm:styleLbl>
+  <dgm:styleLbl name="fgAcc1">
+    <dgm:scene3d>
+      <a:camera prst="orthographicFront"/>
+      <a:lightRig rig="threePt" dir="t"/>
+    </dgm:scene3d>
+    <dgm:sp3d/>
+    <dgm:txPr/>
+    <dgm:style>
+      <a:lnRef idx="2">
+        <a:scrgbClr r="0" g="0" b="0"/>
+      </a:lnRef>
+      <a:fillRef idx="1">
+        <a:scrgbClr r="0" g="0" b="0"/>
+      </a:fillRef>
+      <a:effectRef idx="0">
+        <a:scrgbClr r="0" g="0" b="0"/>
+      </a:effectRef>
+      <a:fontRef idx="minor"/>
+    </dgm:style>
+  </dgm:styleLbl>
+  <dgm:styleLbl name="conFgAcc1">
+    <dgm:scene3d>
+      <a:camera prst="orthographicFront"/>
+      <a:lightRig rig="threePt" dir="t"/>
+    </dgm:scene3d>
+    <dgm:sp3d/>
+    <dgm:txPr/>
+    <dgm:style>
+      <a:lnRef idx="2">
+        <a:scrgbClr r="0" g="0" b="0"/>
+      </a:lnRef>
+      <a:fillRef idx="1">
+        <a:scrgbClr r="0" g="0" b="0"/>
+      </a:fillRef>
+      <a:effectRef idx="0">
+        <a:scrgbClr r="0" g="0" b="0"/>
+      </a:effectRef>
+      <a:fontRef idx="minor"/>
+    </dgm:style>
+  </dgm:styleLbl>
+  <dgm:styleLbl name="alignAcc1">
+    <dgm:scene3d>
+      <a:camera prst="orthographicFront"/>
+      <a:lightRig rig="threePt" dir="t"/>
+    </dgm:scene3d>
+    <dgm:sp3d/>
+    <dgm:txPr/>
+    <dgm:style>
+      <a:lnRef idx="2">
+        <a:scrgbClr r="0" g="0" b="0"/>
+      </a:lnRef>
+      <a:fillRef idx="1">
+        <a:scrgbClr r="0" g="0" b="0"/>
+      </a:fillRef>
+      <a:effectRef idx="0">
+        <a:scrgbClr r="0" g="0" b="0"/>
+      </a:effectRef>
+      <a:fontRef idx="minor"/>
+    </dgm:style>
+  </dgm:styleLbl>
+  <dgm:styleLbl name="trAlignAcc1">
+    <dgm:scene3d>
+      <a:camera prst="orthographicFront"/>
+      <a:lightRig rig="threePt" dir="t"/>
+    </dgm:scene3d>
+    <dgm:sp3d/>
+    <dgm:txPr/>
+    <dgm:style>
+      <a:lnRef idx="1">
+        <a:scrgbClr r="0" g="0" b="0"/>
+      </a:lnRef>
+      <a:fillRef idx="1">
+        <a:scrgbClr r="0" g="0" b="0"/>
+      </a:fillRef>
+      <a:effectRef idx="0">
+        <a:scrgbClr r="0" g="0" b="0"/>
+      </a:effectRef>
+      <a:fontRef idx="minor"/>
+    </dgm:style>
+  </dgm:styleLbl>
+  <dgm:styleLbl name="bgAcc1">
+    <dgm:scene3d>
+      <a:camera prst="orthographicFront"/>
+      <a:lightRig rig="threePt" dir="t"/>
+    </dgm:scene3d>
+    <dgm:sp3d/>
+    <dgm:txPr/>
+    <dgm:style>
+      <a:lnRef idx="2">
+        <a:scrgbClr r="0" g="0" b="0"/>
+      </a:lnRef>
+      <a:fillRef idx="1">
+        <a:scrgbClr r="0" g="0" b="0"/>
+      </a:fillRef>
+      <a:effectRef idx="0">
+        <a:scrgbClr r="0" g="0" b="0"/>
+      </a:effectRef>
+      <a:fontRef idx="minor"/>
+    </dgm:style>
+  </dgm:styleLbl>
+  <dgm:styleLbl name="solidFgAcc1">
+    <dgm:scene3d>
+      <a:camera prst="orthographicFront"/>
+      <a:lightRig rig="threePt" dir="t"/>
+    </dgm:scene3d>
+    <dgm:sp3d/>
+    <dgm:txPr/>
+    <dgm:style>
+      <a:lnRef idx="2">
+        <a:scrgbClr r="0" g="0" b="0"/>
+      </a:lnRef>
+      <a:fillRef idx="1">
+        <a:scrgbClr r="0" g="0" b="0"/>
+      </a:fillRef>
+      <a:effectRef idx="0">
+        <a:scrgbClr r="0" g="0" b="0"/>
+      </a:effectRef>
+      <a:fontRef idx="minor"/>
+    </dgm:style>
+  </dgm:styleLbl>
+  <dgm:styleLbl name="solidAlignAcc1">
+    <dgm:scene3d>
+      <a:camera prst="orthographicFront"/>
+      <a:lightRig rig="threePt" dir="t"/>
+    </dgm:scene3d>
+    <dgm:sp3d/>
+    <dgm:txPr/>
+    <dgm:style>
+      <a:lnRef idx="2">
+        <a:scrgbClr r="0" g="0" b="0"/>
+      </a:lnRef>
+      <a:fillRef idx="1">
+        <a:scrgbClr r="0" g="0" b="0"/>
+      </a:fillRef>
+      <a:effectRef idx="0">
+        <a:scrgbClr r="0" g="0" b="0"/>
+      </a:effectRef>
+      <a:fontRef idx="minor"/>
+    </dgm:style>
+  </dgm:styleLbl>
+  <dgm:styleLbl name="solidBgAcc1">
+    <dgm:scene3d>
+      <a:camera prst="orthographicFront"/>
+      <a:lightRig rig="threePt" dir="t"/>
+    </dgm:scene3d>
+    <dgm:sp3d/>
+    <dgm:txPr/>
+    <dgm:style>
+      <a:lnRef idx="2">
+        <a:scrgbClr r="0" g="0" b="0"/>
+      </a:lnRef>
+      <a:fillRef idx="1">
+        <a:scrgbClr r="0" g="0" b="0"/>
+      </a:fillRef>
+      <a:effectRef idx="0">
+        <a:scrgbClr r="0" g="0" b="0"/>
+      </a:effectRef>
+      <a:fontRef idx="minor"/>
+    </dgm:style>
+  </dgm:styleLbl>
+  <dgm:styleLbl name="fgAccFollowNode1">
+    <dgm:scene3d>
+      <a:camera prst="orthographicFront"/>
+      <a:lightRig rig="threePt" dir="t"/>
+    </dgm:scene3d>
+    <dgm:sp3d/>
+    <dgm:txPr/>
+    <dgm:style>
+      <a:lnRef idx="2">
+        <a:scrgbClr r="0" g="0" b="0"/>
+      </a:lnRef>
+      <a:fillRef idx="1">
+        <a:scrgbClr r="0" g="0" b="0"/>
+      </a:fillRef>
+      <a:effectRef idx="0">
+        <a:scrgbClr r="0" g="0" b="0"/>
+      </a:effectRef>
+      <a:fontRef idx="minor"/>
+    </dgm:style>
+  </dgm:styleLbl>
+  <dgm:styleLbl name="alignAccFollowNode1">
+    <dgm:scene3d>
+      <a:camera prst="orthographicFront"/>
+      <a:lightRig rig="threePt" dir="t"/>
+    </dgm:scene3d>
+    <dgm:sp3d/>
+    <dgm:txPr/>
+    <dgm:style>
+      <a:lnRef idx="2">
+        <a:scrgbClr r="0" g="0" b="0"/>
+      </a:lnRef>
+      <a:fillRef idx="1">
+        <a:scrgbClr r="0" g="0" b="0"/>
+      </a:fillRef>
+      <a:effectRef idx="0">
+        <a:scrgbClr r="0" g="0" b="0"/>
+      </a:effectRef>
+      <a:fontRef idx="minor"/>
+    </dgm:style>
+  </dgm:styleLbl>
+  <dgm:styleLbl name="bgAccFollowNode1">
+    <dgm:scene3d>
+      <a:camera prst="orthographicFront"/>
+      <a:lightRig rig="threePt" dir="t"/>
+    </dgm:scene3d>
+    <dgm:sp3d/>
+    <dgm:txPr/>
+    <dgm:style>
+      <a:lnRef idx="2">
+        <a:scrgbClr r="0" g="0" b="0"/>
+      </a:lnRef>
+      <a:fillRef idx="1">
+        <a:scrgbClr r="0" g="0" b="0"/>
+      </a:fillRef>
+      <a:effectRef idx="0">
+        <a:scrgbClr r="0" g="0" b="0"/>
+      </a:effectRef>
+      <a:fontRef idx="minor"/>
+    </dgm:style>
+  </dgm:styleLbl>
+  <dgm:styleLbl name="fgAcc0">
+    <dgm:scene3d>
+      <a:camera prst="orthographicFront"/>
+      <a:lightRig rig="threePt" dir="t"/>
+    </dgm:scene3d>
+    <dgm:sp3d/>
+    <dgm:txPr/>
+    <dgm:style>
+      <a:lnRef idx="2">
+        <a:scrgbClr r="0" g="0" b="0"/>
+      </a:lnRef>
+      <a:fillRef idx="1">
+        <a:scrgbClr r="0" g="0" b="0"/>
+      </a:fillRef>
+      <a:effectRef idx="0">
+        <a:scrgbClr r="0" g="0" b="0"/>
+      </a:effectRef>
+      <a:fontRef idx="minor"/>
+    </dgm:style>
+  </dgm:styleLbl>
+  <dgm:styleLbl name="fgAcc2">
+    <dgm:scene3d>
+      <a:camera prst="orthographicFront"/>
+      <a:lightRig rig="threePt" dir="t"/>
+    </dgm:scene3d>
+    <dgm:sp3d/>
+    <dgm:txPr/>
+    <dgm:style>
+      <a:lnRef idx="2">
+        <a:scrgbClr r="0" g="0" b="0"/>
+      </a:lnRef>
+      <a:fillRef idx="1">
+        <a:scrgbClr r="0" g="0" b="0"/>
+      </a:fillRef>
+      <a:effectRef idx="0">
+        <a:scrgbClr r="0" g="0" b="0"/>
+      </a:effectRef>
+      <a:fontRef idx="minor"/>
+    </dgm:style>
+  </dgm:styleLbl>
+  <dgm:styleLbl name="fgAcc3">
+    <dgm:scene3d>
+      <a:camera prst="orthographicFront"/>
+      <a:lightRig rig="threePt" dir="t"/>
+    </dgm:scene3d>
+    <dgm:sp3d/>
+    <dgm:txPr/>
+    <dgm:style>
+      <a:lnRef idx="2">
+        <a:scrgbClr r="0" g="0" b="0"/>
+      </a:lnRef>
+      <a:fillRef idx="1">
+        <a:scrgbClr r="0" g="0" b="0"/>
+      </a:fillRef>
+      <a:effectRef idx="0">
+        <a:scrgbClr r="0" g="0" b="0"/>
+      </a:effectRef>
+      <a:fontRef idx="minor"/>
+    </dgm:style>
+  </dgm:styleLbl>
+  <dgm:styleLbl name="fgAcc4">
+    <dgm:scene3d>
+      <a:camera prst="orthographicFront"/>
+      <a:lightRig rig="threePt" dir="t"/>
+    </dgm:scene3d>
+    <dgm:sp3d/>
+    <dgm:txPr/>
+    <dgm:style>
+      <a:lnRef idx="2">
+        <a:scrgbClr r="0" g="0" b="0"/>
+      </a:lnRef>
+      <a:fillRef idx="1">
+        <a:scrgbClr r="0" g="0" b="0"/>
+      </a:fillRef>
+      <a:effectRef idx="0">
+        <a:scrgbClr r="0" g="0" b="0"/>
+      </a:effectRef>
+      <a:fontRef idx="minor"/>
+    </dgm:style>
+  </dgm:styleLbl>
+  <dgm:styleLbl name="bgShp">
+    <dgm:scene3d>
+      <a:camera prst="orthographicFront"/>
+      <a:lightRig rig="threePt" dir="t"/>
+    </dgm:scene3d>
+    <dgm:sp3d/>
+    <dgm:txPr/>
+    <dgm:style>
+      <a:lnRef idx="0">
+        <a:scrgbClr r="0" g="0" b="0"/>
+      </a:lnRef>
+      <a:fillRef idx="1">
+        <a:scrgbClr r="0" g="0" b="0"/>
+      </a:fillRef>
+      <a:effectRef idx="0">
+        <a:scrgbClr r="0" g="0" b="0"/>
+      </a:effectRef>
+      <a:fontRef idx="minor"/>
+    </dgm:style>
+  </dgm:styleLbl>
+  <dgm:styleLbl name="dkBgShp">
+    <dgm:scene3d>
+      <a:camera prst="orthographicFront"/>
+      <a:lightRig rig="threePt" dir="t"/>
+    </dgm:scene3d>
+    <dgm:sp3d/>
+    <dgm:txPr/>
+    <dgm:style>
+      <a:lnRef idx="0">
+        <a:scrgbClr r="0" g="0" b="0"/>
+      </a:lnRef>
+      <a:fillRef idx="1">
+        <a:scrgbClr r="0" g="0" b="0"/>
+      </a:fillRef>
+      <a:effectRef idx="0">
+        <a:scrgbClr r="0" g="0" b="0"/>
+      </a:effectRef>
+      <a:fontRef idx="minor"/>
+    </dgm:style>
+  </dgm:styleLbl>
+  <dgm:styleLbl name="trBgShp">
+    <dgm:scene3d>
+      <a:camera prst="orthographicFront"/>
+      <a:lightRig rig="threePt" dir="t"/>
+    </dgm:scene3d>
+    <dgm:sp3d/>
+    <dgm:txPr/>
+    <dgm:style>
+      <a:lnRef idx="0">
+        <a:scrgbClr r="0" g="0" b="0"/>
+      </a:lnRef>
+      <a:fillRef idx="1">
+        <a:scrgbClr r="0" g="0" b="0"/>
+      </a:fillRef>
+      <a:effectRef idx="0">
+        <a:scrgbClr r="0" g="0" b="0"/>
+      </a:effectRef>
+      <a:fontRef idx="minor"/>
+    </dgm:style>
+  </dgm:styleLbl>
+  <dgm:styleLbl name="fgShp">
+    <dgm:scene3d>
+      <a:camera prst="orthographicFront"/>
+      <a:lightRig rig="threePt" dir="t"/>
+    </dgm:scene3d>
+    <dgm:sp3d/>
+    <dgm:txPr/>
+    <dgm:style>
+      <a:lnRef idx="2">
+        <a:scrgbClr r="0" g="0" b="0"/>
+      </a:lnRef>
+      <a:fillRef idx="1">
+        <a:scrgbClr r="0" g="0" b="0"/>
+      </a:fillRef>
+      <a:effectRef idx="0">
+        <a:scrgbClr r="0" g="0" b="0"/>
+      </a:effectRef>
+      <a:fontRef idx="minor"/>
+    </dgm:style>
+  </dgm:styleLbl>
+  <dgm:styleLbl name="revTx">
+    <dgm:scene3d>
+      <a:camera prst="orthographicFront"/>
+      <a:lightRig rig="threePt" dir="t"/>
+    </dgm:scene3d>
+    <dgm:sp3d/>
+    <dgm:txPr/>
+    <dgm:style>
+      <a:lnRef idx="0">
+        <a:scrgbClr r="0" g="0" b="0"/>
+      </a:lnRef>
+      <a:fillRef idx="0">
+        <a:scrgbClr r="0" g="0" b="0"/>
+      </a:fillRef>
+      <a:effectRef idx="0">
+        <a:scrgbClr r="0" g="0" b="0"/>
+      </a:effectRef>
+      <a:fontRef idx="minor"/>
+    </dgm:style>
+  </dgm:styleLbl>
+</dgm:styleDef>
+</file>
+
 <file path=ppt/slideLayouts/slideLayout1.xml><?xml version="1.0" encoding="utf-8"?>
 <p:sldLayout xmlns:a="http://schemas.openxmlformats.org/drawingml/2006/main" xmlns:r="http://schemas.openxmlformats.org/officeDocument/2006/relationships" xmlns:p="http://schemas.openxmlformats.org/presentationml/2006/main" type="title" preserve="1">
   <p:cSld name="标题幻灯片">
@@ -271,7 +3037,7 @@
           <a:p>
             <a:fld id="{D1FC40BD-DF71-48B5-9F6E-F69B92E103E9}" type="datetimeFigureOut">
               <a:rPr lang="zh-CN" altLang="en-US" smtClean="0"/>
-              <a:t>2021/1/25</a:t>
+              <a:t>2021/1/26</a:t>
             </a:fld>
             <a:endParaRPr lang="zh-CN" altLang="en-US"/>
           </a:p>
@@ -441,7 +3207,7 @@
           <a:p>
             <a:fld id="{D1FC40BD-DF71-48B5-9F6E-F69B92E103E9}" type="datetimeFigureOut">
               <a:rPr lang="zh-CN" altLang="en-US" smtClean="0"/>
-              <a:t>2021/1/25</a:t>
+              <a:t>2021/1/26</a:t>
             </a:fld>
             <a:endParaRPr lang="zh-CN" altLang="en-US"/>
           </a:p>
@@ -621,7 +3387,7 @@
           <a:p>
             <a:fld id="{D1FC40BD-DF71-48B5-9F6E-F69B92E103E9}" type="datetimeFigureOut">
               <a:rPr lang="zh-CN" altLang="en-US" smtClean="0"/>
-              <a:t>2021/1/25</a:t>
+              <a:t>2021/1/26</a:t>
             </a:fld>
             <a:endParaRPr lang="zh-CN" altLang="en-US"/>
           </a:p>
@@ -791,7 +3557,7 @@
           <a:p>
             <a:fld id="{D1FC40BD-DF71-48B5-9F6E-F69B92E103E9}" type="datetimeFigureOut">
               <a:rPr lang="zh-CN" altLang="en-US" smtClean="0"/>
-              <a:t>2021/1/25</a:t>
+              <a:t>2021/1/26</a:t>
             </a:fld>
             <a:endParaRPr lang="zh-CN" altLang="en-US"/>
           </a:p>
@@ -1037,7 +3803,7 @@
           <a:p>
             <a:fld id="{D1FC40BD-DF71-48B5-9F6E-F69B92E103E9}" type="datetimeFigureOut">
               <a:rPr lang="zh-CN" altLang="en-US" smtClean="0"/>
-              <a:t>2021/1/25</a:t>
+              <a:t>2021/1/26</a:t>
             </a:fld>
             <a:endParaRPr lang="zh-CN" altLang="en-US"/>
           </a:p>
@@ -1269,7 +4035,7 @@
           <a:p>
             <a:fld id="{D1FC40BD-DF71-48B5-9F6E-F69B92E103E9}" type="datetimeFigureOut">
               <a:rPr lang="zh-CN" altLang="en-US" smtClean="0"/>
-              <a:t>2021/1/25</a:t>
+              <a:t>2021/1/26</a:t>
             </a:fld>
             <a:endParaRPr lang="zh-CN" altLang="en-US"/>
           </a:p>
@@ -1636,7 +4402,7 @@
           <a:p>
             <a:fld id="{D1FC40BD-DF71-48B5-9F6E-F69B92E103E9}" type="datetimeFigureOut">
               <a:rPr lang="zh-CN" altLang="en-US" smtClean="0"/>
-              <a:t>2021/1/25</a:t>
+              <a:t>2021/1/26</a:t>
             </a:fld>
             <a:endParaRPr lang="zh-CN" altLang="en-US"/>
           </a:p>
@@ -1754,7 +4520,7 @@
           <a:p>
             <a:fld id="{D1FC40BD-DF71-48B5-9F6E-F69B92E103E9}" type="datetimeFigureOut">
               <a:rPr lang="zh-CN" altLang="en-US" smtClean="0"/>
-              <a:t>2021/1/25</a:t>
+              <a:t>2021/1/26</a:t>
             </a:fld>
             <a:endParaRPr lang="zh-CN" altLang="en-US"/>
           </a:p>
@@ -1849,7 +4615,7 @@
           <a:p>
             <a:fld id="{D1FC40BD-DF71-48B5-9F6E-F69B92E103E9}" type="datetimeFigureOut">
               <a:rPr lang="zh-CN" altLang="en-US" smtClean="0"/>
-              <a:t>2021/1/25</a:t>
+              <a:t>2021/1/26</a:t>
             </a:fld>
             <a:endParaRPr lang="zh-CN" altLang="en-US"/>
           </a:p>
@@ -2126,7 +4892,7 @@
           <a:p>
             <a:fld id="{D1FC40BD-DF71-48B5-9F6E-F69B92E103E9}" type="datetimeFigureOut">
               <a:rPr lang="zh-CN" altLang="en-US" smtClean="0"/>
-              <a:t>2021/1/25</a:t>
+              <a:t>2021/1/26</a:t>
             </a:fld>
             <a:endParaRPr lang="zh-CN" altLang="en-US"/>
           </a:p>
@@ -2383,7 +5149,7 @@
           <a:p>
             <a:fld id="{D1FC40BD-DF71-48B5-9F6E-F69B92E103E9}" type="datetimeFigureOut">
               <a:rPr lang="zh-CN" altLang="en-US" smtClean="0"/>
-              <a:t>2021/1/25</a:t>
+              <a:t>2021/1/26</a:t>
             </a:fld>
             <a:endParaRPr lang="zh-CN" altLang="en-US"/>
           </a:p>
@@ -2596,7 +5362,7 @@
           <a:p>
             <a:fld id="{D1FC40BD-DF71-48B5-9F6E-F69B92E103E9}" type="datetimeFigureOut">
               <a:rPr lang="zh-CN" altLang="en-US" smtClean="0"/>
-              <a:t>2021/1/25</a:t>
+              <a:t>2021/1/26</a:t>
             </a:fld>
             <a:endParaRPr lang="zh-CN" altLang="en-US"/>
           </a:p>
@@ -3184,12 +5950,113 @@
               <a:t>Chain Code</a:t>
             </a:r>
           </a:p>
-        </p:txBody>
-      </p:sp>
+          <a:p>
+            <a:r>
+              <a:rPr lang="en-US" altLang="zh-CN" dirty="0"/>
+              <a:t>Ledger</a:t>
+            </a:r>
+          </a:p>
+          <a:p>
+            <a:pPr lvl="1"/>
+            <a:r>
+              <a:rPr lang="en-US" altLang="zh-CN" dirty="0"/>
+              <a:t>Blockchain</a:t>
+            </a:r>
+          </a:p>
+          <a:p>
+            <a:pPr lvl="1"/>
+            <a:r>
+              <a:rPr lang="en-US" altLang="zh-CN" dirty="0"/>
+              <a:t>World State DB</a:t>
+            </a:r>
+          </a:p>
+        </p:txBody>
+      </p:sp>
+      <p:sp>
+        <p:nvSpPr>
+          <p:cNvPr id="4" name="AutoShape 2" descr="ledger.ledger">
+            <a:extLst>
+              <a:ext uri="{FF2B5EF4-FFF2-40B4-BE49-F238E27FC236}">
+                <a16:creationId xmlns:a16="http://schemas.microsoft.com/office/drawing/2014/main" id="{792CE1B9-CC83-4E0B-A866-D7C75362C0D5}"/>
+              </a:ext>
+            </a:extLst>
+          </p:cNvPr>
+          <p:cNvSpPr>
+            <a:spLocks noChangeAspect="1" noChangeArrowheads="1"/>
+          </p:cNvSpPr>
+          <p:nvPr/>
+        </p:nvSpPr>
+        <p:spPr bwMode="auto">
+          <a:xfrm>
+            <a:off x="5943600" y="3276600"/>
+            <a:ext cx="304800" cy="304800"/>
+          </a:xfrm>
+          <a:prstGeom prst="rect">
+            <a:avLst/>
+          </a:prstGeom>
+          <a:noFill/>
+          <a:extLst>
+            <a:ext uri="{909E8E84-426E-40DD-AFC4-6F175D3DCCD1}">
+              <a14:hiddenFill xmlns:a14="http://schemas.microsoft.com/office/drawing/2010/main">
+                <a:solidFill>
+                  <a:srgbClr val="FFFFFF"/>
+                </a:solidFill>
+              </a14:hiddenFill>
+            </a:ext>
+          </a:extLst>
+        </p:spPr>
+        <p:txBody>
+          <a:bodyPr vert="horz" wrap="square" lIns="91440" tIns="45720" rIns="91440" bIns="45720" numCol="1" anchor="t" anchorCtr="0" compatLnSpc="1">
+            <a:prstTxWarp prst="textNoShape">
+              <a:avLst/>
+            </a:prstTxWarp>
+          </a:bodyPr>
+          <a:lstStyle/>
+          <a:p>
+            <a:endParaRPr lang="zh-CN" altLang="en-US"/>
+          </a:p>
+        </p:txBody>
+      </p:sp>
+      <p:pic>
+        <p:nvPicPr>
+          <p:cNvPr id="8" name="图片 7">
+            <a:extLst>
+              <a:ext uri="{FF2B5EF4-FFF2-40B4-BE49-F238E27FC236}">
+                <a16:creationId xmlns:a16="http://schemas.microsoft.com/office/drawing/2014/main" id="{DB288511-4D5B-4FB3-AD5E-0548D59B15AC}"/>
+              </a:ext>
+            </a:extLst>
+          </p:cNvPr>
+          <p:cNvPicPr>
+            <a:picLocks noChangeAspect="1"/>
+          </p:cNvPicPr>
+          <p:nvPr/>
+        </p:nvPicPr>
+        <p:blipFill>
+          <a:blip r:embed="rId2">
+            <a:extLst>
+              <a:ext uri="{28A0092B-C50C-407E-A947-70E740481C1C}">
+                <a14:useLocalDpi xmlns:a14="http://schemas.microsoft.com/office/drawing/2010/main" val="0"/>
+              </a:ext>
+            </a:extLst>
+          </a:blip>
+          <a:stretch>
+            <a:fillRect/>
+          </a:stretch>
+        </p:blipFill>
+        <p:spPr>
+          <a:xfrm>
+            <a:off x="3937991" y="1690688"/>
+            <a:ext cx="8032498" cy="3604326"/>
+          </a:xfrm>
+          <a:prstGeom prst="rect">
+            <a:avLst/>
+          </a:prstGeom>
+        </p:spPr>
+      </p:pic>
     </p:spTree>
     <p:extLst>
       <p:ext uri="{BB962C8B-B14F-4D97-AF65-F5344CB8AC3E}">
-        <p14:creationId xmlns:p14="http://schemas.microsoft.com/office/powerpoint/2010/main" val="3571862158"/>
+        <p14:creationId xmlns:p14="http://schemas.microsoft.com/office/powerpoint/2010/main" val="3171075019"/>
       </p:ext>
     </p:extLst>
   </p:cSld>
@@ -3270,29 +6137,117 @@
           <a:p>
             <a:r>
               <a:rPr lang="en-US" altLang="zh-CN" dirty="0"/>
-              <a:t>Ledger</a:t>
+              <a:t>Gossip Protocol</a:t>
+            </a:r>
+          </a:p>
+          <a:p>
+            <a:r>
+              <a:rPr lang="en-US" altLang="zh-CN" dirty="0"/>
+              <a:t>Private Data</a:t>
             </a:r>
           </a:p>
           <a:p>
             <a:pPr lvl="1"/>
             <a:r>
               <a:rPr lang="en-US" altLang="zh-CN" dirty="0"/>
-              <a:t>Blockchain</a:t>
+              <a:t>Private Block</a:t>
             </a:r>
           </a:p>
           <a:p>
             <a:pPr lvl="1"/>
             <a:r>
               <a:rPr lang="en-US" altLang="zh-CN" dirty="0"/>
-              <a:t>World State DB</a:t>
-            </a:r>
-          </a:p>
-        </p:txBody>
-      </p:sp>
+              <a:t>Private DB</a:t>
+            </a:r>
+            <a:endParaRPr lang="zh-CN" altLang="en-US" dirty="0"/>
+          </a:p>
+        </p:txBody>
+      </p:sp>
+      <p:sp>
+        <p:nvSpPr>
+          <p:cNvPr id="4" name="AutoShape 2" descr="ledger.ledger">
+            <a:extLst>
+              <a:ext uri="{FF2B5EF4-FFF2-40B4-BE49-F238E27FC236}">
+                <a16:creationId xmlns:a16="http://schemas.microsoft.com/office/drawing/2014/main" id="{792CE1B9-CC83-4E0B-A866-D7C75362C0D5}"/>
+              </a:ext>
+            </a:extLst>
+          </p:cNvPr>
+          <p:cNvSpPr>
+            <a:spLocks noChangeAspect="1" noChangeArrowheads="1"/>
+          </p:cNvSpPr>
+          <p:nvPr/>
+        </p:nvSpPr>
+        <p:spPr bwMode="auto">
+          <a:xfrm>
+            <a:off x="5943600" y="3276600"/>
+            <a:ext cx="304800" cy="304800"/>
+          </a:xfrm>
+          <a:prstGeom prst="rect">
+            <a:avLst/>
+          </a:prstGeom>
+          <a:noFill/>
+          <a:extLst>
+            <a:ext uri="{909E8E84-426E-40DD-AFC4-6F175D3DCCD1}">
+              <a14:hiddenFill xmlns:a14="http://schemas.microsoft.com/office/drawing/2010/main">
+                <a:solidFill>
+                  <a:srgbClr val="FFFFFF"/>
+                </a:solidFill>
+              </a14:hiddenFill>
+            </a:ext>
+          </a:extLst>
+        </p:spPr>
+        <p:txBody>
+          <a:bodyPr vert="horz" wrap="square" lIns="91440" tIns="45720" rIns="91440" bIns="45720" numCol="1" anchor="t" anchorCtr="0" compatLnSpc="1">
+            <a:prstTxWarp prst="textNoShape">
+              <a:avLst/>
+            </a:prstTxWarp>
+          </a:bodyPr>
+          <a:lstStyle/>
+          <a:p>
+            <a:endParaRPr lang="zh-CN" altLang="en-US"/>
+          </a:p>
+        </p:txBody>
+      </p:sp>
+      <p:pic>
+        <p:nvPicPr>
+          <p:cNvPr id="6" name="图片 5" descr="图示&#10;&#10;描述已自动生成">
+            <a:extLst>
+              <a:ext uri="{FF2B5EF4-FFF2-40B4-BE49-F238E27FC236}">
+                <a16:creationId xmlns:a16="http://schemas.microsoft.com/office/drawing/2014/main" id="{D1AC2F0C-F9B9-4838-845D-A95C77880CE5}"/>
+              </a:ext>
+            </a:extLst>
+          </p:cNvPr>
+          <p:cNvPicPr>
+            <a:picLocks noChangeAspect="1"/>
+          </p:cNvPicPr>
+          <p:nvPr/>
+        </p:nvPicPr>
+        <p:blipFill>
+          <a:blip r:embed="rId2">
+            <a:extLst>
+              <a:ext uri="{28A0092B-C50C-407E-A947-70E740481C1C}">
+                <a14:useLocalDpi xmlns:a14="http://schemas.microsoft.com/office/drawing/2010/main" val="0"/>
+              </a:ext>
+            </a:extLst>
+          </a:blip>
+          <a:stretch>
+            <a:fillRect/>
+          </a:stretch>
+        </p:blipFill>
+        <p:spPr>
+          <a:xfrm>
+            <a:off x="4022124" y="1690688"/>
+            <a:ext cx="7735712" cy="4351338"/>
+          </a:xfrm>
+          <a:prstGeom prst="rect">
+            <a:avLst/>
+          </a:prstGeom>
+        </p:spPr>
+      </p:pic>
     </p:spTree>
     <p:extLst>
       <p:ext uri="{BB962C8B-B14F-4D97-AF65-F5344CB8AC3E}">
-        <p14:creationId xmlns:p14="http://schemas.microsoft.com/office/powerpoint/2010/main" val="3171075019"/>
+        <p14:creationId xmlns:p14="http://schemas.microsoft.com/office/powerpoint/2010/main" val="3898230834"/>
       </p:ext>
     </p:extLst>
   </p:cSld>
@@ -3342,7 +6297,11 @@
           <a:p>
             <a:r>
               <a:rPr lang="en-US" altLang="zh-CN" dirty="0"/>
-              <a:t>1. Peer</a:t>
+              <a:t>2. </a:t>
+            </a:r>
+            <a:r>
+              <a:rPr lang="en-US" altLang="zh-CN" dirty="0" err="1"/>
+              <a:t>Orderer</a:t>
             </a:r>
             <a:endParaRPr lang="zh-CN" altLang="en-US" dirty="0"/>
           </a:p>
@@ -3366,35 +6325,24 @@
         </p:nvSpPr>
         <p:spPr/>
         <p:txBody>
-          <a:bodyPr>
-            <a:normAutofit/>
-          </a:bodyPr>
+          <a:bodyPr/>
           <a:lstStyle/>
           <a:p>
             <a:r>
               <a:rPr lang="en-US" altLang="zh-CN" dirty="0"/>
-              <a:t>Ledger</a:t>
-            </a:r>
-          </a:p>
-          <a:p>
-            <a:pPr lvl="1"/>
+              <a:t>What</a:t>
+            </a:r>
+          </a:p>
+          <a:p>
             <a:r>
               <a:rPr lang="en-US" altLang="zh-CN" dirty="0"/>
-              <a:t>Private Data</a:t>
-            </a:r>
-          </a:p>
-          <a:p>
-            <a:pPr lvl="2"/>
+              <a:t>Why</a:t>
+            </a:r>
+          </a:p>
+          <a:p>
             <a:r>
               <a:rPr lang="en-US" altLang="zh-CN" dirty="0"/>
-              <a:t>Private Block</a:t>
-            </a:r>
-          </a:p>
-          <a:p>
-            <a:pPr lvl="2"/>
-            <a:r>
-              <a:rPr lang="en-US" altLang="zh-CN" dirty="0"/>
-              <a:t>Private DB</a:t>
+              <a:t>How</a:t>
             </a:r>
             <a:endParaRPr lang="zh-CN" altLang="en-US" dirty="0"/>
           </a:p>
@@ -3403,7 +6351,7 @@
     </p:spTree>
     <p:extLst>
       <p:ext uri="{BB962C8B-B14F-4D97-AF65-F5344CB8AC3E}">
-        <p14:creationId xmlns:p14="http://schemas.microsoft.com/office/powerpoint/2010/main" val="3019408843"/>
+        <p14:creationId xmlns:p14="http://schemas.microsoft.com/office/powerpoint/2010/main" val="2814125316"/>
       </p:ext>
     </p:extLst>
   </p:cSld>
@@ -3453,7 +6401,11 @@
           <a:p>
             <a:r>
               <a:rPr lang="en-US" altLang="zh-CN" dirty="0"/>
-              <a:t>1. Peer</a:t>
+              <a:t>2. </a:t>
+            </a:r>
+            <a:r>
+              <a:rPr lang="en-US" altLang="zh-CN" dirty="0" err="1"/>
+              <a:t>Orderer</a:t>
             </a:r>
             <a:endParaRPr lang="zh-CN" altLang="en-US" dirty="0"/>
           </a:p>
@@ -3477,14 +6429,33 @@
         </p:nvSpPr>
         <p:spPr/>
         <p:txBody>
-          <a:bodyPr>
-            <a:normAutofit/>
-          </a:bodyPr>
+          <a:bodyPr/>
           <a:lstStyle/>
           <a:p>
             <a:r>
               <a:rPr lang="en-US" altLang="zh-CN" dirty="0"/>
-              <a:t>Gossip Protocol</a:t>
+              <a:t>Order Proxy</a:t>
+            </a:r>
+          </a:p>
+          <a:p>
+            <a:pPr lvl="1"/>
+            <a:r>
+              <a:rPr lang="en-US" altLang="zh-CN" dirty="0"/>
+              <a:t>Solo</a:t>
+            </a:r>
+          </a:p>
+          <a:p>
+            <a:pPr lvl="1"/>
+            <a:r>
+              <a:rPr lang="en-US" altLang="zh-CN" dirty="0"/>
+              <a:t>Kafka</a:t>
+            </a:r>
+          </a:p>
+          <a:p>
+            <a:pPr lvl="1"/>
+            <a:r>
+              <a:rPr lang="en-US" altLang="zh-CN" dirty="0"/>
+              <a:t>Raft</a:t>
             </a:r>
             <a:endParaRPr lang="zh-CN" altLang="en-US" dirty="0"/>
           </a:p>
@@ -3493,7 +6464,7 @@
     </p:spTree>
     <p:extLst>
       <p:ext uri="{BB962C8B-B14F-4D97-AF65-F5344CB8AC3E}">
-        <p14:creationId xmlns:p14="http://schemas.microsoft.com/office/powerpoint/2010/main" val="4232179613"/>
+        <p14:creationId xmlns:p14="http://schemas.microsoft.com/office/powerpoint/2010/main" val="2572309467"/>
       </p:ext>
     </p:extLst>
   </p:cSld>
@@ -3543,11 +6514,7 @@
           <a:p>
             <a:r>
               <a:rPr lang="en-US" altLang="zh-CN" dirty="0"/>
-              <a:t>2. </a:t>
-            </a:r>
-            <a:r>
-              <a:rPr lang="en-US" altLang="zh-CN" dirty="0" err="1"/>
-              <a:t>Orderer</a:t>
+              <a:t>3. CA</a:t>
             </a:r>
             <a:endParaRPr lang="zh-CN" altLang="en-US" dirty="0"/>
           </a:p>
@@ -3576,16 +6543,41 @@
           <a:p>
             <a:r>
               <a:rPr lang="en-US" altLang="zh-CN" dirty="0"/>
-              <a:t>【】</a:t>
-            </a:r>
-            <a:endParaRPr lang="zh-CN" altLang="en-US" dirty="0"/>
+              <a:t>CA Server</a:t>
+            </a:r>
+          </a:p>
+          <a:p>
+            <a:pPr lvl="1"/>
+            <a:r>
+              <a:rPr lang="en-US" altLang="zh-CN" dirty="0"/>
+              <a:t>Root CA</a:t>
+            </a:r>
+          </a:p>
+          <a:p>
+            <a:pPr lvl="1"/>
+            <a:r>
+              <a:rPr lang="en-US" altLang="zh-CN" dirty="0"/>
+              <a:t>Intermediate CA</a:t>
+            </a:r>
+          </a:p>
+          <a:p>
+            <a:r>
+              <a:rPr lang="en-US" altLang="zh-CN" dirty="0"/>
+              <a:t>CA Client</a:t>
+            </a:r>
+          </a:p>
+          <a:p>
+            <a:r>
+              <a:rPr lang="en-US" altLang="zh-CN" dirty="0"/>
+              <a:t>MSP</a:t>
+            </a:r>
           </a:p>
         </p:txBody>
       </p:sp>
     </p:spTree>
     <p:extLst>
       <p:ext uri="{BB962C8B-B14F-4D97-AF65-F5344CB8AC3E}">
-        <p14:creationId xmlns:p14="http://schemas.microsoft.com/office/powerpoint/2010/main" val="2814125316"/>
+        <p14:creationId xmlns:p14="http://schemas.microsoft.com/office/powerpoint/2010/main" val="3649070300"/>
       </p:ext>
     </p:extLst>
   </p:cSld>
@@ -3635,11 +6627,7 @@
           <a:p>
             <a:r>
               <a:rPr lang="en-US" altLang="zh-CN" dirty="0"/>
-              <a:t>2. </a:t>
-            </a:r>
-            <a:r>
-              <a:rPr lang="en-US" altLang="zh-CN" dirty="0" err="1"/>
-              <a:t>Orderer</a:t>
+              <a:t>4. Client</a:t>
             </a:r>
             <a:endParaRPr lang="zh-CN" altLang="en-US" dirty="0"/>
           </a:p>
@@ -3668,7 +6656,13 @@
           <a:p>
             <a:r>
               <a:rPr lang="en-US" altLang="zh-CN" dirty="0"/>
-              <a:t>Order Proxy</a:t>
+              <a:t>SDK</a:t>
+            </a:r>
+          </a:p>
+          <a:p>
+            <a:r>
+              <a:rPr lang="en-US" altLang="zh-CN" dirty="0"/>
+              <a:t>Application</a:t>
             </a:r>
             <a:endParaRPr lang="zh-CN" altLang="en-US" dirty="0"/>
           </a:p>
@@ -3677,7 +6671,7 @@
     </p:spTree>
     <p:extLst>
       <p:ext uri="{BB962C8B-B14F-4D97-AF65-F5344CB8AC3E}">
-        <p14:creationId xmlns:p14="http://schemas.microsoft.com/office/powerpoint/2010/main" val="2572309467"/>
+        <p14:creationId xmlns:p14="http://schemas.microsoft.com/office/powerpoint/2010/main" val="2632436869"/>
       </p:ext>
     </p:extLst>
   </p:cSld>
@@ -3709,7 +6703,7 @@
           <p:cNvPr id="2" name="标题 1">
             <a:extLst>
               <a:ext uri="{FF2B5EF4-FFF2-40B4-BE49-F238E27FC236}">
-                <a16:creationId xmlns:a16="http://schemas.microsoft.com/office/drawing/2014/main" id="{59E53C8E-1407-48C7-BC53-331B3B3C2F84}"/>
+                <a16:creationId xmlns:a16="http://schemas.microsoft.com/office/drawing/2014/main" id="{696A5807-AB6E-4F45-99F4-9C05A7BD8CDB}"/>
               </a:ext>
             </a:extLst>
           </p:cNvPr>
@@ -3717,68 +6711,33 @@
             <a:spLocks noGrp="1"/>
           </p:cNvSpPr>
           <p:nvPr>
-            <p:ph type="title"/>
-          </p:nvPr>
-        </p:nvSpPr>
-        <p:spPr/>
-        <p:txBody>
-          <a:bodyPr/>
+            <p:ph type="ctrTitle"/>
+          </p:nvPr>
+        </p:nvSpPr>
+        <p:spPr>
+          <a:xfrm>
+            <a:off x="600173" y="2910526"/>
+            <a:ext cx="10991654" cy="1036948"/>
+          </a:xfrm>
+        </p:spPr>
+        <p:txBody>
+          <a:bodyPr>
+            <a:normAutofit/>
+          </a:bodyPr>
           <a:lstStyle/>
           <a:p>
             <a:r>
               <a:rPr lang="en-US" altLang="zh-CN" dirty="0"/>
-              <a:t>3. CA</a:t>
+              <a:t>Part 3: Relationship</a:t>
             </a:r>
             <a:endParaRPr lang="zh-CN" altLang="en-US" dirty="0"/>
-          </a:p>
-        </p:txBody>
-      </p:sp>
-      <p:sp>
-        <p:nvSpPr>
-          <p:cNvPr id="3" name="内容占位符 2">
-            <a:extLst>
-              <a:ext uri="{FF2B5EF4-FFF2-40B4-BE49-F238E27FC236}">
-                <a16:creationId xmlns:a16="http://schemas.microsoft.com/office/drawing/2014/main" id="{1A9EC2D7-6463-4A6F-90EE-399D9456DD0A}"/>
-              </a:ext>
-            </a:extLst>
-          </p:cNvPr>
-          <p:cNvSpPr>
-            <a:spLocks noGrp="1"/>
-          </p:cNvSpPr>
-          <p:nvPr>
-            <p:ph idx="1"/>
-          </p:nvPr>
-        </p:nvSpPr>
-        <p:spPr/>
-        <p:txBody>
-          <a:bodyPr/>
-          <a:lstStyle/>
-          <a:p>
-            <a:r>
-              <a:rPr lang="en-US" altLang="zh-CN" dirty="0"/>
-              <a:t>CA Server</a:t>
-            </a:r>
-          </a:p>
-          <a:p>
-            <a:pPr lvl="1"/>
-            <a:r>
-              <a:rPr lang="en-US" altLang="zh-CN" dirty="0"/>
-              <a:t>Root CA</a:t>
-            </a:r>
-          </a:p>
-          <a:p>
-            <a:pPr lvl="1"/>
-            <a:r>
-              <a:rPr lang="en-US" altLang="zh-CN" dirty="0"/>
-              <a:t>Intermediate CA</a:t>
-            </a:r>
           </a:p>
         </p:txBody>
       </p:sp>
     </p:spTree>
     <p:extLst>
       <p:ext uri="{BB962C8B-B14F-4D97-AF65-F5344CB8AC3E}">
-        <p14:creationId xmlns:p14="http://schemas.microsoft.com/office/powerpoint/2010/main" val="3649070300"/>
+        <p14:creationId xmlns:p14="http://schemas.microsoft.com/office/powerpoint/2010/main" val="2168299143"/>
       </p:ext>
     </p:extLst>
   </p:cSld>
@@ -3810,528 +6769,6 @@
           <p:cNvPr id="2" name="标题 1">
             <a:extLst>
               <a:ext uri="{FF2B5EF4-FFF2-40B4-BE49-F238E27FC236}">
-                <a16:creationId xmlns:a16="http://schemas.microsoft.com/office/drawing/2014/main" id="{59E53C8E-1407-48C7-BC53-331B3B3C2F84}"/>
-              </a:ext>
-            </a:extLst>
-          </p:cNvPr>
-          <p:cNvSpPr>
-            <a:spLocks noGrp="1"/>
-          </p:cNvSpPr>
-          <p:nvPr>
-            <p:ph type="title"/>
-          </p:nvPr>
-        </p:nvSpPr>
-        <p:spPr/>
-        <p:txBody>
-          <a:bodyPr/>
-          <a:lstStyle/>
-          <a:p>
-            <a:r>
-              <a:rPr lang="en-US" altLang="zh-CN" dirty="0"/>
-              <a:t>3. CA</a:t>
-            </a:r>
-            <a:endParaRPr lang="zh-CN" altLang="en-US" dirty="0"/>
-          </a:p>
-        </p:txBody>
-      </p:sp>
-      <p:sp>
-        <p:nvSpPr>
-          <p:cNvPr id="3" name="内容占位符 2">
-            <a:extLst>
-              <a:ext uri="{FF2B5EF4-FFF2-40B4-BE49-F238E27FC236}">
-                <a16:creationId xmlns:a16="http://schemas.microsoft.com/office/drawing/2014/main" id="{1A9EC2D7-6463-4A6F-90EE-399D9456DD0A}"/>
-              </a:ext>
-            </a:extLst>
-          </p:cNvPr>
-          <p:cNvSpPr>
-            <a:spLocks noGrp="1"/>
-          </p:cNvSpPr>
-          <p:nvPr>
-            <p:ph idx="1"/>
-          </p:nvPr>
-        </p:nvSpPr>
-        <p:spPr/>
-        <p:txBody>
-          <a:bodyPr/>
-          <a:lstStyle/>
-          <a:p>
-            <a:r>
-              <a:rPr lang="en-US" altLang="zh-CN" dirty="0"/>
-              <a:t>CA Client</a:t>
-            </a:r>
-          </a:p>
-        </p:txBody>
-      </p:sp>
-    </p:spTree>
-    <p:extLst>
-      <p:ext uri="{BB962C8B-B14F-4D97-AF65-F5344CB8AC3E}">
-        <p14:creationId xmlns:p14="http://schemas.microsoft.com/office/powerpoint/2010/main" val="207023413"/>
-      </p:ext>
-    </p:extLst>
-  </p:cSld>
-  <p:clrMapOvr>
-    <a:masterClrMapping/>
-  </p:clrMapOvr>
-</p:sld>
-</file>
-
-<file path=ppt/slides/slide18.xml><?xml version="1.0" encoding="utf-8"?>
-<p:sld xmlns:a="http://schemas.openxmlformats.org/drawingml/2006/main" xmlns:r="http://schemas.openxmlformats.org/officeDocument/2006/relationships" xmlns:p="http://schemas.openxmlformats.org/presentationml/2006/main">
-  <p:cSld>
-    <p:spTree>
-      <p:nvGrpSpPr>
-        <p:cNvPr id="1" name=""/>
-        <p:cNvGrpSpPr/>
-        <p:nvPr/>
-      </p:nvGrpSpPr>
-      <p:grpSpPr>
-        <a:xfrm>
-          <a:off x="0" y="0"/>
-          <a:ext cx="0" cy="0"/>
-          <a:chOff x="0" y="0"/>
-          <a:chExt cx="0" cy="0"/>
-        </a:xfrm>
-      </p:grpSpPr>
-      <p:sp>
-        <p:nvSpPr>
-          <p:cNvPr id="2" name="标题 1">
-            <a:extLst>
-              <a:ext uri="{FF2B5EF4-FFF2-40B4-BE49-F238E27FC236}">
-                <a16:creationId xmlns:a16="http://schemas.microsoft.com/office/drawing/2014/main" id="{59E53C8E-1407-48C7-BC53-331B3B3C2F84}"/>
-              </a:ext>
-            </a:extLst>
-          </p:cNvPr>
-          <p:cNvSpPr>
-            <a:spLocks noGrp="1"/>
-          </p:cNvSpPr>
-          <p:nvPr>
-            <p:ph type="title"/>
-          </p:nvPr>
-        </p:nvSpPr>
-        <p:spPr/>
-        <p:txBody>
-          <a:bodyPr/>
-          <a:lstStyle/>
-          <a:p>
-            <a:r>
-              <a:rPr lang="en-US" altLang="zh-CN" dirty="0"/>
-              <a:t>3. CA</a:t>
-            </a:r>
-            <a:endParaRPr lang="zh-CN" altLang="en-US" dirty="0"/>
-          </a:p>
-        </p:txBody>
-      </p:sp>
-      <p:sp>
-        <p:nvSpPr>
-          <p:cNvPr id="3" name="内容占位符 2">
-            <a:extLst>
-              <a:ext uri="{FF2B5EF4-FFF2-40B4-BE49-F238E27FC236}">
-                <a16:creationId xmlns:a16="http://schemas.microsoft.com/office/drawing/2014/main" id="{1A9EC2D7-6463-4A6F-90EE-399D9456DD0A}"/>
-              </a:ext>
-            </a:extLst>
-          </p:cNvPr>
-          <p:cNvSpPr>
-            <a:spLocks noGrp="1"/>
-          </p:cNvSpPr>
-          <p:nvPr>
-            <p:ph idx="1"/>
-          </p:nvPr>
-        </p:nvSpPr>
-        <p:spPr/>
-        <p:txBody>
-          <a:bodyPr/>
-          <a:lstStyle/>
-          <a:p>
-            <a:r>
-              <a:rPr lang="en-US" altLang="zh-CN" dirty="0"/>
-              <a:t>MSP</a:t>
-            </a:r>
-          </a:p>
-        </p:txBody>
-      </p:sp>
-    </p:spTree>
-    <p:extLst>
-      <p:ext uri="{BB962C8B-B14F-4D97-AF65-F5344CB8AC3E}">
-        <p14:creationId xmlns:p14="http://schemas.microsoft.com/office/powerpoint/2010/main" val="147809833"/>
-      </p:ext>
-    </p:extLst>
-  </p:cSld>
-  <p:clrMapOvr>
-    <a:masterClrMapping/>
-  </p:clrMapOvr>
-</p:sld>
-</file>
-
-<file path=ppt/slides/slide19.xml><?xml version="1.0" encoding="utf-8"?>
-<p:sld xmlns:a="http://schemas.openxmlformats.org/drawingml/2006/main" xmlns:r="http://schemas.openxmlformats.org/officeDocument/2006/relationships" xmlns:p="http://schemas.openxmlformats.org/presentationml/2006/main">
-  <p:cSld>
-    <p:spTree>
-      <p:nvGrpSpPr>
-        <p:cNvPr id="1" name=""/>
-        <p:cNvGrpSpPr/>
-        <p:nvPr/>
-      </p:nvGrpSpPr>
-      <p:grpSpPr>
-        <a:xfrm>
-          <a:off x="0" y="0"/>
-          <a:ext cx="0" cy="0"/>
-          <a:chOff x="0" y="0"/>
-          <a:chExt cx="0" cy="0"/>
-        </a:xfrm>
-      </p:grpSpPr>
-      <p:sp>
-        <p:nvSpPr>
-          <p:cNvPr id="2" name="标题 1">
-            <a:extLst>
-              <a:ext uri="{FF2B5EF4-FFF2-40B4-BE49-F238E27FC236}">
-                <a16:creationId xmlns:a16="http://schemas.microsoft.com/office/drawing/2014/main" id="{59E53C8E-1407-48C7-BC53-331B3B3C2F84}"/>
-              </a:ext>
-            </a:extLst>
-          </p:cNvPr>
-          <p:cNvSpPr>
-            <a:spLocks noGrp="1"/>
-          </p:cNvSpPr>
-          <p:nvPr>
-            <p:ph type="title"/>
-          </p:nvPr>
-        </p:nvSpPr>
-        <p:spPr/>
-        <p:txBody>
-          <a:bodyPr/>
-          <a:lstStyle/>
-          <a:p>
-            <a:r>
-              <a:rPr lang="en-US" altLang="zh-CN" dirty="0"/>
-              <a:t>4. Client</a:t>
-            </a:r>
-            <a:endParaRPr lang="zh-CN" altLang="en-US" dirty="0"/>
-          </a:p>
-        </p:txBody>
-      </p:sp>
-      <p:sp>
-        <p:nvSpPr>
-          <p:cNvPr id="3" name="内容占位符 2">
-            <a:extLst>
-              <a:ext uri="{FF2B5EF4-FFF2-40B4-BE49-F238E27FC236}">
-                <a16:creationId xmlns:a16="http://schemas.microsoft.com/office/drawing/2014/main" id="{1A9EC2D7-6463-4A6F-90EE-399D9456DD0A}"/>
-              </a:ext>
-            </a:extLst>
-          </p:cNvPr>
-          <p:cNvSpPr>
-            <a:spLocks noGrp="1"/>
-          </p:cNvSpPr>
-          <p:nvPr>
-            <p:ph idx="1"/>
-          </p:nvPr>
-        </p:nvSpPr>
-        <p:spPr/>
-        <p:txBody>
-          <a:bodyPr/>
-          <a:lstStyle/>
-          <a:p>
-            <a:r>
-              <a:rPr lang="en-US" altLang="zh-CN" dirty="0"/>
-              <a:t>Application</a:t>
-            </a:r>
-            <a:endParaRPr lang="zh-CN" altLang="en-US" dirty="0"/>
-          </a:p>
-        </p:txBody>
-      </p:sp>
-    </p:spTree>
-    <p:extLst>
-      <p:ext uri="{BB962C8B-B14F-4D97-AF65-F5344CB8AC3E}">
-        <p14:creationId xmlns:p14="http://schemas.microsoft.com/office/powerpoint/2010/main" val="2632436869"/>
-      </p:ext>
-    </p:extLst>
-  </p:cSld>
-  <p:clrMapOvr>
-    <a:masterClrMapping/>
-  </p:clrMapOvr>
-</p:sld>
-</file>
-
-<file path=ppt/slides/slide2.xml><?xml version="1.0" encoding="utf-8"?>
-<p:sld xmlns:a="http://schemas.openxmlformats.org/drawingml/2006/main" xmlns:r="http://schemas.openxmlformats.org/officeDocument/2006/relationships" xmlns:p="http://schemas.openxmlformats.org/presentationml/2006/main">
-  <p:cSld>
-    <p:spTree>
-      <p:nvGrpSpPr>
-        <p:cNvPr id="1" name=""/>
-        <p:cNvGrpSpPr/>
-        <p:nvPr/>
-      </p:nvGrpSpPr>
-      <p:grpSpPr>
-        <a:xfrm>
-          <a:off x="0" y="0"/>
-          <a:ext cx="0" cy="0"/>
-          <a:chOff x="0" y="0"/>
-          <a:chExt cx="0" cy="0"/>
-        </a:xfrm>
-      </p:grpSpPr>
-      <p:sp>
-        <p:nvSpPr>
-          <p:cNvPr id="2" name="标题 1">
-            <a:extLst>
-              <a:ext uri="{FF2B5EF4-FFF2-40B4-BE49-F238E27FC236}">
-                <a16:creationId xmlns:a16="http://schemas.microsoft.com/office/drawing/2014/main" id="{1AFCDE6B-7737-486C-9FD6-45EB60958887}"/>
-              </a:ext>
-            </a:extLst>
-          </p:cNvPr>
-          <p:cNvSpPr>
-            <a:spLocks noGrp="1"/>
-          </p:cNvSpPr>
-          <p:nvPr>
-            <p:ph type="title"/>
-          </p:nvPr>
-        </p:nvSpPr>
-        <p:spPr/>
-        <p:txBody>
-          <a:bodyPr/>
-          <a:lstStyle/>
-          <a:p>
-            <a:r>
-              <a:rPr lang="en-US" altLang="zh-CN" dirty="0"/>
-              <a:t>Content</a:t>
-            </a:r>
-            <a:endParaRPr lang="zh-CN" altLang="en-US" dirty="0"/>
-          </a:p>
-        </p:txBody>
-      </p:sp>
-      <p:sp>
-        <p:nvSpPr>
-          <p:cNvPr id="3" name="内容占位符 2">
-            <a:extLst>
-              <a:ext uri="{FF2B5EF4-FFF2-40B4-BE49-F238E27FC236}">
-                <a16:creationId xmlns:a16="http://schemas.microsoft.com/office/drawing/2014/main" id="{57BDFA4D-BDFA-44D4-AFC0-D9158C90CC8A}"/>
-              </a:ext>
-            </a:extLst>
-          </p:cNvPr>
-          <p:cNvSpPr>
-            <a:spLocks noGrp="1"/>
-          </p:cNvSpPr>
-          <p:nvPr>
-            <p:ph idx="1"/>
-          </p:nvPr>
-        </p:nvSpPr>
-        <p:spPr/>
-        <p:txBody>
-          <a:bodyPr/>
-          <a:lstStyle/>
-          <a:p>
-            <a:r>
-              <a:rPr lang="en-US" altLang="zh-CN" dirty="0"/>
-              <a:t>Architecture Overview </a:t>
-            </a:r>
-          </a:p>
-          <a:p>
-            <a:r>
-              <a:rPr lang="en-US" altLang="zh-CN" dirty="0"/>
-              <a:t>Roles</a:t>
-            </a:r>
-          </a:p>
-          <a:p>
-            <a:r>
-              <a:rPr lang="en-US" altLang="zh-CN" dirty="0"/>
-              <a:t>Relationship</a:t>
-            </a:r>
-          </a:p>
-          <a:p>
-            <a:r>
-              <a:rPr lang="en-US" altLang="zh-CN" dirty="0"/>
-              <a:t>Conclusion</a:t>
-            </a:r>
-            <a:endParaRPr lang="zh-CN" altLang="en-US" dirty="0"/>
-          </a:p>
-        </p:txBody>
-      </p:sp>
-    </p:spTree>
-    <p:extLst>
-      <p:ext uri="{BB962C8B-B14F-4D97-AF65-F5344CB8AC3E}">
-        <p14:creationId xmlns:p14="http://schemas.microsoft.com/office/powerpoint/2010/main" val="1026712134"/>
-      </p:ext>
-    </p:extLst>
-  </p:cSld>
-  <p:clrMapOvr>
-    <a:masterClrMapping/>
-  </p:clrMapOvr>
-</p:sld>
-</file>
-
-<file path=ppt/slides/slide20.xml><?xml version="1.0" encoding="utf-8"?>
-<p:sld xmlns:a="http://schemas.openxmlformats.org/drawingml/2006/main" xmlns:r="http://schemas.openxmlformats.org/officeDocument/2006/relationships" xmlns:p="http://schemas.openxmlformats.org/presentationml/2006/main">
-  <p:cSld>
-    <p:spTree>
-      <p:nvGrpSpPr>
-        <p:cNvPr id="1" name=""/>
-        <p:cNvGrpSpPr/>
-        <p:nvPr/>
-      </p:nvGrpSpPr>
-      <p:grpSpPr>
-        <a:xfrm>
-          <a:off x="0" y="0"/>
-          <a:ext cx="0" cy="0"/>
-          <a:chOff x="0" y="0"/>
-          <a:chExt cx="0" cy="0"/>
-        </a:xfrm>
-      </p:grpSpPr>
-      <p:sp>
-        <p:nvSpPr>
-          <p:cNvPr id="2" name="标题 1">
-            <a:extLst>
-              <a:ext uri="{FF2B5EF4-FFF2-40B4-BE49-F238E27FC236}">
-                <a16:creationId xmlns:a16="http://schemas.microsoft.com/office/drawing/2014/main" id="{59E53C8E-1407-48C7-BC53-331B3B3C2F84}"/>
-              </a:ext>
-            </a:extLst>
-          </p:cNvPr>
-          <p:cNvSpPr>
-            <a:spLocks noGrp="1"/>
-          </p:cNvSpPr>
-          <p:nvPr>
-            <p:ph type="title"/>
-          </p:nvPr>
-        </p:nvSpPr>
-        <p:spPr/>
-        <p:txBody>
-          <a:bodyPr/>
-          <a:lstStyle/>
-          <a:p>
-            <a:r>
-              <a:rPr lang="en-US" altLang="zh-CN" dirty="0"/>
-              <a:t>4. Client</a:t>
-            </a:r>
-            <a:endParaRPr lang="zh-CN" altLang="en-US" dirty="0"/>
-          </a:p>
-        </p:txBody>
-      </p:sp>
-      <p:sp>
-        <p:nvSpPr>
-          <p:cNvPr id="3" name="内容占位符 2">
-            <a:extLst>
-              <a:ext uri="{FF2B5EF4-FFF2-40B4-BE49-F238E27FC236}">
-                <a16:creationId xmlns:a16="http://schemas.microsoft.com/office/drawing/2014/main" id="{1A9EC2D7-6463-4A6F-90EE-399D9456DD0A}"/>
-              </a:ext>
-            </a:extLst>
-          </p:cNvPr>
-          <p:cNvSpPr>
-            <a:spLocks noGrp="1"/>
-          </p:cNvSpPr>
-          <p:nvPr>
-            <p:ph idx="1"/>
-          </p:nvPr>
-        </p:nvSpPr>
-        <p:spPr/>
-        <p:txBody>
-          <a:bodyPr/>
-          <a:lstStyle/>
-          <a:p>
-            <a:r>
-              <a:rPr lang="en-US" altLang="zh-CN" dirty="0"/>
-              <a:t>SDK</a:t>
-            </a:r>
-            <a:endParaRPr lang="zh-CN" altLang="en-US" dirty="0"/>
-          </a:p>
-        </p:txBody>
-      </p:sp>
-    </p:spTree>
-    <p:extLst>
-      <p:ext uri="{BB962C8B-B14F-4D97-AF65-F5344CB8AC3E}">
-        <p14:creationId xmlns:p14="http://schemas.microsoft.com/office/powerpoint/2010/main" val="3429407026"/>
-      </p:ext>
-    </p:extLst>
-  </p:cSld>
-  <p:clrMapOvr>
-    <a:masterClrMapping/>
-  </p:clrMapOvr>
-</p:sld>
-</file>
-
-<file path=ppt/slides/slide21.xml><?xml version="1.0" encoding="utf-8"?>
-<p:sld xmlns:a="http://schemas.openxmlformats.org/drawingml/2006/main" xmlns:r="http://schemas.openxmlformats.org/officeDocument/2006/relationships" xmlns:p="http://schemas.openxmlformats.org/presentationml/2006/main">
-  <p:cSld>
-    <p:spTree>
-      <p:nvGrpSpPr>
-        <p:cNvPr id="1" name=""/>
-        <p:cNvGrpSpPr/>
-        <p:nvPr/>
-      </p:nvGrpSpPr>
-      <p:grpSpPr>
-        <a:xfrm>
-          <a:off x="0" y="0"/>
-          <a:ext cx="0" cy="0"/>
-          <a:chOff x="0" y="0"/>
-          <a:chExt cx="0" cy="0"/>
-        </a:xfrm>
-      </p:grpSpPr>
-      <p:sp>
-        <p:nvSpPr>
-          <p:cNvPr id="2" name="标题 1">
-            <a:extLst>
-              <a:ext uri="{FF2B5EF4-FFF2-40B4-BE49-F238E27FC236}">
-                <a16:creationId xmlns:a16="http://schemas.microsoft.com/office/drawing/2014/main" id="{696A5807-AB6E-4F45-99F4-9C05A7BD8CDB}"/>
-              </a:ext>
-            </a:extLst>
-          </p:cNvPr>
-          <p:cNvSpPr>
-            <a:spLocks noGrp="1"/>
-          </p:cNvSpPr>
-          <p:nvPr>
-            <p:ph type="ctrTitle"/>
-          </p:nvPr>
-        </p:nvSpPr>
-        <p:spPr>
-          <a:xfrm>
-            <a:off x="600173" y="2910526"/>
-            <a:ext cx="10991654" cy="1036948"/>
-          </a:xfrm>
-        </p:spPr>
-        <p:txBody>
-          <a:bodyPr>
-            <a:normAutofit/>
-          </a:bodyPr>
-          <a:lstStyle/>
-          <a:p>
-            <a:r>
-              <a:rPr lang="en-US" altLang="zh-CN" dirty="0"/>
-              <a:t>Part 3: Relationship</a:t>
-            </a:r>
-            <a:endParaRPr lang="zh-CN" altLang="en-US" dirty="0"/>
-          </a:p>
-        </p:txBody>
-      </p:sp>
-    </p:spTree>
-    <p:extLst>
-      <p:ext uri="{BB962C8B-B14F-4D97-AF65-F5344CB8AC3E}">
-        <p14:creationId xmlns:p14="http://schemas.microsoft.com/office/powerpoint/2010/main" val="2168299143"/>
-      </p:ext>
-    </p:extLst>
-  </p:cSld>
-  <p:clrMapOvr>
-    <a:masterClrMapping/>
-  </p:clrMapOvr>
-</p:sld>
-</file>
-
-<file path=ppt/slides/slide22.xml><?xml version="1.0" encoding="utf-8"?>
-<p:sld xmlns:a="http://schemas.openxmlformats.org/drawingml/2006/main" xmlns:r="http://schemas.openxmlformats.org/officeDocument/2006/relationships" xmlns:p="http://schemas.openxmlformats.org/presentationml/2006/main">
-  <p:cSld>
-    <p:spTree>
-      <p:nvGrpSpPr>
-        <p:cNvPr id="1" name=""/>
-        <p:cNvGrpSpPr/>
-        <p:nvPr/>
-      </p:nvGrpSpPr>
-      <p:grpSpPr>
-        <a:xfrm>
-          <a:off x="0" y="0"/>
-          <a:ext cx="0" cy="0"/>
-          <a:chOff x="0" y="0"/>
-          <a:chExt cx="0" cy="0"/>
-        </a:xfrm>
-      </p:grpSpPr>
-      <p:sp>
-        <p:nvSpPr>
-          <p:cNvPr id="2" name="标题 1">
-            <a:extLst>
-              <a:ext uri="{FF2B5EF4-FFF2-40B4-BE49-F238E27FC236}">
                 <a16:creationId xmlns:a16="http://schemas.microsoft.com/office/drawing/2014/main" id="{B18E5749-3309-40D0-9D48-3E5BAA273743}"/>
               </a:ext>
             </a:extLst>
@@ -4410,7 +6847,7 @@
 </p:sld>
 </file>
 
-<file path=ppt/slides/slide23.xml><?xml version="1.0" encoding="utf-8"?>
+<file path=ppt/slides/slide18.xml><?xml version="1.0" encoding="utf-8"?>
 <p:sld xmlns:a="http://schemas.openxmlformats.org/drawingml/2006/main" xmlns:r="http://schemas.openxmlformats.org/officeDocument/2006/relationships" xmlns:p="http://schemas.openxmlformats.org/presentationml/2006/main">
   <p:cSld>
     <p:spTree>
@@ -4503,7 +6940,7 @@
 </p:sld>
 </file>
 
-<file path=ppt/slides/slide24.xml><?xml version="1.0" encoding="utf-8"?>
+<file path=ppt/slides/slide19.xml><?xml version="1.0" encoding="utf-8"?>
 <p:sld xmlns:a="http://schemas.openxmlformats.org/drawingml/2006/main" xmlns:r="http://schemas.openxmlformats.org/officeDocument/2006/relationships" xmlns:p="http://schemas.openxmlformats.org/presentationml/2006/main">
   <p:cSld>
     <p:spTree>
@@ -4587,7 +7024,7 @@
 </p:sld>
 </file>
 
-<file path=ppt/slides/slide25.xml><?xml version="1.0" encoding="utf-8"?>
+<file path=ppt/slides/slide2.xml><?xml version="1.0" encoding="utf-8"?>
 <p:sld xmlns:a="http://schemas.openxmlformats.org/drawingml/2006/main" xmlns:r="http://schemas.openxmlformats.org/officeDocument/2006/relationships" xmlns:p="http://schemas.openxmlformats.org/presentationml/2006/main">
   <p:cSld>
     <p:spTree>
@@ -4609,6 +7046,112 @@
           <p:cNvPr id="2" name="标题 1">
             <a:extLst>
               <a:ext uri="{FF2B5EF4-FFF2-40B4-BE49-F238E27FC236}">
+                <a16:creationId xmlns:a16="http://schemas.microsoft.com/office/drawing/2014/main" id="{1AFCDE6B-7737-486C-9FD6-45EB60958887}"/>
+              </a:ext>
+            </a:extLst>
+          </p:cNvPr>
+          <p:cNvSpPr>
+            <a:spLocks noGrp="1"/>
+          </p:cNvSpPr>
+          <p:nvPr>
+            <p:ph type="title"/>
+          </p:nvPr>
+        </p:nvSpPr>
+        <p:spPr/>
+        <p:txBody>
+          <a:bodyPr/>
+          <a:lstStyle/>
+          <a:p>
+            <a:r>
+              <a:rPr lang="en-US" altLang="zh-CN" dirty="0"/>
+              <a:t>Content</a:t>
+            </a:r>
+            <a:endParaRPr lang="zh-CN" altLang="en-US" dirty="0"/>
+          </a:p>
+        </p:txBody>
+      </p:sp>
+      <p:sp>
+        <p:nvSpPr>
+          <p:cNvPr id="3" name="内容占位符 2">
+            <a:extLst>
+              <a:ext uri="{FF2B5EF4-FFF2-40B4-BE49-F238E27FC236}">
+                <a16:creationId xmlns:a16="http://schemas.microsoft.com/office/drawing/2014/main" id="{57BDFA4D-BDFA-44D4-AFC0-D9158C90CC8A}"/>
+              </a:ext>
+            </a:extLst>
+          </p:cNvPr>
+          <p:cNvSpPr>
+            <a:spLocks noGrp="1"/>
+          </p:cNvSpPr>
+          <p:nvPr>
+            <p:ph idx="1"/>
+          </p:nvPr>
+        </p:nvSpPr>
+        <p:spPr/>
+        <p:txBody>
+          <a:bodyPr/>
+          <a:lstStyle/>
+          <a:p>
+            <a:r>
+              <a:rPr lang="en-US" altLang="zh-CN" dirty="0"/>
+              <a:t>Architecture Overview </a:t>
+            </a:r>
+          </a:p>
+          <a:p>
+            <a:r>
+              <a:rPr lang="en-US" altLang="zh-CN" dirty="0"/>
+              <a:t>Roles</a:t>
+            </a:r>
+          </a:p>
+          <a:p>
+            <a:r>
+              <a:rPr lang="en-US" altLang="zh-CN" dirty="0"/>
+              <a:t>Relationship</a:t>
+            </a:r>
+          </a:p>
+          <a:p>
+            <a:r>
+              <a:rPr lang="en-US" altLang="zh-CN" dirty="0"/>
+              <a:t>Conclusion</a:t>
+            </a:r>
+            <a:endParaRPr lang="zh-CN" altLang="en-US" dirty="0"/>
+          </a:p>
+        </p:txBody>
+      </p:sp>
+    </p:spTree>
+    <p:extLst>
+      <p:ext uri="{BB962C8B-B14F-4D97-AF65-F5344CB8AC3E}">
+        <p14:creationId xmlns:p14="http://schemas.microsoft.com/office/powerpoint/2010/main" val="1026712134"/>
+      </p:ext>
+    </p:extLst>
+  </p:cSld>
+  <p:clrMapOvr>
+    <a:masterClrMapping/>
+  </p:clrMapOvr>
+</p:sld>
+</file>
+
+<file path=ppt/slides/slide20.xml><?xml version="1.0" encoding="utf-8"?>
+<p:sld xmlns:a="http://schemas.openxmlformats.org/drawingml/2006/main" xmlns:r="http://schemas.openxmlformats.org/officeDocument/2006/relationships" xmlns:p="http://schemas.openxmlformats.org/presentationml/2006/main">
+  <p:cSld>
+    <p:spTree>
+      <p:nvGrpSpPr>
+        <p:cNvPr id="1" name=""/>
+        <p:cNvGrpSpPr/>
+        <p:nvPr/>
+      </p:nvGrpSpPr>
+      <p:grpSpPr>
+        <a:xfrm>
+          <a:off x="0" y="0"/>
+          <a:ext cx="0" cy="0"/>
+          <a:chOff x="0" y="0"/>
+          <a:chExt cx="0" cy="0"/>
+        </a:xfrm>
+      </p:grpSpPr>
+      <p:sp>
+        <p:nvSpPr>
+          <p:cNvPr id="2" name="标题 1">
+            <a:extLst>
+              <a:ext uri="{FF2B5EF4-FFF2-40B4-BE49-F238E27FC236}">
                 <a16:creationId xmlns:a16="http://schemas.microsoft.com/office/drawing/2014/main" id="{5B5BD595-6FDE-4046-9128-0F88029BEAB5}"/>
               </a:ext>
             </a:extLst>
@@ -4671,7 +7214,7 @@
 </p:sld>
 </file>
 
-<file path=ppt/slides/slide26.xml><?xml version="1.0" encoding="utf-8"?>
+<file path=ppt/slides/slide21.xml><?xml version="1.0" encoding="utf-8"?>
 <p:sld xmlns:a="http://schemas.openxmlformats.org/drawingml/2006/main" xmlns:r="http://schemas.openxmlformats.org/officeDocument/2006/relationships" xmlns:p="http://schemas.openxmlformats.org/presentationml/2006/main">
   <p:cSld>
     <p:spTree>
@@ -4736,7 +7279,7 @@
 </p:sld>
 </file>
 
-<file path=ppt/slides/slide27.xml><?xml version="1.0" encoding="utf-8"?>
+<file path=ppt/slides/slide22.xml><?xml version="1.0" encoding="utf-8"?>
 <p:sld xmlns:a="http://schemas.openxmlformats.org/drawingml/2006/main" xmlns:r="http://schemas.openxmlformats.org/officeDocument/2006/relationships" xmlns:p="http://schemas.openxmlformats.org/presentationml/2006/main">
   <p:cSld>
     <p:spTree>
@@ -4802,87 +7345,7 @@
 </p:sld>
 </file>
 
-<file path=ppt/slides/slide28.xml><?xml version="1.0" encoding="utf-8"?>
-<p:sld xmlns:a="http://schemas.openxmlformats.org/drawingml/2006/main" xmlns:r="http://schemas.openxmlformats.org/officeDocument/2006/relationships" xmlns:p="http://schemas.openxmlformats.org/presentationml/2006/main">
-  <p:cSld>
-    <p:spTree>
-      <p:nvGrpSpPr>
-        <p:cNvPr id="1" name=""/>
-        <p:cNvGrpSpPr/>
-        <p:nvPr/>
-      </p:nvGrpSpPr>
-      <p:grpSpPr>
-        <a:xfrm>
-          <a:off x="0" y="0"/>
-          <a:ext cx="0" cy="0"/>
-          <a:chOff x="0" y="0"/>
-          <a:chExt cx="0" cy="0"/>
-        </a:xfrm>
-      </p:grpSpPr>
-      <p:sp>
-        <p:nvSpPr>
-          <p:cNvPr id="2" name="标题 1">
-            <a:extLst>
-              <a:ext uri="{FF2B5EF4-FFF2-40B4-BE49-F238E27FC236}">
-                <a16:creationId xmlns:a16="http://schemas.microsoft.com/office/drawing/2014/main" id="{CA7A440B-0107-47E9-B9B0-FBE8FC629893}"/>
-              </a:ext>
-            </a:extLst>
-          </p:cNvPr>
-          <p:cNvSpPr>
-            <a:spLocks noGrp="1"/>
-          </p:cNvSpPr>
-          <p:nvPr>
-            <p:ph type="title"/>
-          </p:nvPr>
-        </p:nvSpPr>
-        <p:spPr/>
-        <p:txBody>
-          <a:bodyPr/>
-          <a:lstStyle/>
-          <a:p>
-            <a:endParaRPr lang="zh-CN" altLang="en-US"/>
-          </a:p>
-        </p:txBody>
-      </p:sp>
-      <p:sp>
-        <p:nvSpPr>
-          <p:cNvPr id="3" name="内容占位符 2">
-            <a:extLst>
-              <a:ext uri="{FF2B5EF4-FFF2-40B4-BE49-F238E27FC236}">
-                <a16:creationId xmlns:a16="http://schemas.microsoft.com/office/drawing/2014/main" id="{119A45B3-732F-4A23-9448-263E08E0F288}"/>
-              </a:ext>
-            </a:extLst>
-          </p:cNvPr>
-          <p:cNvSpPr>
-            <a:spLocks noGrp="1"/>
-          </p:cNvSpPr>
-          <p:nvPr>
-            <p:ph idx="1"/>
-          </p:nvPr>
-        </p:nvSpPr>
-        <p:spPr/>
-        <p:txBody>
-          <a:bodyPr/>
-          <a:lstStyle/>
-          <a:p>
-            <a:endParaRPr lang="zh-CN" altLang="en-US"/>
-          </a:p>
-        </p:txBody>
-      </p:sp>
-    </p:spTree>
-    <p:extLst>
-      <p:ext uri="{BB962C8B-B14F-4D97-AF65-F5344CB8AC3E}">
-        <p14:creationId xmlns:p14="http://schemas.microsoft.com/office/powerpoint/2010/main" val="1647399641"/>
-      </p:ext>
-    </p:extLst>
-  </p:cSld>
-  <p:clrMapOvr>
-    <a:masterClrMapping/>
-  </p:clrMapOvr>
-</p:sld>
-</file>
-
-<file path=ppt/slides/slide29.xml><?xml version="1.0" encoding="utf-8"?>
+<file path=ppt/slides/slide23.xml><?xml version="1.0" encoding="utf-8"?>
 <p:sld xmlns:a="http://schemas.openxmlformats.org/drawingml/2006/main" xmlns:r="http://schemas.openxmlformats.org/officeDocument/2006/relationships" xmlns:p="http://schemas.openxmlformats.org/presentationml/2006/main">
   <p:cSld>
     <p:spTree>
@@ -5036,8 +7499,8 @@
           </a:p>
           <a:p>
             <a:r>
-              <a:rPr lang="zh-CN" altLang="en-US"/>
-              <a:t>思路清晰（图）</a:t>
+              <a:rPr lang="zh-CN" altLang="en-US" dirty="0"/>
+              <a:t>思路清晰</a:t>
             </a:r>
             <a:endParaRPr lang="en-US" altLang="zh-CN" dirty="0"/>
           </a:p>
@@ -5056,6 +7519,34 @@
           </a:p>
         </p:txBody>
       </p:sp>
+      <p:graphicFrame>
+        <p:nvGraphicFramePr>
+          <p:cNvPr id="4" name="图示 3">
+            <a:extLst>
+              <a:ext uri="{FF2B5EF4-FFF2-40B4-BE49-F238E27FC236}">
+                <a16:creationId xmlns:a16="http://schemas.microsoft.com/office/drawing/2014/main" id="{EDCA3C96-402E-4F41-8E4B-FD28A8F3068C}"/>
+              </a:ext>
+            </a:extLst>
+          </p:cNvPr>
+          <p:cNvGraphicFramePr/>
+          <p:nvPr>
+            <p:extLst>
+              <p:ext uri="{D42A27DB-BD31-4B8C-83A1-F6EECF244321}">
+                <p14:modId xmlns:p14="http://schemas.microsoft.com/office/powerpoint/2010/main" val="54056349"/>
+              </p:ext>
+            </p:extLst>
+          </p:nvPr>
+        </p:nvGraphicFramePr>
+        <p:xfrm>
+          <a:off x="3413760" y="3714271"/>
+          <a:ext cx="8128000" cy="964056"/>
+        </p:xfrm>
+        <a:graphic>
+          <a:graphicData uri="http://schemas.openxmlformats.org/drawingml/2006/diagram">
+            <dgm:relIds xmlns:dgm="http://schemas.openxmlformats.org/drawingml/2006/diagram" xmlns:r="http://schemas.openxmlformats.org/officeDocument/2006/relationships" r:dm="rId2" r:lo="rId3" r:qs="rId4" r:cs="rId5"/>
+          </a:graphicData>
+        </a:graphic>
+      </p:graphicFrame>
     </p:spTree>
     <p:extLst>
       <p:ext uri="{BB962C8B-B14F-4D97-AF65-F5344CB8AC3E}">
@@ -5631,23 +8122,6 @@
               <a:buNone/>
             </a:pPr>
             <a:endParaRPr lang="en-US" altLang="zh-CN" i="1" dirty="0"/>
-          </a:p>
-          <a:p>
-            <a:pPr marL="457200" lvl="1" indent="0">
-              <a:buNone/>
-            </a:pPr>
-            <a:r>
-              <a:rPr lang="en-US" altLang="zh-CN" dirty="0"/>
-              <a:t>【</a:t>
-            </a:r>
-            <a:r>
-              <a:rPr lang="zh-CN" altLang="en-US" dirty="0"/>
-              <a:t>策略实例</a:t>
-            </a:r>
-            <a:r>
-              <a:rPr lang="en-US" altLang="zh-CN" dirty="0"/>
-              <a:t>】</a:t>
-            </a:r>
           </a:p>
         </p:txBody>
       </p:sp>

</xml_diff>